<commit_message>
Several additions and reformatting. Nearly-complete presentation.
</commit_message>
<xml_diff>
--- a/docs/juniorIS-new.pptx
+++ b/docs/juniorIS-new.pptx
@@ -2,13 +2,28 @@
 <file path=ppt/presentation.xml><?xml version="1.0" encoding="utf-8"?>
 <p:presentation xmlns:a="http://schemas.openxmlformats.org/drawingml/2006/main" xmlns:r="http://schemas.openxmlformats.org/officeDocument/2006/relationships" xmlns:p="http://schemas.openxmlformats.org/presentationml/2006/main" saveSubsetFonts="1">
   <p:sldMasterIdLst>
-    <p:sldMasterId id="2147483648" r:id="rId1"/>
+    <p:sldMasterId id="2147483660" r:id="rId1"/>
   </p:sldMasterIdLst>
   <p:sldIdLst>
     <p:sldId id="256" r:id="rId2"/>
     <p:sldId id="257" r:id="rId3"/>
-    <p:sldId id="258" r:id="rId4"/>
-    <p:sldId id="259" r:id="rId5"/>
+    <p:sldId id="260" r:id="rId4"/>
+    <p:sldId id="264" r:id="rId5"/>
+    <p:sldId id="263" r:id="rId6"/>
+    <p:sldId id="275" r:id="rId7"/>
+    <p:sldId id="265" r:id="rId8"/>
+    <p:sldId id="262" r:id="rId9"/>
+    <p:sldId id="274" r:id="rId10"/>
+    <p:sldId id="272" r:id="rId11"/>
+    <p:sldId id="266" r:id="rId12"/>
+    <p:sldId id="267" r:id="rId13"/>
+    <p:sldId id="268" r:id="rId14"/>
+    <p:sldId id="276" r:id="rId15"/>
+    <p:sldId id="269" r:id="rId16"/>
+    <p:sldId id="277" r:id="rId17"/>
+    <p:sldId id="270" r:id="rId18"/>
+    <p:sldId id="273" r:id="rId19"/>
+    <p:sldId id="259" r:id="rId20"/>
   </p:sldIdLst>
   <p:sldSz cx="12192000" cy="6858000"/>
   <p:notesSz cx="6858000" cy="9144000"/>
@@ -107,6 +122,11 @@
       </a:defRPr>
     </a:lvl9pPr>
   </p:defaultTextStyle>
+  <p:extLst>
+    <p:ext uri="{EFAFB233-063F-42B5-8137-9DF3F51BA10A}">
+      <p15:sldGuideLst xmlns:p15="http://schemas.microsoft.com/office/powerpoint/2012/main"/>
+    </p:ext>
+  </p:extLst>
 </p:presentation>
 </file>
 
@@ -132,7 +152,7 @@
           <p:cNvPr id="2" name="Title 1">
             <a:extLst>
               <a:ext uri="{FF2B5EF4-FFF2-40B4-BE49-F238E27FC236}">
-                <a16:creationId xmlns:a16="http://schemas.microsoft.com/office/drawing/2014/main" id="{54CC1BE3-9B4B-644B-44EE-C7DCC97332B4}"/>
+                <a16:creationId xmlns:a16="http://schemas.microsoft.com/office/drawing/2014/main" id="{419AB346-5406-920C-79EF-DC5762F0E018}"/>
               </a:ext>
             </a:extLst>
           </p:cNvPr>
@@ -169,7 +189,7 @@
           <p:cNvPr id="3" name="Subtitle 2">
             <a:extLst>
               <a:ext uri="{FF2B5EF4-FFF2-40B4-BE49-F238E27FC236}">
-                <a16:creationId xmlns:a16="http://schemas.microsoft.com/office/drawing/2014/main" id="{B7920055-CBE0-1750-69B7-68FA7EF661D7}"/>
+                <a16:creationId xmlns:a16="http://schemas.microsoft.com/office/drawing/2014/main" id="{955E8BB6-CE08-A4D0-A150-8CA15756E503}"/>
               </a:ext>
             </a:extLst>
           </p:cNvPr>
@@ -239,7 +259,7 @@
           <p:cNvPr id="4" name="Date Placeholder 3">
             <a:extLst>
               <a:ext uri="{FF2B5EF4-FFF2-40B4-BE49-F238E27FC236}">
-                <a16:creationId xmlns:a16="http://schemas.microsoft.com/office/drawing/2014/main" id="{C6B797CA-3B9B-7DCA-2E22-C3B58DBF77DB}"/>
+                <a16:creationId xmlns:a16="http://schemas.microsoft.com/office/drawing/2014/main" id="{5C2C1F96-5DF0-B714-D415-44621500949F}"/>
               </a:ext>
             </a:extLst>
           </p:cNvPr>
@@ -257,7 +277,7 @@
           <a:p>
             <a:fld id="{E807C478-0C71-4427-B4FF-073F9369AC5F}" type="datetimeFigureOut">
               <a:rPr lang="en-US" smtClean="0"/>
-              <a:t>5/13/2024</a:t>
+              <a:t>5/25/2024</a:t>
             </a:fld>
             <a:endParaRPr lang="en-US"/>
           </a:p>
@@ -268,7 +288,7 @@
           <p:cNvPr id="5" name="Footer Placeholder 4">
             <a:extLst>
               <a:ext uri="{FF2B5EF4-FFF2-40B4-BE49-F238E27FC236}">
-                <a16:creationId xmlns:a16="http://schemas.microsoft.com/office/drawing/2014/main" id="{DF7C129C-CFC6-E2AF-4699-2E487C6962DC}"/>
+                <a16:creationId xmlns:a16="http://schemas.microsoft.com/office/drawing/2014/main" id="{0FF58D97-349E-A5D0-8066-840F52F40009}"/>
               </a:ext>
             </a:extLst>
           </p:cNvPr>
@@ -293,7 +313,7 @@
           <p:cNvPr id="6" name="Slide Number Placeholder 5">
             <a:extLst>
               <a:ext uri="{FF2B5EF4-FFF2-40B4-BE49-F238E27FC236}">
-                <a16:creationId xmlns:a16="http://schemas.microsoft.com/office/drawing/2014/main" id="{857BD781-DFB2-B11E-BA18-64E25E0491A0}"/>
+                <a16:creationId xmlns:a16="http://schemas.microsoft.com/office/drawing/2014/main" id="{B981559A-0AFA-F411-ABEE-FC3BF036C320}"/>
               </a:ext>
             </a:extLst>
           </p:cNvPr>
@@ -320,7 +340,7 @@
     </p:spTree>
     <p:extLst>
       <p:ext uri="{BB962C8B-B14F-4D97-AF65-F5344CB8AC3E}">
-        <p14:creationId xmlns:p14="http://schemas.microsoft.com/office/powerpoint/2010/main" val="2142614274"/>
+        <p14:creationId xmlns:p14="http://schemas.microsoft.com/office/powerpoint/2010/main" val="2952370886"/>
       </p:ext>
     </p:extLst>
   </p:cSld>
@@ -352,7 +372,7 @@
           <p:cNvPr id="2" name="Title 1">
             <a:extLst>
               <a:ext uri="{FF2B5EF4-FFF2-40B4-BE49-F238E27FC236}">
-                <a16:creationId xmlns:a16="http://schemas.microsoft.com/office/drawing/2014/main" id="{CA55EB17-383E-2542-109A-D89D745AEF2F}"/>
+                <a16:creationId xmlns:a16="http://schemas.microsoft.com/office/drawing/2014/main" id="{7DD1FD43-F7C9-68DD-90B6-B647E0F33C58}"/>
               </a:ext>
             </a:extLst>
           </p:cNvPr>
@@ -380,7 +400,7 @@
           <p:cNvPr id="3" name="Vertical Text Placeholder 2">
             <a:extLst>
               <a:ext uri="{FF2B5EF4-FFF2-40B4-BE49-F238E27FC236}">
-                <a16:creationId xmlns:a16="http://schemas.microsoft.com/office/drawing/2014/main" id="{C68E9DE1-A57E-7C6B-B7AA-539DD1BF642D}"/>
+                <a16:creationId xmlns:a16="http://schemas.microsoft.com/office/drawing/2014/main" id="{2CD360E5-A285-A144-1D6A-4932B54730A7}"/>
               </a:ext>
             </a:extLst>
           </p:cNvPr>
@@ -437,7 +457,7 @@
           <p:cNvPr id="4" name="Date Placeholder 3">
             <a:extLst>
               <a:ext uri="{FF2B5EF4-FFF2-40B4-BE49-F238E27FC236}">
-                <a16:creationId xmlns:a16="http://schemas.microsoft.com/office/drawing/2014/main" id="{8116DC9E-0F54-0F45-581D-92B3ADA3269C}"/>
+                <a16:creationId xmlns:a16="http://schemas.microsoft.com/office/drawing/2014/main" id="{836B02B5-D572-76FC-5C7D-0E9F1CB53A58}"/>
               </a:ext>
             </a:extLst>
           </p:cNvPr>
@@ -455,7 +475,7 @@
           <a:p>
             <a:fld id="{E807C478-0C71-4427-B4FF-073F9369AC5F}" type="datetimeFigureOut">
               <a:rPr lang="en-US" smtClean="0"/>
-              <a:t>5/13/2024</a:t>
+              <a:t>5/25/2024</a:t>
             </a:fld>
             <a:endParaRPr lang="en-US"/>
           </a:p>
@@ -466,7 +486,7 @@
           <p:cNvPr id="5" name="Footer Placeholder 4">
             <a:extLst>
               <a:ext uri="{FF2B5EF4-FFF2-40B4-BE49-F238E27FC236}">
-                <a16:creationId xmlns:a16="http://schemas.microsoft.com/office/drawing/2014/main" id="{3ADF5B1D-DCB4-FBB4-42AB-6DED57F5DF43}"/>
+                <a16:creationId xmlns:a16="http://schemas.microsoft.com/office/drawing/2014/main" id="{016C1400-F5B9-B013-072C-7394A8A24B27}"/>
               </a:ext>
             </a:extLst>
           </p:cNvPr>
@@ -491,7 +511,7 @@
           <p:cNvPr id="6" name="Slide Number Placeholder 5">
             <a:extLst>
               <a:ext uri="{FF2B5EF4-FFF2-40B4-BE49-F238E27FC236}">
-                <a16:creationId xmlns:a16="http://schemas.microsoft.com/office/drawing/2014/main" id="{5649F9BA-C3BA-E231-0E61-9A1EE65EAAF4}"/>
+                <a16:creationId xmlns:a16="http://schemas.microsoft.com/office/drawing/2014/main" id="{7B11169D-AB7E-F8D3-5F07-494FB31EC152}"/>
               </a:ext>
             </a:extLst>
           </p:cNvPr>
@@ -518,7 +538,7 @@
     </p:spTree>
     <p:extLst>
       <p:ext uri="{BB962C8B-B14F-4D97-AF65-F5344CB8AC3E}">
-        <p14:creationId xmlns:p14="http://schemas.microsoft.com/office/powerpoint/2010/main" val="895319938"/>
+        <p14:creationId xmlns:p14="http://schemas.microsoft.com/office/powerpoint/2010/main" val="2827138232"/>
       </p:ext>
     </p:extLst>
   </p:cSld>
@@ -550,7 +570,7 @@
           <p:cNvPr id="2" name="Vertical Title 1">
             <a:extLst>
               <a:ext uri="{FF2B5EF4-FFF2-40B4-BE49-F238E27FC236}">
-                <a16:creationId xmlns:a16="http://schemas.microsoft.com/office/drawing/2014/main" id="{5168A215-A991-F4CF-E878-FF33E943DC9B}"/>
+                <a16:creationId xmlns:a16="http://schemas.microsoft.com/office/drawing/2014/main" id="{D566173C-1B52-2B32-8068-F7B408598178}"/>
               </a:ext>
             </a:extLst>
           </p:cNvPr>
@@ -583,7 +603,7 @@
           <p:cNvPr id="3" name="Vertical Text Placeholder 2">
             <a:extLst>
               <a:ext uri="{FF2B5EF4-FFF2-40B4-BE49-F238E27FC236}">
-                <a16:creationId xmlns:a16="http://schemas.microsoft.com/office/drawing/2014/main" id="{330FDEFB-5D5D-7805-AFFD-4A63B2C1DE59}"/>
+                <a16:creationId xmlns:a16="http://schemas.microsoft.com/office/drawing/2014/main" id="{8BA63BF4-F6B8-A849-0C72-9049B9259A2D}"/>
               </a:ext>
             </a:extLst>
           </p:cNvPr>
@@ -645,7 +665,7 @@
           <p:cNvPr id="4" name="Date Placeholder 3">
             <a:extLst>
               <a:ext uri="{FF2B5EF4-FFF2-40B4-BE49-F238E27FC236}">
-                <a16:creationId xmlns:a16="http://schemas.microsoft.com/office/drawing/2014/main" id="{0E2AC680-891C-ABBA-E071-3F035E214D5B}"/>
+                <a16:creationId xmlns:a16="http://schemas.microsoft.com/office/drawing/2014/main" id="{723A8AF7-EEAE-7D7C-9838-3478210B19EB}"/>
               </a:ext>
             </a:extLst>
           </p:cNvPr>
@@ -663,7 +683,7 @@
           <a:p>
             <a:fld id="{E807C478-0C71-4427-B4FF-073F9369AC5F}" type="datetimeFigureOut">
               <a:rPr lang="en-US" smtClean="0"/>
-              <a:t>5/13/2024</a:t>
+              <a:t>5/25/2024</a:t>
             </a:fld>
             <a:endParaRPr lang="en-US"/>
           </a:p>
@@ -674,7 +694,7 @@
           <p:cNvPr id="5" name="Footer Placeholder 4">
             <a:extLst>
               <a:ext uri="{FF2B5EF4-FFF2-40B4-BE49-F238E27FC236}">
-                <a16:creationId xmlns:a16="http://schemas.microsoft.com/office/drawing/2014/main" id="{25977FF6-9BB4-BB66-0198-7CACB706916A}"/>
+                <a16:creationId xmlns:a16="http://schemas.microsoft.com/office/drawing/2014/main" id="{C2E6900B-81FF-497C-5237-4F759E246F62}"/>
               </a:ext>
             </a:extLst>
           </p:cNvPr>
@@ -699,7 +719,7 @@
           <p:cNvPr id="6" name="Slide Number Placeholder 5">
             <a:extLst>
               <a:ext uri="{FF2B5EF4-FFF2-40B4-BE49-F238E27FC236}">
-                <a16:creationId xmlns:a16="http://schemas.microsoft.com/office/drawing/2014/main" id="{4AD53DD8-47E3-EADB-1E3B-624F4C697677}"/>
+                <a16:creationId xmlns:a16="http://schemas.microsoft.com/office/drawing/2014/main" id="{C2019FF6-3381-F19F-86A5-DE54E7A16E2C}"/>
               </a:ext>
             </a:extLst>
           </p:cNvPr>
@@ -726,7 +746,7 @@
     </p:spTree>
     <p:extLst>
       <p:ext uri="{BB962C8B-B14F-4D97-AF65-F5344CB8AC3E}">
-        <p14:creationId xmlns:p14="http://schemas.microsoft.com/office/powerpoint/2010/main" val="2070454808"/>
+        <p14:creationId xmlns:p14="http://schemas.microsoft.com/office/powerpoint/2010/main" val="1163955253"/>
       </p:ext>
     </p:extLst>
   </p:cSld>
@@ -758,7 +778,7 @@
           <p:cNvPr id="2" name="Title 1">
             <a:extLst>
               <a:ext uri="{FF2B5EF4-FFF2-40B4-BE49-F238E27FC236}">
-                <a16:creationId xmlns:a16="http://schemas.microsoft.com/office/drawing/2014/main" id="{C10DCBC5-37E5-150E-EFA3-D509FF6E5020}"/>
+                <a16:creationId xmlns:a16="http://schemas.microsoft.com/office/drawing/2014/main" id="{E4331C72-93EA-A319-EB71-B9EE50DD8CFC}"/>
               </a:ext>
             </a:extLst>
           </p:cNvPr>
@@ -786,7 +806,7 @@
           <p:cNvPr id="3" name="Content Placeholder 2">
             <a:extLst>
               <a:ext uri="{FF2B5EF4-FFF2-40B4-BE49-F238E27FC236}">
-                <a16:creationId xmlns:a16="http://schemas.microsoft.com/office/drawing/2014/main" id="{309277A8-92F6-9F3E-D922-007DAA2BB23F}"/>
+                <a16:creationId xmlns:a16="http://schemas.microsoft.com/office/drawing/2014/main" id="{80E97A29-22BA-7C66-E477-95E1429046C0}"/>
               </a:ext>
             </a:extLst>
           </p:cNvPr>
@@ -843,7 +863,7 @@
           <p:cNvPr id="4" name="Date Placeholder 3">
             <a:extLst>
               <a:ext uri="{FF2B5EF4-FFF2-40B4-BE49-F238E27FC236}">
-                <a16:creationId xmlns:a16="http://schemas.microsoft.com/office/drawing/2014/main" id="{95BB680C-2D09-1187-F1C7-862DEF5E62C6}"/>
+                <a16:creationId xmlns:a16="http://schemas.microsoft.com/office/drawing/2014/main" id="{9FD64787-98D5-DDC9-3276-61EFFBDC82D9}"/>
               </a:ext>
             </a:extLst>
           </p:cNvPr>
@@ -861,7 +881,7 @@
           <a:p>
             <a:fld id="{E807C478-0C71-4427-B4FF-073F9369AC5F}" type="datetimeFigureOut">
               <a:rPr lang="en-US" smtClean="0"/>
-              <a:t>5/13/2024</a:t>
+              <a:t>5/25/2024</a:t>
             </a:fld>
             <a:endParaRPr lang="en-US"/>
           </a:p>
@@ -872,7 +892,7 @@
           <p:cNvPr id="5" name="Footer Placeholder 4">
             <a:extLst>
               <a:ext uri="{FF2B5EF4-FFF2-40B4-BE49-F238E27FC236}">
-                <a16:creationId xmlns:a16="http://schemas.microsoft.com/office/drawing/2014/main" id="{B005BD1B-FD6D-1C6D-0F4C-F5DA1A130DE5}"/>
+                <a16:creationId xmlns:a16="http://schemas.microsoft.com/office/drawing/2014/main" id="{D98BF5C9-AF6C-97A4-6D2F-A2F033254C2E}"/>
               </a:ext>
             </a:extLst>
           </p:cNvPr>
@@ -897,7 +917,7 @@
           <p:cNvPr id="6" name="Slide Number Placeholder 5">
             <a:extLst>
               <a:ext uri="{FF2B5EF4-FFF2-40B4-BE49-F238E27FC236}">
-                <a16:creationId xmlns:a16="http://schemas.microsoft.com/office/drawing/2014/main" id="{FB2898AA-D4F9-F389-E4F0-F006C1F04990}"/>
+                <a16:creationId xmlns:a16="http://schemas.microsoft.com/office/drawing/2014/main" id="{0D99C16D-D43B-05C8-1D62-4185F57B435A}"/>
               </a:ext>
             </a:extLst>
           </p:cNvPr>
@@ -924,7 +944,7 @@
     </p:spTree>
     <p:extLst>
       <p:ext uri="{BB962C8B-B14F-4D97-AF65-F5344CB8AC3E}">
-        <p14:creationId xmlns:p14="http://schemas.microsoft.com/office/powerpoint/2010/main" val="2910261600"/>
+        <p14:creationId xmlns:p14="http://schemas.microsoft.com/office/powerpoint/2010/main" val="561923142"/>
       </p:ext>
     </p:extLst>
   </p:cSld>
@@ -956,7 +976,7 @@
           <p:cNvPr id="2" name="Title 1">
             <a:extLst>
               <a:ext uri="{FF2B5EF4-FFF2-40B4-BE49-F238E27FC236}">
-                <a16:creationId xmlns:a16="http://schemas.microsoft.com/office/drawing/2014/main" id="{CF359BF4-5020-0174-40E9-AD4A5DB2E0E5}"/>
+                <a16:creationId xmlns:a16="http://schemas.microsoft.com/office/drawing/2014/main" id="{39B0356F-A266-D524-3AF6-F48BA57C9F6F}"/>
               </a:ext>
             </a:extLst>
           </p:cNvPr>
@@ -993,7 +1013,7 @@
           <p:cNvPr id="3" name="Text Placeholder 2">
             <a:extLst>
               <a:ext uri="{FF2B5EF4-FFF2-40B4-BE49-F238E27FC236}">
-                <a16:creationId xmlns:a16="http://schemas.microsoft.com/office/drawing/2014/main" id="{D597D526-20F9-8246-C757-0B232A33B3CB}"/>
+                <a16:creationId xmlns:a16="http://schemas.microsoft.com/office/drawing/2014/main" id="{61958CC8-4284-302C-C59A-850A102772EA}"/>
               </a:ext>
             </a:extLst>
           </p:cNvPr>
@@ -1118,7 +1138,7 @@
           <p:cNvPr id="4" name="Date Placeholder 3">
             <a:extLst>
               <a:ext uri="{FF2B5EF4-FFF2-40B4-BE49-F238E27FC236}">
-                <a16:creationId xmlns:a16="http://schemas.microsoft.com/office/drawing/2014/main" id="{F7FA7C11-EA81-9F98-746E-7B8F429CCF21}"/>
+                <a16:creationId xmlns:a16="http://schemas.microsoft.com/office/drawing/2014/main" id="{20104A52-66D9-131D-3ED1-1A0B4A703C89}"/>
               </a:ext>
             </a:extLst>
           </p:cNvPr>
@@ -1136,7 +1156,7 @@
           <a:p>
             <a:fld id="{E807C478-0C71-4427-B4FF-073F9369AC5F}" type="datetimeFigureOut">
               <a:rPr lang="en-US" smtClean="0"/>
-              <a:t>5/13/2024</a:t>
+              <a:t>5/25/2024</a:t>
             </a:fld>
             <a:endParaRPr lang="en-US"/>
           </a:p>
@@ -1147,7 +1167,7 @@
           <p:cNvPr id="5" name="Footer Placeholder 4">
             <a:extLst>
               <a:ext uri="{FF2B5EF4-FFF2-40B4-BE49-F238E27FC236}">
-                <a16:creationId xmlns:a16="http://schemas.microsoft.com/office/drawing/2014/main" id="{30DCD47A-7D41-7280-9B55-E0A497050F72}"/>
+                <a16:creationId xmlns:a16="http://schemas.microsoft.com/office/drawing/2014/main" id="{B2289797-C0B6-FA77-5E80-BFF95B942C82}"/>
               </a:ext>
             </a:extLst>
           </p:cNvPr>
@@ -1172,7 +1192,7 @@
           <p:cNvPr id="6" name="Slide Number Placeholder 5">
             <a:extLst>
               <a:ext uri="{FF2B5EF4-FFF2-40B4-BE49-F238E27FC236}">
-                <a16:creationId xmlns:a16="http://schemas.microsoft.com/office/drawing/2014/main" id="{87E7795A-D9D4-B558-CAF5-38BB54E63792}"/>
+                <a16:creationId xmlns:a16="http://schemas.microsoft.com/office/drawing/2014/main" id="{EFD4C7A4-052E-F3A3-BBB3-B1072D3A341E}"/>
               </a:ext>
             </a:extLst>
           </p:cNvPr>
@@ -1199,7 +1219,7 @@
     </p:spTree>
     <p:extLst>
       <p:ext uri="{BB962C8B-B14F-4D97-AF65-F5344CB8AC3E}">
-        <p14:creationId xmlns:p14="http://schemas.microsoft.com/office/powerpoint/2010/main" val="3762560610"/>
+        <p14:creationId xmlns:p14="http://schemas.microsoft.com/office/powerpoint/2010/main" val="113341711"/>
       </p:ext>
     </p:extLst>
   </p:cSld>
@@ -1231,7 +1251,7 @@
           <p:cNvPr id="2" name="Title 1">
             <a:extLst>
               <a:ext uri="{FF2B5EF4-FFF2-40B4-BE49-F238E27FC236}">
-                <a16:creationId xmlns:a16="http://schemas.microsoft.com/office/drawing/2014/main" id="{CA981136-449F-7F1C-1751-D20FD4CDC4DD}"/>
+                <a16:creationId xmlns:a16="http://schemas.microsoft.com/office/drawing/2014/main" id="{6E87CD38-00DB-3D9C-DD75-00F4A3D15EA3}"/>
               </a:ext>
             </a:extLst>
           </p:cNvPr>
@@ -1259,7 +1279,7 @@
           <p:cNvPr id="3" name="Content Placeholder 2">
             <a:extLst>
               <a:ext uri="{FF2B5EF4-FFF2-40B4-BE49-F238E27FC236}">
-                <a16:creationId xmlns:a16="http://schemas.microsoft.com/office/drawing/2014/main" id="{E1E47F72-F40A-326A-9BCD-BAB65A6E4CA0}"/>
+                <a16:creationId xmlns:a16="http://schemas.microsoft.com/office/drawing/2014/main" id="{E31443BD-869C-CC95-4F49-D13412ECF13A}"/>
               </a:ext>
             </a:extLst>
           </p:cNvPr>
@@ -1321,7 +1341,7 @@
           <p:cNvPr id="4" name="Content Placeholder 3">
             <a:extLst>
               <a:ext uri="{FF2B5EF4-FFF2-40B4-BE49-F238E27FC236}">
-                <a16:creationId xmlns:a16="http://schemas.microsoft.com/office/drawing/2014/main" id="{BD2D5BE8-D5B4-EB93-3254-720705CAB014}"/>
+                <a16:creationId xmlns:a16="http://schemas.microsoft.com/office/drawing/2014/main" id="{9F7C07F8-46A5-1210-E743-0891B6CD871F}"/>
               </a:ext>
             </a:extLst>
           </p:cNvPr>
@@ -1383,7 +1403,7 @@
           <p:cNvPr id="5" name="Date Placeholder 4">
             <a:extLst>
               <a:ext uri="{FF2B5EF4-FFF2-40B4-BE49-F238E27FC236}">
-                <a16:creationId xmlns:a16="http://schemas.microsoft.com/office/drawing/2014/main" id="{AD414705-E126-D7B5-8B65-AD0D46C467B8}"/>
+                <a16:creationId xmlns:a16="http://schemas.microsoft.com/office/drawing/2014/main" id="{13AB9551-BDEF-35F2-247D-EBA8C573231B}"/>
               </a:ext>
             </a:extLst>
           </p:cNvPr>
@@ -1401,7 +1421,7 @@
           <a:p>
             <a:fld id="{E807C478-0C71-4427-B4FF-073F9369AC5F}" type="datetimeFigureOut">
               <a:rPr lang="en-US" smtClean="0"/>
-              <a:t>5/13/2024</a:t>
+              <a:t>5/25/2024</a:t>
             </a:fld>
             <a:endParaRPr lang="en-US"/>
           </a:p>
@@ -1412,7 +1432,7 @@
           <p:cNvPr id="6" name="Footer Placeholder 5">
             <a:extLst>
               <a:ext uri="{FF2B5EF4-FFF2-40B4-BE49-F238E27FC236}">
-                <a16:creationId xmlns:a16="http://schemas.microsoft.com/office/drawing/2014/main" id="{89D70D47-D08B-2DF5-0626-37E6B6D29F0A}"/>
+                <a16:creationId xmlns:a16="http://schemas.microsoft.com/office/drawing/2014/main" id="{EA3014F8-5A40-29E9-6E8F-01EFC0B9C2E2}"/>
               </a:ext>
             </a:extLst>
           </p:cNvPr>
@@ -1437,7 +1457,7 @@
           <p:cNvPr id="7" name="Slide Number Placeholder 6">
             <a:extLst>
               <a:ext uri="{FF2B5EF4-FFF2-40B4-BE49-F238E27FC236}">
-                <a16:creationId xmlns:a16="http://schemas.microsoft.com/office/drawing/2014/main" id="{5E2943CC-A24C-5AB3-060E-6D6A647C2B82}"/>
+                <a16:creationId xmlns:a16="http://schemas.microsoft.com/office/drawing/2014/main" id="{89C82AE4-591F-AAE8-4F15-0B232E159430}"/>
               </a:ext>
             </a:extLst>
           </p:cNvPr>
@@ -1464,7 +1484,7 @@
     </p:spTree>
     <p:extLst>
       <p:ext uri="{BB962C8B-B14F-4D97-AF65-F5344CB8AC3E}">
-        <p14:creationId xmlns:p14="http://schemas.microsoft.com/office/powerpoint/2010/main" val="665706554"/>
+        <p14:creationId xmlns:p14="http://schemas.microsoft.com/office/powerpoint/2010/main" val="4097146812"/>
       </p:ext>
     </p:extLst>
   </p:cSld>
@@ -1496,7 +1516,7 @@
           <p:cNvPr id="2" name="Title 1">
             <a:extLst>
               <a:ext uri="{FF2B5EF4-FFF2-40B4-BE49-F238E27FC236}">
-                <a16:creationId xmlns:a16="http://schemas.microsoft.com/office/drawing/2014/main" id="{E4A56B8A-F01E-C193-4701-14455CBD76AB}"/>
+                <a16:creationId xmlns:a16="http://schemas.microsoft.com/office/drawing/2014/main" id="{842DB3A3-94F8-68AB-9BC2-3F0EA2345D69}"/>
               </a:ext>
             </a:extLst>
           </p:cNvPr>
@@ -1529,7 +1549,7 @@
           <p:cNvPr id="3" name="Text Placeholder 2">
             <a:extLst>
               <a:ext uri="{FF2B5EF4-FFF2-40B4-BE49-F238E27FC236}">
-                <a16:creationId xmlns:a16="http://schemas.microsoft.com/office/drawing/2014/main" id="{1F97AC13-5AA1-87B0-B3BE-68D70C1CC74A}"/>
+                <a16:creationId xmlns:a16="http://schemas.microsoft.com/office/drawing/2014/main" id="{8AE41E15-9F4C-65CE-D2E2-1155CC8C4A01}"/>
               </a:ext>
             </a:extLst>
           </p:cNvPr>
@@ -1600,7 +1620,7 @@
           <p:cNvPr id="4" name="Content Placeholder 3">
             <a:extLst>
               <a:ext uri="{FF2B5EF4-FFF2-40B4-BE49-F238E27FC236}">
-                <a16:creationId xmlns:a16="http://schemas.microsoft.com/office/drawing/2014/main" id="{9DFBBFDD-F5B2-C588-CB82-F8F9B52A6731}"/>
+                <a16:creationId xmlns:a16="http://schemas.microsoft.com/office/drawing/2014/main" id="{4CD8C523-25D1-809D-0508-8B3B557DC076}"/>
               </a:ext>
             </a:extLst>
           </p:cNvPr>
@@ -1662,7 +1682,7 @@
           <p:cNvPr id="5" name="Text Placeholder 4">
             <a:extLst>
               <a:ext uri="{FF2B5EF4-FFF2-40B4-BE49-F238E27FC236}">
-                <a16:creationId xmlns:a16="http://schemas.microsoft.com/office/drawing/2014/main" id="{D5A34B45-4603-D628-C292-FD43789B68BF}"/>
+                <a16:creationId xmlns:a16="http://schemas.microsoft.com/office/drawing/2014/main" id="{5D0A814A-5FF6-55FE-C0A5-C3582482BF36}"/>
               </a:ext>
             </a:extLst>
           </p:cNvPr>
@@ -1733,7 +1753,7 @@
           <p:cNvPr id="6" name="Content Placeholder 5">
             <a:extLst>
               <a:ext uri="{FF2B5EF4-FFF2-40B4-BE49-F238E27FC236}">
-                <a16:creationId xmlns:a16="http://schemas.microsoft.com/office/drawing/2014/main" id="{5D54EFBE-68F3-B0B1-FF50-6F635F73782E}"/>
+                <a16:creationId xmlns:a16="http://schemas.microsoft.com/office/drawing/2014/main" id="{82DDD4FE-F818-D821-B7F4-640CA8424BFA}"/>
               </a:ext>
             </a:extLst>
           </p:cNvPr>
@@ -1795,7 +1815,7 @@
           <p:cNvPr id="7" name="Date Placeholder 6">
             <a:extLst>
               <a:ext uri="{FF2B5EF4-FFF2-40B4-BE49-F238E27FC236}">
-                <a16:creationId xmlns:a16="http://schemas.microsoft.com/office/drawing/2014/main" id="{DD1F4CAF-80B3-9321-51E6-3445DB528797}"/>
+                <a16:creationId xmlns:a16="http://schemas.microsoft.com/office/drawing/2014/main" id="{8B5E76A8-08D5-0FBE-6F5F-34230DC8DFEC}"/>
               </a:ext>
             </a:extLst>
           </p:cNvPr>
@@ -1813,7 +1833,7 @@
           <a:p>
             <a:fld id="{E807C478-0C71-4427-B4FF-073F9369AC5F}" type="datetimeFigureOut">
               <a:rPr lang="en-US" smtClean="0"/>
-              <a:t>5/13/2024</a:t>
+              <a:t>5/25/2024</a:t>
             </a:fld>
             <a:endParaRPr lang="en-US"/>
           </a:p>
@@ -1824,7 +1844,7 @@
           <p:cNvPr id="8" name="Footer Placeholder 7">
             <a:extLst>
               <a:ext uri="{FF2B5EF4-FFF2-40B4-BE49-F238E27FC236}">
-                <a16:creationId xmlns:a16="http://schemas.microsoft.com/office/drawing/2014/main" id="{597DC5F5-C7C9-21D0-F58A-E315377E45A3}"/>
+                <a16:creationId xmlns:a16="http://schemas.microsoft.com/office/drawing/2014/main" id="{13ED24C7-D020-B66E-2FAB-FF4F5848F63F}"/>
               </a:ext>
             </a:extLst>
           </p:cNvPr>
@@ -1849,7 +1869,7 @@
           <p:cNvPr id="9" name="Slide Number Placeholder 8">
             <a:extLst>
               <a:ext uri="{FF2B5EF4-FFF2-40B4-BE49-F238E27FC236}">
-                <a16:creationId xmlns:a16="http://schemas.microsoft.com/office/drawing/2014/main" id="{A3A157A9-EE2F-B371-4375-A704A25CB181}"/>
+                <a16:creationId xmlns:a16="http://schemas.microsoft.com/office/drawing/2014/main" id="{FABDC3B7-E46D-B39B-1C56-EAAF5CAE241E}"/>
               </a:ext>
             </a:extLst>
           </p:cNvPr>
@@ -1876,7 +1896,7 @@
     </p:spTree>
     <p:extLst>
       <p:ext uri="{BB962C8B-B14F-4D97-AF65-F5344CB8AC3E}">
-        <p14:creationId xmlns:p14="http://schemas.microsoft.com/office/powerpoint/2010/main" val="845067825"/>
+        <p14:creationId xmlns:p14="http://schemas.microsoft.com/office/powerpoint/2010/main" val="3680036415"/>
       </p:ext>
     </p:extLst>
   </p:cSld>
@@ -1908,7 +1928,7 @@
           <p:cNvPr id="2" name="Title 1">
             <a:extLst>
               <a:ext uri="{FF2B5EF4-FFF2-40B4-BE49-F238E27FC236}">
-                <a16:creationId xmlns:a16="http://schemas.microsoft.com/office/drawing/2014/main" id="{4F3BFE43-9B5C-498F-DA00-EC554FD15295}"/>
+                <a16:creationId xmlns:a16="http://schemas.microsoft.com/office/drawing/2014/main" id="{050957CC-C494-BC69-FE12-25FABB2B40F4}"/>
               </a:ext>
             </a:extLst>
           </p:cNvPr>
@@ -1936,7 +1956,7 @@
           <p:cNvPr id="3" name="Date Placeholder 2">
             <a:extLst>
               <a:ext uri="{FF2B5EF4-FFF2-40B4-BE49-F238E27FC236}">
-                <a16:creationId xmlns:a16="http://schemas.microsoft.com/office/drawing/2014/main" id="{C7B779F6-D110-3B72-0365-037FD5DABCC1}"/>
+                <a16:creationId xmlns:a16="http://schemas.microsoft.com/office/drawing/2014/main" id="{EC9C4F2B-F5D2-4677-9FB3-F54BB79B4533}"/>
               </a:ext>
             </a:extLst>
           </p:cNvPr>
@@ -1954,7 +1974,7 @@
           <a:p>
             <a:fld id="{E807C478-0C71-4427-B4FF-073F9369AC5F}" type="datetimeFigureOut">
               <a:rPr lang="en-US" smtClean="0"/>
-              <a:t>5/13/2024</a:t>
+              <a:t>5/25/2024</a:t>
             </a:fld>
             <a:endParaRPr lang="en-US"/>
           </a:p>
@@ -1965,7 +1985,7 @@
           <p:cNvPr id="4" name="Footer Placeholder 3">
             <a:extLst>
               <a:ext uri="{FF2B5EF4-FFF2-40B4-BE49-F238E27FC236}">
-                <a16:creationId xmlns:a16="http://schemas.microsoft.com/office/drawing/2014/main" id="{A35590D5-96DD-CC90-52FD-022876A67AA2}"/>
+                <a16:creationId xmlns:a16="http://schemas.microsoft.com/office/drawing/2014/main" id="{461A0D4B-8A39-8204-5604-5920B6CD8DD2}"/>
               </a:ext>
             </a:extLst>
           </p:cNvPr>
@@ -1990,7 +2010,7 @@
           <p:cNvPr id="5" name="Slide Number Placeholder 4">
             <a:extLst>
               <a:ext uri="{FF2B5EF4-FFF2-40B4-BE49-F238E27FC236}">
-                <a16:creationId xmlns:a16="http://schemas.microsoft.com/office/drawing/2014/main" id="{885E3A58-1D06-648A-9BEA-E460822ED6CB}"/>
+                <a16:creationId xmlns:a16="http://schemas.microsoft.com/office/drawing/2014/main" id="{D1314313-5BE5-9665-E8CE-FC23505C0A6E}"/>
               </a:ext>
             </a:extLst>
           </p:cNvPr>
@@ -2017,7 +2037,7 @@
     </p:spTree>
     <p:extLst>
       <p:ext uri="{BB962C8B-B14F-4D97-AF65-F5344CB8AC3E}">
-        <p14:creationId xmlns:p14="http://schemas.microsoft.com/office/powerpoint/2010/main" val="1350063114"/>
+        <p14:creationId xmlns:p14="http://schemas.microsoft.com/office/powerpoint/2010/main" val="62594697"/>
       </p:ext>
     </p:extLst>
   </p:cSld>
@@ -2049,7 +2069,7 @@
           <p:cNvPr id="2" name="Date Placeholder 1">
             <a:extLst>
               <a:ext uri="{FF2B5EF4-FFF2-40B4-BE49-F238E27FC236}">
-                <a16:creationId xmlns:a16="http://schemas.microsoft.com/office/drawing/2014/main" id="{5A5F5FD4-3DC8-ED7D-2240-10D1A65FB553}"/>
+                <a16:creationId xmlns:a16="http://schemas.microsoft.com/office/drawing/2014/main" id="{9C2A5806-7CAC-37DC-E1DE-90945CCCC3AC}"/>
               </a:ext>
             </a:extLst>
           </p:cNvPr>
@@ -2067,7 +2087,7 @@
           <a:p>
             <a:fld id="{E807C478-0C71-4427-B4FF-073F9369AC5F}" type="datetimeFigureOut">
               <a:rPr lang="en-US" smtClean="0"/>
-              <a:t>5/13/2024</a:t>
+              <a:t>5/25/2024</a:t>
             </a:fld>
             <a:endParaRPr lang="en-US"/>
           </a:p>
@@ -2078,7 +2098,7 @@
           <p:cNvPr id="3" name="Footer Placeholder 2">
             <a:extLst>
               <a:ext uri="{FF2B5EF4-FFF2-40B4-BE49-F238E27FC236}">
-                <a16:creationId xmlns:a16="http://schemas.microsoft.com/office/drawing/2014/main" id="{4745F04A-0B96-BBD4-24C0-22D207A21A03}"/>
+                <a16:creationId xmlns:a16="http://schemas.microsoft.com/office/drawing/2014/main" id="{0A20BFA5-AA74-A325-8376-77D32FBE2453}"/>
               </a:ext>
             </a:extLst>
           </p:cNvPr>
@@ -2103,7 +2123,7 @@
           <p:cNvPr id="4" name="Slide Number Placeholder 3">
             <a:extLst>
               <a:ext uri="{FF2B5EF4-FFF2-40B4-BE49-F238E27FC236}">
-                <a16:creationId xmlns:a16="http://schemas.microsoft.com/office/drawing/2014/main" id="{C032A06C-ADDD-414A-B834-F85DE0FC54E1}"/>
+                <a16:creationId xmlns:a16="http://schemas.microsoft.com/office/drawing/2014/main" id="{74894A3A-923C-48BD-F59C-D70683189DEA}"/>
               </a:ext>
             </a:extLst>
           </p:cNvPr>
@@ -2130,7 +2150,7 @@
     </p:spTree>
     <p:extLst>
       <p:ext uri="{BB962C8B-B14F-4D97-AF65-F5344CB8AC3E}">
-        <p14:creationId xmlns:p14="http://schemas.microsoft.com/office/powerpoint/2010/main" val="3775352497"/>
+        <p14:creationId xmlns:p14="http://schemas.microsoft.com/office/powerpoint/2010/main" val="806906281"/>
       </p:ext>
     </p:extLst>
   </p:cSld>
@@ -2162,7 +2182,7 @@
           <p:cNvPr id="2" name="Title 1">
             <a:extLst>
               <a:ext uri="{FF2B5EF4-FFF2-40B4-BE49-F238E27FC236}">
-                <a16:creationId xmlns:a16="http://schemas.microsoft.com/office/drawing/2014/main" id="{6FC708DF-D0A9-33E2-3D0D-888431128269}"/>
+                <a16:creationId xmlns:a16="http://schemas.microsoft.com/office/drawing/2014/main" id="{4FCFB655-BDE4-3468-FC87-F3DF85308B62}"/>
               </a:ext>
             </a:extLst>
           </p:cNvPr>
@@ -2199,7 +2219,7 @@
           <p:cNvPr id="3" name="Content Placeholder 2">
             <a:extLst>
               <a:ext uri="{FF2B5EF4-FFF2-40B4-BE49-F238E27FC236}">
-                <a16:creationId xmlns:a16="http://schemas.microsoft.com/office/drawing/2014/main" id="{A8123628-C5A3-BED2-3763-225F18E0E0DA}"/>
+                <a16:creationId xmlns:a16="http://schemas.microsoft.com/office/drawing/2014/main" id="{87FA8D46-D646-04A6-F616-DDB721C55F33}"/>
               </a:ext>
             </a:extLst>
           </p:cNvPr>
@@ -2289,7 +2309,7 @@
           <p:cNvPr id="4" name="Text Placeholder 3">
             <a:extLst>
               <a:ext uri="{FF2B5EF4-FFF2-40B4-BE49-F238E27FC236}">
-                <a16:creationId xmlns:a16="http://schemas.microsoft.com/office/drawing/2014/main" id="{D09A9226-2486-9591-4D4D-15BC43932709}"/>
+                <a16:creationId xmlns:a16="http://schemas.microsoft.com/office/drawing/2014/main" id="{2A77B360-F665-ABCB-CDA4-ACFF9E35ABC4}"/>
               </a:ext>
             </a:extLst>
           </p:cNvPr>
@@ -2360,7 +2380,7 @@
           <p:cNvPr id="5" name="Date Placeholder 4">
             <a:extLst>
               <a:ext uri="{FF2B5EF4-FFF2-40B4-BE49-F238E27FC236}">
-                <a16:creationId xmlns:a16="http://schemas.microsoft.com/office/drawing/2014/main" id="{DAA0582F-0B15-B0F0-D063-DF578D49AC9E}"/>
+                <a16:creationId xmlns:a16="http://schemas.microsoft.com/office/drawing/2014/main" id="{ABF78AD8-751D-92DE-4ECD-C15CB1C4488E}"/>
               </a:ext>
             </a:extLst>
           </p:cNvPr>
@@ -2378,7 +2398,7 @@
           <a:p>
             <a:fld id="{E807C478-0C71-4427-B4FF-073F9369AC5F}" type="datetimeFigureOut">
               <a:rPr lang="en-US" smtClean="0"/>
-              <a:t>5/13/2024</a:t>
+              <a:t>5/25/2024</a:t>
             </a:fld>
             <a:endParaRPr lang="en-US"/>
           </a:p>
@@ -2389,7 +2409,7 @@
           <p:cNvPr id="6" name="Footer Placeholder 5">
             <a:extLst>
               <a:ext uri="{FF2B5EF4-FFF2-40B4-BE49-F238E27FC236}">
-                <a16:creationId xmlns:a16="http://schemas.microsoft.com/office/drawing/2014/main" id="{C68974A8-304F-E58D-5F9F-C0459C4C7ACC}"/>
+                <a16:creationId xmlns:a16="http://schemas.microsoft.com/office/drawing/2014/main" id="{0B938D0B-CB56-01E1-2CA4-167AB6FE7790}"/>
               </a:ext>
             </a:extLst>
           </p:cNvPr>
@@ -2414,7 +2434,7 @@
           <p:cNvPr id="7" name="Slide Number Placeholder 6">
             <a:extLst>
               <a:ext uri="{FF2B5EF4-FFF2-40B4-BE49-F238E27FC236}">
-                <a16:creationId xmlns:a16="http://schemas.microsoft.com/office/drawing/2014/main" id="{171BC194-BB7B-367E-E13B-C9871CF455D4}"/>
+                <a16:creationId xmlns:a16="http://schemas.microsoft.com/office/drawing/2014/main" id="{7C98224C-3061-5E2E-8F49-ACCAA0AA8667}"/>
               </a:ext>
             </a:extLst>
           </p:cNvPr>
@@ -2441,7 +2461,7 @@
     </p:spTree>
     <p:extLst>
       <p:ext uri="{BB962C8B-B14F-4D97-AF65-F5344CB8AC3E}">
-        <p14:creationId xmlns:p14="http://schemas.microsoft.com/office/powerpoint/2010/main" val="790082838"/>
+        <p14:creationId xmlns:p14="http://schemas.microsoft.com/office/powerpoint/2010/main" val="3386216224"/>
       </p:ext>
     </p:extLst>
   </p:cSld>
@@ -2473,7 +2493,7 @@
           <p:cNvPr id="2" name="Title 1">
             <a:extLst>
               <a:ext uri="{FF2B5EF4-FFF2-40B4-BE49-F238E27FC236}">
-                <a16:creationId xmlns:a16="http://schemas.microsoft.com/office/drawing/2014/main" id="{25A7A3FC-54A4-18C1-EFD9-D6299DFB0B44}"/>
+                <a16:creationId xmlns:a16="http://schemas.microsoft.com/office/drawing/2014/main" id="{97153641-18C0-7743-2F4C-F1DA51FA1C44}"/>
               </a:ext>
             </a:extLst>
           </p:cNvPr>
@@ -2510,7 +2530,7 @@
           <p:cNvPr id="3" name="Picture Placeholder 2">
             <a:extLst>
               <a:ext uri="{FF2B5EF4-FFF2-40B4-BE49-F238E27FC236}">
-                <a16:creationId xmlns:a16="http://schemas.microsoft.com/office/drawing/2014/main" id="{4868D531-8E3E-5989-8517-B3B44D0425BD}"/>
+                <a16:creationId xmlns:a16="http://schemas.microsoft.com/office/drawing/2014/main" id="{34598CA1-EF4D-5DD3-D784-8CD9C4511D2C}"/>
               </a:ext>
             </a:extLst>
           </p:cNvPr>
@@ -2577,7 +2597,7 @@
           <p:cNvPr id="4" name="Text Placeholder 3">
             <a:extLst>
               <a:ext uri="{FF2B5EF4-FFF2-40B4-BE49-F238E27FC236}">
-                <a16:creationId xmlns:a16="http://schemas.microsoft.com/office/drawing/2014/main" id="{E1F8AE56-0F8A-AB33-25A9-A13E22B41F27}"/>
+                <a16:creationId xmlns:a16="http://schemas.microsoft.com/office/drawing/2014/main" id="{79E50E4E-143F-1B8B-00BA-FDFFAEA16125}"/>
               </a:ext>
             </a:extLst>
           </p:cNvPr>
@@ -2648,7 +2668,7 @@
           <p:cNvPr id="5" name="Date Placeholder 4">
             <a:extLst>
               <a:ext uri="{FF2B5EF4-FFF2-40B4-BE49-F238E27FC236}">
-                <a16:creationId xmlns:a16="http://schemas.microsoft.com/office/drawing/2014/main" id="{11ADC4D2-7FAA-9262-C240-6A894B901AE6}"/>
+                <a16:creationId xmlns:a16="http://schemas.microsoft.com/office/drawing/2014/main" id="{80EE6DE9-84A4-86A2-3AE3-6C524A919C7C}"/>
               </a:ext>
             </a:extLst>
           </p:cNvPr>
@@ -2666,7 +2686,7 @@
           <a:p>
             <a:fld id="{E807C478-0C71-4427-B4FF-073F9369AC5F}" type="datetimeFigureOut">
               <a:rPr lang="en-US" smtClean="0"/>
-              <a:t>5/13/2024</a:t>
+              <a:t>5/25/2024</a:t>
             </a:fld>
             <a:endParaRPr lang="en-US"/>
           </a:p>
@@ -2677,7 +2697,7 @@
           <p:cNvPr id="6" name="Footer Placeholder 5">
             <a:extLst>
               <a:ext uri="{FF2B5EF4-FFF2-40B4-BE49-F238E27FC236}">
-                <a16:creationId xmlns:a16="http://schemas.microsoft.com/office/drawing/2014/main" id="{B7AFEF6C-9E24-F13D-3F4F-350217E0B0BB}"/>
+                <a16:creationId xmlns:a16="http://schemas.microsoft.com/office/drawing/2014/main" id="{6AA23CF8-978E-4ACD-D139-A37D61C8C041}"/>
               </a:ext>
             </a:extLst>
           </p:cNvPr>
@@ -2702,7 +2722,7 @@
           <p:cNvPr id="7" name="Slide Number Placeholder 6">
             <a:extLst>
               <a:ext uri="{FF2B5EF4-FFF2-40B4-BE49-F238E27FC236}">
-                <a16:creationId xmlns:a16="http://schemas.microsoft.com/office/drawing/2014/main" id="{76367CF3-5499-5B28-4F64-43FF35B365FB}"/>
+                <a16:creationId xmlns:a16="http://schemas.microsoft.com/office/drawing/2014/main" id="{FBC3848F-7E26-6AA9-DEB1-62B3ED95BAE7}"/>
               </a:ext>
             </a:extLst>
           </p:cNvPr>
@@ -2729,7 +2749,7 @@
     </p:spTree>
     <p:extLst>
       <p:ext uri="{BB962C8B-B14F-4D97-AF65-F5344CB8AC3E}">
-        <p14:creationId xmlns:p14="http://schemas.microsoft.com/office/powerpoint/2010/main" val="3191587551"/>
+        <p14:creationId xmlns:p14="http://schemas.microsoft.com/office/powerpoint/2010/main" val="2096539634"/>
       </p:ext>
     </p:extLst>
   </p:cSld>
@@ -2766,7 +2786,7 @@
           <p:cNvPr id="2" name="Title Placeholder 1">
             <a:extLst>
               <a:ext uri="{FF2B5EF4-FFF2-40B4-BE49-F238E27FC236}">
-                <a16:creationId xmlns:a16="http://schemas.microsoft.com/office/drawing/2014/main" id="{5CCA4176-0F9E-E1D3-7268-D722C1E166B2}"/>
+                <a16:creationId xmlns:a16="http://schemas.microsoft.com/office/drawing/2014/main" id="{FB100BD7-7947-EE0B-D4BF-2EFA618D0FC8}"/>
               </a:ext>
             </a:extLst>
           </p:cNvPr>
@@ -2804,7 +2824,7 @@
           <p:cNvPr id="3" name="Text Placeholder 2">
             <a:extLst>
               <a:ext uri="{FF2B5EF4-FFF2-40B4-BE49-F238E27FC236}">
-                <a16:creationId xmlns:a16="http://schemas.microsoft.com/office/drawing/2014/main" id="{4D50AF95-782F-ECCC-B5AB-32806EC3665E}"/>
+                <a16:creationId xmlns:a16="http://schemas.microsoft.com/office/drawing/2014/main" id="{020A1F99-0D5E-C052-C9D2-DB29B6A615EB}"/>
               </a:ext>
             </a:extLst>
           </p:cNvPr>
@@ -2871,7 +2891,7 @@
           <p:cNvPr id="4" name="Date Placeholder 3">
             <a:extLst>
               <a:ext uri="{FF2B5EF4-FFF2-40B4-BE49-F238E27FC236}">
-                <a16:creationId xmlns:a16="http://schemas.microsoft.com/office/drawing/2014/main" id="{D4193EEC-54E4-2703-C712-91E63D70E5F5}"/>
+                <a16:creationId xmlns:a16="http://schemas.microsoft.com/office/drawing/2014/main" id="{3D9437C2-7AEF-20CD-F899-668637D799F9}"/>
               </a:ext>
             </a:extLst>
           </p:cNvPr>
@@ -2907,7 +2927,7 @@
           <a:p>
             <a:fld id="{E807C478-0C71-4427-B4FF-073F9369AC5F}" type="datetimeFigureOut">
               <a:rPr lang="en-US" smtClean="0"/>
-              <a:t>5/13/2024</a:t>
+              <a:t>5/25/2024</a:t>
             </a:fld>
             <a:endParaRPr lang="en-US"/>
           </a:p>
@@ -2918,7 +2938,7 @@
           <p:cNvPr id="5" name="Footer Placeholder 4">
             <a:extLst>
               <a:ext uri="{FF2B5EF4-FFF2-40B4-BE49-F238E27FC236}">
-                <a16:creationId xmlns:a16="http://schemas.microsoft.com/office/drawing/2014/main" id="{FF72D75B-A893-4CA8-D222-CED4FB47975F}"/>
+                <a16:creationId xmlns:a16="http://schemas.microsoft.com/office/drawing/2014/main" id="{E876DB78-0B76-2181-F1A0-4E4C8D22819D}"/>
               </a:ext>
             </a:extLst>
           </p:cNvPr>
@@ -2961,7 +2981,7 @@
           <p:cNvPr id="6" name="Slide Number Placeholder 5">
             <a:extLst>
               <a:ext uri="{FF2B5EF4-FFF2-40B4-BE49-F238E27FC236}">
-                <a16:creationId xmlns:a16="http://schemas.microsoft.com/office/drawing/2014/main" id="{54AF0205-A447-A44B-3BC9-A0AC46322B23}"/>
+                <a16:creationId xmlns:a16="http://schemas.microsoft.com/office/drawing/2014/main" id="{EBC4A0D3-7EDB-ED73-79B5-0DF423138C35}"/>
               </a:ext>
             </a:extLst>
           </p:cNvPr>
@@ -3006,23 +3026,23 @@
     </p:spTree>
     <p:extLst>
       <p:ext uri="{BB962C8B-B14F-4D97-AF65-F5344CB8AC3E}">
-        <p14:creationId xmlns:p14="http://schemas.microsoft.com/office/powerpoint/2010/main" val="3495356404"/>
+        <p14:creationId xmlns:p14="http://schemas.microsoft.com/office/powerpoint/2010/main" val="1357522637"/>
       </p:ext>
     </p:extLst>
   </p:cSld>
   <p:clrMap bg1="lt1" tx1="dk1" bg2="lt2" tx2="dk2" accent1="accent1" accent2="accent2" accent3="accent3" accent4="accent4" accent5="accent5" accent6="accent6" hlink="hlink" folHlink="folHlink"/>
   <p:sldLayoutIdLst>
-    <p:sldLayoutId id="2147483649" r:id="rId1"/>
-    <p:sldLayoutId id="2147483650" r:id="rId2"/>
-    <p:sldLayoutId id="2147483651" r:id="rId3"/>
-    <p:sldLayoutId id="2147483652" r:id="rId4"/>
-    <p:sldLayoutId id="2147483653" r:id="rId5"/>
-    <p:sldLayoutId id="2147483654" r:id="rId6"/>
-    <p:sldLayoutId id="2147483655" r:id="rId7"/>
-    <p:sldLayoutId id="2147483656" r:id="rId8"/>
-    <p:sldLayoutId id="2147483657" r:id="rId9"/>
-    <p:sldLayoutId id="2147483658" r:id="rId10"/>
-    <p:sldLayoutId id="2147483659" r:id="rId11"/>
+    <p:sldLayoutId id="2147483661" r:id="rId1"/>
+    <p:sldLayoutId id="2147483662" r:id="rId2"/>
+    <p:sldLayoutId id="2147483663" r:id="rId3"/>
+    <p:sldLayoutId id="2147483664" r:id="rId4"/>
+    <p:sldLayoutId id="2147483665" r:id="rId5"/>
+    <p:sldLayoutId id="2147483666" r:id="rId6"/>
+    <p:sldLayoutId id="2147483667" r:id="rId7"/>
+    <p:sldLayoutId id="2147483668" r:id="rId8"/>
+    <p:sldLayoutId id="2147483669" r:id="rId9"/>
+    <p:sldLayoutId id="2147483670" r:id="rId10"/>
+    <p:sldLayoutId id="2147483671" r:id="rId11"/>
   </p:sldLayoutIdLst>
   <p:txStyles>
     <p:titleStyle>
@@ -3347,7 +3367,7 @@
           <a:p>
             <a:r>
               <a:rPr lang="en-US" dirty="0"/>
-              <a:t>Virtual Synthesizer in C++</a:t>
+              <a:t>Virtual Synthesizer Development in C++</a:t>
             </a:r>
           </a:p>
         </p:txBody>
@@ -3384,6 +3404,1157 @@
     <p:extLst>
       <p:ext uri="{BB962C8B-B14F-4D97-AF65-F5344CB8AC3E}">
         <p14:creationId xmlns:p14="http://schemas.microsoft.com/office/powerpoint/2010/main" val="3640343224"/>
+      </p:ext>
+    </p:extLst>
+  </p:cSld>
+  <p:clrMapOvr>
+    <a:masterClrMapping/>
+  </p:clrMapOvr>
+</p:sld>
+</file>
+
+<file path=ppt/slides/slide10.xml><?xml version="1.0" encoding="utf-8"?>
+<p:sld xmlns:a="http://schemas.openxmlformats.org/drawingml/2006/main" xmlns:r="http://schemas.openxmlformats.org/officeDocument/2006/relationships" xmlns:p="http://schemas.openxmlformats.org/presentationml/2006/main">
+  <p:cSld>
+    <p:spTree>
+      <p:nvGrpSpPr>
+        <p:cNvPr id="1" name=""/>
+        <p:cNvGrpSpPr/>
+        <p:nvPr/>
+      </p:nvGrpSpPr>
+      <p:grpSpPr>
+        <a:xfrm>
+          <a:off x="0" y="0"/>
+          <a:ext cx="0" cy="0"/>
+          <a:chOff x="0" y="0"/>
+          <a:chExt cx="0" cy="0"/>
+        </a:xfrm>
+      </p:grpSpPr>
+      <p:sp>
+        <p:nvSpPr>
+          <p:cNvPr id="2" name="Title 1">
+            <a:extLst>
+              <a:ext uri="{FF2B5EF4-FFF2-40B4-BE49-F238E27FC236}">
+                <a16:creationId xmlns:a16="http://schemas.microsoft.com/office/drawing/2014/main" id="{F68996C3-5724-6079-55B7-CDF2D808441A}"/>
+              </a:ext>
+            </a:extLst>
+          </p:cNvPr>
+          <p:cNvSpPr>
+            <a:spLocks noGrp="1"/>
+          </p:cNvSpPr>
+          <p:nvPr>
+            <p:ph type="title"/>
+          </p:nvPr>
+        </p:nvSpPr>
+        <p:spPr/>
+        <p:txBody>
+          <a:bodyPr/>
+          <a:lstStyle/>
+          <a:p>
+            <a:r>
+              <a:rPr lang="en-US" dirty="0"/>
+              <a:t>Reason 2 – Computers are good</a:t>
+            </a:r>
+          </a:p>
+        </p:txBody>
+      </p:sp>
+      <p:sp>
+        <p:nvSpPr>
+          <p:cNvPr id="3" name="Content Placeholder 2">
+            <a:extLst>
+              <a:ext uri="{FF2B5EF4-FFF2-40B4-BE49-F238E27FC236}">
+                <a16:creationId xmlns:a16="http://schemas.microsoft.com/office/drawing/2014/main" id="{B0B10FF8-98D8-2002-C37F-DC7721DB6145}"/>
+              </a:ext>
+            </a:extLst>
+          </p:cNvPr>
+          <p:cNvSpPr>
+            <a:spLocks noGrp="1"/>
+          </p:cNvSpPr>
+          <p:nvPr>
+            <p:ph idx="1"/>
+          </p:nvPr>
+        </p:nvSpPr>
+        <p:spPr/>
+        <p:txBody>
+          <a:bodyPr/>
+          <a:lstStyle/>
+          <a:p>
+            <a:r>
+              <a:rPr lang="en-US" dirty="0"/>
+              <a:t>Realistically, it is </a:t>
+            </a:r>
+            <a:r>
+              <a:rPr lang="en-US" i="1" dirty="0"/>
+              <a:t>difficult</a:t>
+            </a:r>
+            <a:r>
+              <a:rPr lang="en-US" dirty="0"/>
+              <a:t> to reach the threshold at which unwanted audio artifacts occur.</a:t>
+            </a:r>
+          </a:p>
+          <a:p>
+            <a:pPr lvl="1"/>
+            <a:r>
+              <a:rPr lang="en-US" dirty="0"/>
+              <a:t>(Maintaining good conventions, that is).</a:t>
+            </a:r>
+          </a:p>
+        </p:txBody>
+      </p:sp>
+    </p:spTree>
+    <p:extLst>
+      <p:ext uri="{BB962C8B-B14F-4D97-AF65-F5344CB8AC3E}">
+        <p14:creationId xmlns:p14="http://schemas.microsoft.com/office/powerpoint/2010/main" val="1822269553"/>
+      </p:ext>
+    </p:extLst>
+  </p:cSld>
+  <p:clrMapOvr>
+    <a:masterClrMapping/>
+  </p:clrMapOvr>
+</p:sld>
+</file>
+
+<file path=ppt/slides/slide11.xml><?xml version="1.0" encoding="utf-8"?>
+<p:sld xmlns:a="http://schemas.openxmlformats.org/drawingml/2006/main" xmlns:r="http://schemas.openxmlformats.org/officeDocument/2006/relationships" xmlns:p="http://schemas.openxmlformats.org/presentationml/2006/main">
+  <p:cSld>
+    <p:spTree>
+      <p:nvGrpSpPr>
+        <p:cNvPr id="1" name=""/>
+        <p:cNvGrpSpPr/>
+        <p:nvPr/>
+      </p:nvGrpSpPr>
+      <p:grpSpPr>
+        <a:xfrm>
+          <a:off x="0" y="0"/>
+          <a:ext cx="0" cy="0"/>
+          <a:chOff x="0" y="0"/>
+          <a:chExt cx="0" cy="0"/>
+        </a:xfrm>
+      </p:grpSpPr>
+      <p:sp>
+        <p:nvSpPr>
+          <p:cNvPr id="2" name="Title 1">
+            <a:extLst>
+              <a:ext uri="{FF2B5EF4-FFF2-40B4-BE49-F238E27FC236}">
+                <a16:creationId xmlns:a16="http://schemas.microsoft.com/office/drawing/2014/main" id="{839E7B33-D4E5-2EFE-0549-923AE2592533}"/>
+              </a:ext>
+            </a:extLst>
+          </p:cNvPr>
+          <p:cNvSpPr>
+            <a:spLocks noGrp="1"/>
+          </p:cNvSpPr>
+          <p:nvPr>
+            <p:ph type="title"/>
+          </p:nvPr>
+        </p:nvSpPr>
+        <p:spPr/>
+        <p:txBody>
+          <a:bodyPr/>
+          <a:lstStyle/>
+          <a:p>
+            <a:pPr algn="ctr"/>
+            <a:r>
+              <a:rPr lang="en-US" dirty="0"/>
+              <a:t>Part 2 – Practical Application</a:t>
+            </a:r>
+          </a:p>
+        </p:txBody>
+      </p:sp>
+      <p:sp>
+        <p:nvSpPr>
+          <p:cNvPr id="3" name="Content Placeholder 2">
+            <a:extLst>
+              <a:ext uri="{FF2B5EF4-FFF2-40B4-BE49-F238E27FC236}">
+                <a16:creationId xmlns:a16="http://schemas.microsoft.com/office/drawing/2014/main" id="{52FE4D25-564A-0135-F376-2ABCBAC74974}"/>
+              </a:ext>
+            </a:extLst>
+          </p:cNvPr>
+          <p:cNvSpPr>
+            <a:spLocks noGrp="1"/>
+          </p:cNvSpPr>
+          <p:nvPr>
+            <p:ph idx="1"/>
+          </p:nvPr>
+        </p:nvSpPr>
+        <p:spPr/>
+        <p:txBody>
+          <a:bodyPr/>
+          <a:lstStyle/>
+          <a:p>
+            <a:r>
+              <a:rPr lang="en-US" dirty="0"/>
+              <a:t>How are VST programs generally structured?</a:t>
+            </a:r>
+          </a:p>
+          <a:p>
+            <a:r>
+              <a:rPr lang="en-US" dirty="0"/>
+              <a:t>How do we obtain MIDI input?</a:t>
+            </a:r>
+          </a:p>
+          <a:p>
+            <a:r>
+              <a:rPr lang="en-US" dirty="0"/>
+              <a:t>How do we create basic waveforms?</a:t>
+            </a:r>
+          </a:p>
+          <a:p>
+            <a:endParaRPr lang="en-US" dirty="0"/>
+          </a:p>
+        </p:txBody>
+      </p:sp>
+    </p:spTree>
+    <p:extLst>
+      <p:ext uri="{BB962C8B-B14F-4D97-AF65-F5344CB8AC3E}">
+        <p14:creationId xmlns:p14="http://schemas.microsoft.com/office/powerpoint/2010/main" val="2732180309"/>
+      </p:ext>
+    </p:extLst>
+  </p:cSld>
+  <p:clrMapOvr>
+    <a:masterClrMapping/>
+  </p:clrMapOvr>
+</p:sld>
+</file>
+
+<file path=ppt/slides/slide12.xml><?xml version="1.0" encoding="utf-8"?>
+<p:sld xmlns:a="http://schemas.openxmlformats.org/drawingml/2006/main" xmlns:r="http://schemas.openxmlformats.org/officeDocument/2006/relationships" xmlns:p="http://schemas.openxmlformats.org/presentationml/2006/main">
+  <p:cSld>
+    <p:spTree>
+      <p:nvGrpSpPr>
+        <p:cNvPr id="1" name=""/>
+        <p:cNvGrpSpPr/>
+        <p:nvPr/>
+      </p:nvGrpSpPr>
+      <p:grpSpPr>
+        <a:xfrm>
+          <a:off x="0" y="0"/>
+          <a:ext cx="0" cy="0"/>
+          <a:chOff x="0" y="0"/>
+          <a:chExt cx="0" cy="0"/>
+        </a:xfrm>
+      </p:grpSpPr>
+      <p:sp>
+        <p:nvSpPr>
+          <p:cNvPr id="2" name="Title 1">
+            <a:extLst>
+              <a:ext uri="{FF2B5EF4-FFF2-40B4-BE49-F238E27FC236}">
+                <a16:creationId xmlns:a16="http://schemas.microsoft.com/office/drawing/2014/main" id="{728DC00F-2FBB-549C-2793-3E4E9BB87AB6}"/>
+              </a:ext>
+            </a:extLst>
+          </p:cNvPr>
+          <p:cNvSpPr>
+            <a:spLocks noGrp="1"/>
+          </p:cNvSpPr>
+          <p:nvPr>
+            <p:ph type="title"/>
+          </p:nvPr>
+        </p:nvSpPr>
+        <p:spPr/>
+        <p:txBody>
+          <a:bodyPr/>
+          <a:lstStyle/>
+          <a:p>
+            <a:r>
+              <a:rPr lang="en-US" dirty="0"/>
+              <a:t>Structure</a:t>
+            </a:r>
+          </a:p>
+        </p:txBody>
+      </p:sp>
+      <p:sp>
+        <p:nvSpPr>
+          <p:cNvPr id="3" name="Content Placeholder 2">
+            <a:extLst>
+              <a:ext uri="{FF2B5EF4-FFF2-40B4-BE49-F238E27FC236}">
+                <a16:creationId xmlns:a16="http://schemas.microsoft.com/office/drawing/2014/main" id="{71433AF9-59D5-B1B0-B5D7-28F3B0F95FE5}"/>
+              </a:ext>
+            </a:extLst>
+          </p:cNvPr>
+          <p:cNvSpPr>
+            <a:spLocks noGrp="1"/>
+          </p:cNvSpPr>
+          <p:nvPr>
+            <p:ph idx="1"/>
+          </p:nvPr>
+        </p:nvSpPr>
+        <p:spPr/>
+        <p:txBody>
+          <a:bodyPr/>
+          <a:lstStyle/>
+          <a:p>
+            <a:r>
+              <a:rPr lang="en-US" dirty="0"/>
+              <a:t>Plugins are typically composed of three components:</a:t>
+            </a:r>
+          </a:p>
+          <a:p>
+            <a:pPr lvl="1"/>
+            <a:r>
+              <a:rPr lang="en-US" dirty="0"/>
+              <a:t>A plugin controller file (myplugincontroller.cpp)</a:t>
+            </a:r>
+          </a:p>
+          <a:p>
+            <a:pPr lvl="1"/>
+            <a:r>
+              <a:rPr lang="en-US" dirty="0"/>
+              <a:t>A plugin processor file (mypluginprocessor.cpp)</a:t>
+            </a:r>
+          </a:p>
+          <a:p>
+            <a:pPr lvl="1"/>
+            <a:r>
+              <a:rPr lang="en-US" dirty="0"/>
+              <a:t>A plugin entry file (mypluginentry.cpp)</a:t>
+            </a:r>
+          </a:p>
+          <a:p>
+            <a:r>
+              <a:rPr lang="en-US" dirty="0"/>
+              <a:t>[].</a:t>
+            </a:r>
+          </a:p>
+          <a:p>
+            <a:endParaRPr lang="en-US" dirty="0"/>
+          </a:p>
+        </p:txBody>
+      </p:sp>
+    </p:spTree>
+    <p:extLst>
+      <p:ext uri="{BB962C8B-B14F-4D97-AF65-F5344CB8AC3E}">
+        <p14:creationId xmlns:p14="http://schemas.microsoft.com/office/powerpoint/2010/main" val="2733528102"/>
+      </p:ext>
+    </p:extLst>
+  </p:cSld>
+  <p:clrMapOvr>
+    <a:masterClrMapping/>
+  </p:clrMapOvr>
+</p:sld>
+</file>
+
+<file path=ppt/slides/slide13.xml><?xml version="1.0" encoding="utf-8"?>
+<p:sld xmlns:a="http://schemas.openxmlformats.org/drawingml/2006/main" xmlns:r="http://schemas.openxmlformats.org/officeDocument/2006/relationships" xmlns:p="http://schemas.openxmlformats.org/presentationml/2006/main">
+  <p:cSld>
+    <p:bg>
+      <p:bgPr>
+        <a:solidFill>
+          <a:schemeClr val="bg1"/>
+        </a:solidFill>
+        <a:effectLst/>
+      </p:bgPr>
+    </p:bg>
+    <p:spTree>
+      <p:nvGrpSpPr>
+        <p:cNvPr id="1" name=""/>
+        <p:cNvGrpSpPr/>
+        <p:nvPr/>
+      </p:nvGrpSpPr>
+      <p:grpSpPr>
+        <a:xfrm>
+          <a:off x="0" y="0"/>
+          <a:ext cx="0" cy="0"/>
+          <a:chOff x="0" y="0"/>
+          <a:chExt cx="0" cy="0"/>
+        </a:xfrm>
+      </p:grpSpPr>
+      <p:sp>
+        <p:nvSpPr>
+          <p:cNvPr id="2" name="Title 1">
+            <a:extLst>
+              <a:ext uri="{FF2B5EF4-FFF2-40B4-BE49-F238E27FC236}">
+                <a16:creationId xmlns:a16="http://schemas.microsoft.com/office/drawing/2014/main" id="{1825EBF1-C504-9C69-E779-356F80DA0C8A}"/>
+              </a:ext>
+            </a:extLst>
+          </p:cNvPr>
+          <p:cNvSpPr>
+            <a:spLocks noGrp="1"/>
+          </p:cNvSpPr>
+          <p:nvPr>
+            <p:ph type="title"/>
+          </p:nvPr>
+        </p:nvSpPr>
+        <p:spPr>
+          <a:xfrm>
+            <a:off x="876693" y="741391"/>
+            <a:ext cx="3953724" cy="1616203"/>
+          </a:xfrm>
+        </p:spPr>
+        <p:txBody>
+          <a:bodyPr anchor="b">
+            <a:normAutofit/>
+          </a:bodyPr>
+          <a:lstStyle/>
+          <a:p>
+            <a:r>
+              <a:rPr lang="en-US" sz="3200" dirty="0"/>
+              <a:t>Obtaining MIDI Input</a:t>
+            </a:r>
+          </a:p>
+        </p:txBody>
+      </p:sp>
+      <p:sp>
+        <p:nvSpPr>
+          <p:cNvPr id="3" name="Content Placeholder 2">
+            <a:extLst>
+              <a:ext uri="{FF2B5EF4-FFF2-40B4-BE49-F238E27FC236}">
+                <a16:creationId xmlns:a16="http://schemas.microsoft.com/office/drawing/2014/main" id="{2F633204-4E0C-8973-5DA7-A5AE873E06CD}"/>
+              </a:ext>
+            </a:extLst>
+          </p:cNvPr>
+          <p:cNvSpPr>
+            <a:spLocks noGrp="1"/>
+          </p:cNvSpPr>
+          <p:nvPr>
+            <p:ph idx="1"/>
+          </p:nvPr>
+        </p:nvSpPr>
+        <p:spPr>
+          <a:xfrm>
+            <a:off x="876693" y="2533476"/>
+            <a:ext cx="5305446" cy="3447832"/>
+          </a:xfrm>
+        </p:spPr>
+        <p:txBody>
+          <a:bodyPr anchor="t">
+            <a:normAutofit/>
+          </a:bodyPr>
+          <a:lstStyle/>
+          <a:p>
+            <a:r>
+              <a:rPr lang="en-US" sz="2000" dirty="0"/>
+              <a:t>The </a:t>
+            </a:r>
+            <a:r>
+              <a:rPr lang="en-US" sz="2000" i="1" dirty="0"/>
+              <a:t>Steinberg::</a:t>
+            </a:r>
+            <a:r>
+              <a:rPr lang="en-US" sz="2000" i="1" dirty="0" err="1"/>
+              <a:t>Vst</a:t>
+            </a:r>
+            <a:r>
+              <a:rPr lang="en-US" sz="2000" i="1" dirty="0"/>
+              <a:t> </a:t>
+            </a:r>
+            <a:r>
+              <a:rPr lang="en-US" sz="2000" dirty="0"/>
+              <a:t>namespace contains a </a:t>
+            </a:r>
+            <a:r>
+              <a:rPr lang="en-US" sz="2000" i="1" dirty="0" err="1"/>
+              <a:t>IEventList</a:t>
+            </a:r>
+            <a:r>
+              <a:rPr lang="en-US" sz="2000" dirty="0"/>
+              <a:t> class which processes “events” (i.e. signals).</a:t>
+            </a:r>
+          </a:p>
+          <a:p>
+            <a:r>
+              <a:rPr lang="en-US" sz="2000" dirty="0"/>
+              <a:t>The provided MIDI note found in </a:t>
+            </a:r>
+            <a:r>
+              <a:rPr lang="en-US" sz="2000" i="1" dirty="0" err="1"/>
+              <a:t>event.noteOn.pitch</a:t>
+            </a:r>
+            <a:r>
+              <a:rPr lang="en-US" sz="2000" dirty="0"/>
+              <a:t> is used to calculate </a:t>
+            </a:r>
+            <a:r>
+              <a:rPr lang="en-US" sz="2000" dirty="0" err="1"/>
+              <a:t>fFrequency</a:t>
+            </a:r>
+            <a:r>
+              <a:rPr lang="en-US" sz="2000" dirty="0"/>
+              <a:t> in relation to a particular reference note (A4 </a:t>
+            </a:r>
+            <a:r>
+              <a:rPr lang="en-US" sz="2000" dirty="0">
+                <a:sym typeface="Wingdings" panose="05000000000000000000" pitchFamily="2" charset="2"/>
+              </a:rPr>
+              <a:t></a:t>
+            </a:r>
+            <a:r>
+              <a:rPr lang="en-US" sz="2000" dirty="0"/>
+              <a:t> 440 Hz, MIDI # 69).  </a:t>
+            </a:r>
+          </a:p>
+          <a:p>
+            <a:endParaRPr lang="en-US" sz="2000" dirty="0"/>
+          </a:p>
+        </p:txBody>
+      </p:sp>
+      <p:pic>
+        <p:nvPicPr>
+          <p:cNvPr id="5" name="Picture 4">
+            <a:extLst>
+              <a:ext uri="{FF2B5EF4-FFF2-40B4-BE49-F238E27FC236}">
+                <a16:creationId xmlns:a16="http://schemas.microsoft.com/office/drawing/2014/main" id="{A8392CE2-8505-83CF-25B1-ED431B57279E}"/>
+              </a:ext>
+            </a:extLst>
+          </p:cNvPr>
+          <p:cNvPicPr>
+            <a:picLocks noChangeAspect="1"/>
+          </p:cNvPicPr>
+          <p:nvPr/>
+        </p:nvPicPr>
+        <p:blipFill>
+          <a:blip r:embed="rId2"/>
+          <a:stretch>
+            <a:fillRect/>
+          </a:stretch>
+        </p:blipFill>
+        <p:spPr>
+          <a:xfrm>
+            <a:off x="6475260" y="1991016"/>
+            <a:ext cx="5100539" cy="3073074"/>
+          </a:xfrm>
+          <a:prstGeom prst="rect">
+            <a:avLst/>
+          </a:prstGeom>
+        </p:spPr>
+      </p:pic>
+    </p:spTree>
+    <p:extLst>
+      <p:ext uri="{BB962C8B-B14F-4D97-AF65-F5344CB8AC3E}">
+        <p14:creationId xmlns:p14="http://schemas.microsoft.com/office/powerpoint/2010/main" val="885847856"/>
+      </p:ext>
+    </p:extLst>
+  </p:cSld>
+  <p:clrMapOvr>
+    <a:masterClrMapping/>
+  </p:clrMapOvr>
+</p:sld>
+</file>
+
+<file path=ppt/slides/slide14.xml><?xml version="1.0" encoding="utf-8"?>
+<p:sld xmlns:a="http://schemas.openxmlformats.org/drawingml/2006/main" xmlns:r="http://schemas.openxmlformats.org/officeDocument/2006/relationships" xmlns:p="http://schemas.openxmlformats.org/presentationml/2006/main">
+  <p:cSld>
+    <p:bg>
+      <p:bgPr>
+        <a:solidFill>
+          <a:schemeClr val="bg1"/>
+        </a:solidFill>
+        <a:effectLst/>
+      </p:bgPr>
+    </p:bg>
+    <p:spTree>
+      <p:nvGrpSpPr>
+        <p:cNvPr id="1" name=""/>
+        <p:cNvGrpSpPr/>
+        <p:nvPr/>
+      </p:nvGrpSpPr>
+      <p:grpSpPr>
+        <a:xfrm>
+          <a:off x="0" y="0"/>
+          <a:ext cx="0" cy="0"/>
+          <a:chOff x="0" y="0"/>
+          <a:chExt cx="0" cy="0"/>
+        </a:xfrm>
+      </p:grpSpPr>
+      <p:sp>
+        <p:nvSpPr>
+          <p:cNvPr id="2" name="Title 1">
+            <a:extLst>
+              <a:ext uri="{FF2B5EF4-FFF2-40B4-BE49-F238E27FC236}">
+                <a16:creationId xmlns:a16="http://schemas.microsoft.com/office/drawing/2014/main" id="{0549F25A-E0A9-245C-15C8-B14447F53BBA}"/>
+              </a:ext>
+            </a:extLst>
+          </p:cNvPr>
+          <p:cNvSpPr>
+            <a:spLocks noGrp="1"/>
+          </p:cNvSpPr>
+          <p:nvPr>
+            <p:ph type="title"/>
+          </p:nvPr>
+        </p:nvSpPr>
+        <p:spPr>
+          <a:xfrm>
+            <a:off x="876693" y="741391"/>
+            <a:ext cx="5007272" cy="1616203"/>
+          </a:xfrm>
+        </p:spPr>
+        <p:txBody>
+          <a:bodyPr anchor="b">
+            <a:normAutofit/>
+          </a:bodyPr>
+          <a:lstStyle/>
+          <a:p>
+            <a:r>
+              <a:rPr lang="en-US" sz="3200" dirty="0"/>
+              <a:t>Obtaining MIDI Input (cont.)</a:t>
+            </a:r>
+          </a:p>
+        </p:txBody>
+      </p:sp>
+      <p:sp>
+        <p:nvSpPr>
+          <p:cNvPr id="3" name="Content Placeholder 2">
+            <a:extLst>
+              <a:ext uri="{FF2B5EF4-FFF2-40B4-BE49-F238E27FC236}">
+                <a16:creationId xmlns:a16="http://schemas.microsoft.com/office/drawing/2014/main" id="{FAD477CA-633A-1D84-27CD-8B9038E05295}"/>
+              </a:ext>
+            </a:extLst>
+          </p:cNvPr>
+          <p:cNvSpPr>
+            <a:spLocks noGrp="1"/>
+          </p:cNvSpPr>
+          <p:nvPr>
+            <p:ph idx="1"/>
+          </p:nvPr>
+        </p:nvSpPr>
+        <p:spPr>
+          <a:xfrm>
+            <a:off x="876693" y="2533476"/>
+            <a:ext cx="5091585" cy="3447832"/>
+          </a:xfrm>
+        </p:spPr>
+        <p:txBody>
+          <a:bodyPr anchor="t">
+            <a:normAutofit/>
+          </a:bodyPr>
+          <a:lstStyle/>
+          <a:p>
+            <a:r>
+              <a:rPr lang="en-US" sz="2000" dirty="0"/>
+              <a:t>Notes lower than our reference pitch will generate a power of 2 to a negative exponent (!)</a:t>
+            </a:r>
+          </a:p>
+          <a:p>
+            <a:r>
+              <a:rPr lang="en-US" sz="2000" dirty="0"/>
+              <a:t>This is expected as the resulting frequency will be </a:t>
+            </a:r>
+            <a:r>
+              <a:rPr lang="en-US" sz="2000" i="1" dirty="0"/>
+              <a:t>lower</a:t>
+            </a:r>
+            <a:r>
+              <a:rPr lang="en-US" sz="2000" dirty="0"/>
+              <a:t> than our reference pitch when multiplied.</a:t>
+            </a:r>
+          </a:p>
+        </p:txBody>
+      </p:sp>
+      <p:pic>
+        <p:nvPicPr>
+          <p:cNvPr id="5" name="Picture 4">
+            <a:extLst>
+              <a:ext uri="{FF2B5EF4-FFF2-40B4-BE49-F238E27FC236}">
+                <a16:creationId xmlns:a16="http://schemas.microsoft.com/office/drawing/2014/main" id="{6786EC1A-0FE5-42C0-3BC5-9F37E6308CD6}"/>
+              </a:ext>
+            </a:extLst>
+          </p:cNvPr>
+          <p:cNvPicPr>
+            <a:picLocks noChangeAspect="1"/>
+          </p:cNvPicPr>
+          <p:nvPr/>
+        </p:nvPicPr>
+        <p:blipFill>
+          <a:blip r:embed="rId2"/>
+          <a:stretch>
+            <a:fillRect/>
+          </a:stretch>
+        </p:blipFill>
+        <p:spPr>
+          <a:xfrm>
+            <a:off x="6223723" y="741391"/>
+            <a:ext cx="3917244" cy="5384528"/>
+          </a:xfrm>
+          <a:prstGeom prst="rect">
+            <a:avLst/>
+          </a:prstGeom>
+        </p:spPr>
+      </p:pic>
+    </p:spTree>
+    <p:extLst>
+      <p:ext uri="{BB962C8B-B14F-4D97-AF65-F5344CB8AC3E}">
+        <p14:creationId xmlns:p14="http://schemas.microsoft.com/office/powerpoint/2010/main" val="1148323293"/>
+      </p:ext>
+    </p:extLst>
+  </p:cSld>
+  <p:clrMapOvr>
+    <a:masterClrMapping/>
+  </p:clrMapOvr>
+</p:sld>
+</file>
+
+<file path=ppt/slides/slide15.xml><?xml version="1.0" encoding="utf-8"?>
+<p:sld xmlns:a="http://schemas.openxmlformats.org/drawingml/2006/main" xmlns:r="http://schemas.openxmlformats.org/officeDocument/2006/relationships" xmlns:p="http://schemas.openxmlformats.org/presentationml/2006/main">
+  <p:cSld>
+    <p:bg>
+      <p:bgPr>
+        <a:solidFill>
+          <a:schemeClr val="bg1"/>
+        </a:solidFill>
+        <a:effectLst/>
+      </p:bgPr>
+    </p:bg>
+    <p:spTree>
+      <p:nvGrpSpPr>
+        <p:cNvPr id="1" name=""/>
+        <p:cNvGrpSpPr/>
+        <p:nvPr/>
+      </p:nvGrpSpPr>
+      <p:grpSpPr>
+        <a:xfrm>
+          <a:off x="0" y="0"/>
+          <a:ext cx="0" cy="0"/>
+          <a:chOff x="0" y="0"/>
+          <a:chExt cx="0" cy="0"/>
+        </a:xfrm>
+      </p:grpSpPr>
+      <p:sp>
+        <p:nvSpPr>
+          <p:cNvPr id="2" name="Title 1">
+            <a:extLst>
+              <a:ext uri="{FF2B5EF4-FFF2-40B4-BE49-F238E27FC236}">
+                <a16:creationId xmlns:a16="http://schemas.microsoft.com/office/drawing/2014/main" id="{2431C675-1136-12AB-81FB-2994DE909889}"/>
+              </a:ext>
+            </a:extLst>
+          </p:cNvPr>
+          <p:cNvSpPr>
+            <a:spLocks noGrp="1"/>
+          </p:cNvSpPr>
+          <p:nvPr>
+            <p:ph type="title"/>
+          </p:nvPr>
+        </p:nvSpPr>
+        <p:spPr>
+          <a:xfrm>
+            <a:off x="876693" y="741391"/>
+            <a:ext cx="5007272" cy="1616203"/>
+          </a:xfrm>
+        </p:spPr>
+        <p:txBody>
+          <a:bodyPr anchor="b">
+            <a:normAutofit/>
+          </a:bodyPr>
+          <a:lstStyle/>
+          <a:p>
+            <a:r>
+              <a:rPr lang="en-US" sz="3200" dirty="0"/>
+              <a:t>Creating Waveforms in Code</a:t>
+            </a:r>
+          </a:p>
+        </p:txBody>
+      </p:sp>
+      <p:sp>
+        <p:nvSpPr>
+          <p:cNvPr id="3" name="Content Placeholder 2">
+            <a:extLst>
+              <a:ext uri="{FF2B5EF4-FFF2-40B4-BE49-F238E27FC236}">
+                <a16:creationId xmlns:a16="http://schemas.microsoft.com/office/drawing/2014/main" id="{680D7EDB-0040-65D8-6548-406ED35DAFA0}"/>
+              </a:ext>
+            </a:extLst>
+          </p:cNvPr>
+          <p:cNvSpPr>
+            <a:spLocks noGrp="1"/>
+          </p:cNvSpPr>
+          <p:nvPr>
+            <p:ph idx="1"/>
+          </p:nvPr>
+        </p:nvSpPr>
+        <p:spPr>
+          <a:xfrm>
+            <a:off x="876693" y="2533476"/>
+            <a:ext cx="4709098" cy="3447832"/>
+          </a:xfrm>
+        </p:spPr>
+        <p:txBody>
+          <a:bodyPr anchor="t">
+            <a:normAutofit/>
+          </a:bodyPr>
+          <a:lstStyle/>
+          <a:p>
+            <a:r>
+              <a:rPr lang="en-US" sz="2000" dirty="0"/>
+              <a:t>A for loop is used to iterate through each sample of the current buffer.</a:t>
+            </a:r>
+          </a:p>
+          <a:p>
+            <a:r>
+              <a:rPr lang="en-US" sz="2000" dirty="0"/>
+              <a:t>[].</a:t>
+            </a:r>
+          </a:p>
+        </p:txBody>
+      </p:sp>
+      <p:pic>
+        <p:nvPicPr>
+          <p:cNvPr id="5" name="Picture 4">
+            <a:extLst>
+              <a:ext uri="{FF2B5EF4-FFF2-40B4-BE49-F238E27FC236}">
+                <a16:creationId xmlns:a16="http://schemas.microsoft.com/office/drawing/2014/main" id="{C0C4201D-46E1-3A01-D848-9A58E031A9F3}"/>
+              </a:ext>
+            </a:extLst>
+          </p:cNvPr>
+          <p:cNvPicPr>
+            <a:picLocks noChangeAspect="1"/>
+          </p:cNvPicPr>
+          <p:nvPr/>
+        </p:nvPicPr>
+        <p:blipFill>
+          <a:blip r:embed="rId2"/>
+          <a:stretch>
+            <a:fillRect/>
+          </a:stretch>
+        </p:blipFill>
+        <p:spPr>
+          <a:xfrm>
+            <a:off x="6096000" y="1261953"/>
+            <a:ext cx="5451689" cy="4334093"/>
+          </a:xfrm>
+          <a:prstGeom prst="rect">
+            <a:avLst/>
+          </a:prstGeom>
+        </p:spPr>
+      </p:pic>
+    </p:spTree>
+    <p:extLst>
+      <p:ext uri="{BB962C8B-B14F-4D97-AF65-F5344CB8AC3E}">
+        <p14:creationId xmlns:p14="http://schemas.microsoft.com/office/powerpoint/2010/main" val="554271609"/>
+      </p:ext>
+    </p:extLst>
+  </p:cSld>
+  <p:clrMapOvr>
+    <a:masterClrMapping/>
+  </p:clrMapOvr>
+</p:sld>
+</file>
+
+<file path=ppt/slides/slide16.xml><?xml version="1.0" encoding="utf-8"?>
+<p:sld xmlns:a="http://schemas.openxmlformats.org/drawingml/2006/main" xmlns:r="http://schemas.openxmlformats.org/officeDocument/2006/relationships" xmlns:p="http://schemas.openxmlformats.org/presentationml/2006/main">
+  <p:cSld>
+    <p:spTree>
+      <p:nvGrpSpPr>
+        <p:cNvPr id="1" name=""/>
+        <p:cNvGrpSpPr/>
+        <p:nvPr/>
+      </p:nvGrpSpPr>
+      <p:grpSpPr>
+        <a:xfrm>
+          <a:off x="0" y="0"/>
+          <a:ext cx="0" cy="0"/>
+          <a:chOff x="0" y="0"/>
+          <a:chExt cx="0" cy="0"/>
+        </a:xfrm>
+      </p:grpSpPr>
+      <p:sp>
+        <p:nvSpPr>
+          <p:cNvPr id="2" name="Title 1">
+            <a:extLst>
+              <a:ext uri="{FF2B5EF4-FFF2-40B4-BE49-F238E27FC236}">
+                <a16:creationId xmlns:a16="http://schemas.microsoft.com/office/drawing/2014/main" id="{B69F5441-6DF2-9EFF-E7B2-DE006D63911B}"/>
+              </a:ext>
+            </a:extLst>
+          </p:cNvPr>
+          <p:cNvSpPr>
+            <a:spLocks noGrp="1"/>
+          </p:cNvSpPr>
+          <p:nvPr>
+            <p:ph type="title"/>
+          </p:nvPr>
+        </p:nvSpPr>
+        <p:spPr/>
+        <p:txBody>
+          <a:bodyPr/>
+          <a:lstStyle/>
+          <a:p>
+            <a:r>
+              <a:rPr lang="en-US" sz="4400" dirty="0"/>
+              <a:t>Creating Waveforms in Code (cont.)</a:t>
+            </a:r>
+            <a:endParaRPr lang="en-US" dirty="0"/>
+          </a:p>
+        </p:txBody>
+      </p:sp>
+      <p:sp>
+        <p:nvSpPr>
+          <p:cNvPr id="3" name="Content Placeholder 2">
+            <a:extLst>
+              <a:ext uri="{FF2B5EF4-FFF2-40B4-BE49-F238E27FC236}">
+                <a16:creationId xmlns:a16="http://schemas.microsoft.com/office/drawing/2014/main" id="{ECD1317F-E7FD-70E6-501B-7B413BDC9F0D}"/>
+              </a:ext>
+            </a:extLst>
+          </p:cNvPr>
+          <p:cNvSpPr>
+            <a:spLocks noGrp="1"/>
+          </p:cNvSpPr>
+          <p:nvPr>
+            <p:ph idx="1"/>
+          </p:nvPr>
+        </p:nvSpPr>
+        <p:spPr/>
+        <p:txBody>
+          <a:bodyPr/>
+          <a:lstStyle/>
+          <a:p>
+            <a:endParaRPr lang="en-US"/>
+          </a:p>
+        </p:txBody>
+      </p:sp>
+    </p:spTree>
+    <p:extLst>
+      <p:ext uri="{BB962C8B-B14F-4D97-AF65-F5344CB8AC3E}">
+        <p14:creationId xmlns:p14="http://schemas.microsoft.com/office/powerpoint/2010/main" val="3201257500"/>
+      </p:ext>
+    </p:extLst>
+  </p:cSld>
+  <p:clrMapOvr>
+    <a:masterClrMapping/>
+  </p:clrMapOvr>
+</p:sld>
+</file>
+
+<file path=ppt/slides/slide17.xml><?xml version="1.0" encoding="utf-8"?>
+<p:sld xmlns:a="http://schemas.openxmlformats.org/drawingml/2006/main" xmlns:r="http://schemas.openxmlformats.org/officeDocument/2006/relationships" xmlns:p="http://schemas.openxmlformats.org/presentationml/2006/main">
+  <p:cSld>
+    <p:spTree>
+      <p:nvGrpSpPr>
+        <p:cNvPr id="1" name=""/>
+        <p:cNvGrpSpPr/>
+        <p:nvPr/>
+      </p:nvGrpSpPr>
+      <p:grpSpPr>
+        <a:xfrm>
+          <a:off x="0" y="0"/>
+          <a:ext cx="0" cy="0"/>
+          <a:chOff x="0" y="0"/>
+          <a:chExt cx="0" cy="0"/>
+        </a:xfrm>
+      </p:grpSpPr>
+      <p:sp>
+        <p:nvSpPr>
+          <p:cNvPr id="2" name="Title 1">
+            <a:extLst>
+              <a:ext uri="{FF2B5EF4-FFF2-40B4-BE49-F238E27FC236}">
+                <a16:creationId xmlns:a16="http://schemas.microsoft.com/office/drawing/2014/main" id="{54A2530F-D836-A774-F725-90248FC04C87}"/>
+              </a:ext>
+            </a:extLst>
+          </p:cNvPr>
+          <p:cNvSpPr>
+            <a:spLocks noGrp="1"/>
+          </p:cNvSpPr>
+          <p:nvPr>
+            <p:ph type="title"/>
+          </p:nvPr>
+        </p:nvSpPr>
+        <p:spPr/>
+        <p:txBody>
+          <a:bodyPr/>
+          <a:lstStyle/>
+          <a:p>
+            <a:pPr algn="ctr"/>
+            <a:r>
+              <a:rPr lang="en-US" dirty="0"/>
+              <a:t>Part 3 – Program Demo</a:t>
+            </a:r>
+          </a:p>
+        </p:txBody>
+      </p:sp>
+    </p:spTree>
+    <p:extLst>
+      <p:ext uri="{BB962C8B-B14F-4D97-AF65-F5344CB8AC3E}">
+        <p14:creationId xmlns:p14="http://schemas.microsoft.com/office/powerpoint/2010/main" val="3849701593"/>
+      </p:ext>
+    </p:extLst>
+  </p:cSld>
+  <p:clrMapOvr>
+    <a:masterClrMapping/>
+  </p:clrMapOvr>
+</p:sld>
+</file>
+
+<file path=ppt/slides/slide18.xml><?xml version="1.0" encoding="utf-8"?>
+<p:sld xmlns:a="http://schemas.openxmlformats.org/drawingml/2006/main" xmlns:r="http://schemas.openxmlformats.org/officeDocument/2006/relationships" xmlns:p="http://schemas.openxmlformats.org/presentationml/2006/main">
+  <p:cSld>
+    <p:spTree>
+      <p:nvGrpSpPr>
+        <p:cNvPr id="1" name=""/>
+        <p:cNvGrpSpPr/>
+        <p:nvPr/>
+      </p:nvGrpSpPr>
+      <p:grpSpPr>
+        <a:xfrm>
+          <a:off x="0" y="0"/>
+          <a:ext cx="0" cy="0"/>
+          <a:chOff x="0" y="0"/>
+          <a:chExt cx="0" cy="0"/>
+        </a:xfrm>
+      </p:grpSpPr>
+      <p:sp>
+        <p:nvSpPr>
+          <p:cNvPr id="2" name="Title 1">
+            <a:extLst>
+              <a:ext uri="{FF2B5EF4-FFF2-40B4-BE49-F238E27FC236}">
+                <a16:creationId xmlns:a16="http://schemas.microsoft.com/office/drawing/2014/main" id="{DCEA24C1-28A2-6C11-0ED0-A131C138496E}"/>
+              </a:ext>
+            </a:extLst>
+          </p:cNvPr>
+          <p:cNvSpPr>
+            <a:spLocks noGrp="1"/>
+          </p:cNvSpPr>
+          <p:nvPr>
+            <p:ph type="title"/>
+          </p:nvPr>
+        </p:nvSpPr>
+        <p:spPr/>
+        <p:txBody>
+          <a:bodyPr/>
+          <a:lstStyle/>
+          <a:p>
+            <a:r>
+              <a:rPr lang="en-US" dirty="0"/>
+              <a:t>Future Work</a:t>
+            </a:r>
+          </a:p>
+        </p:txBody>
+      </p:sp>
+      <p:sp>
+        <p:nvSpPr>
+          <p:cNvPr id="3" name="Content Placeholder 2">
+            <a:extLst>
+              <a:ext uri="{FF2B5EF4-FFF2-40B4-BE49-F238E27FC236}">
+                <a16:creationId xmlns:a16="http://schemas.microsoft.com/office/drawing/2014/main" id="{585979A7-FD56-F613-2ABB-45879F53D26B}"/>
+              </a:ext>
+            </a:extLst>
+          </p:cNvPr>
+          <p:cNvSpPr>
+            <a:spLocks noGrp="1"/>
+          </p:cNvSpPr>
+          <p:nvPr>
+            <p:ph idx="1"/>
+          </p:nvPr>
+        </p:nvSpPr>
+        <p:spPr/>
+        <p:txBody>
+          <a:bodyPr/>
+          <a:lstStyle/>
+          <a:p>
+            <a:endParaRPr lang="en-US"/>
+          </a:p>
+        </p:txBody>
+      </p:sp>
+    </p:spTree>
+    <p:extLst>
+      <p:ext uri="{BB962C8B-B14F-4D97-AF65-F5344CB8AC3E}">
+        <p14:creationId xmlns:p14="http://schemas.microsoft.com/office/powerpoint/2010/main" val="1165480799"/>
+      </p:ext>
+    </p:extLst>
+  </p:cSld>
+  <p:clrMapOvr>
+    <a:masterClrMapping/>
+  </p:clrMapOvr>
+</p:sld>
+</file>
+
+<file path=ppt/slides/slide19.xml><?xml version="1.0" encoding="utf-8"?>
+<p:sld xmlns:a="http://schemas.openxmlformats.org/drawingml/2006/main" xmlns:r="http://schemas.openxmlformats.org/officeDocument/2006/relationships" xmlns:p="http://schemas.openxmlformats.org/presentationml/2006/main">
+  <p:cSld>
+    <p:spTree>
+      <p:nvGrpSpPr>
+        <p:cNvPr id="1" name=""/>
+        <p:cNvGrpSpPr/>
+        <p:nvPr/>
+      </p:nvGrpSpPr>
+      <p:grpSpPr>
+        <a:xfrm>
+          <a:off x="0" y="0"/>
+          <a:ext cx="0" cy="0"/>
+          <a:chOff x="0" y="0"/>
+          <a:chExt cx="0" cy="0"/>
+        </a:xfrm>
+      </p:grpSpPr>
+      <p:sp>
+        <p:nvSpPr>
+          <p:cNvPr id="2" name="Title 1">
+            <a:extLst>
+              <a:ext uri="{FF2B5EF4-FFF2-40B4-BE49-F238E27FC236}">
+                <a16:creationId xmlns:a16="http://schemas.microsoft.com/office/drawing/2014/main" id="{76E7E526-8BFB-81FA-F14A-E36FC6269F22}"/>
+              </a:ext>
+            </a:extLst>
+          </p:cNvPr>
+          <p:cNvSpPr>
+            <a:spLocks noGrp="1"/>
+          </p:cNvSpPr>
+          <p:nvPr>
+            <p:ph type="title"/>
+          </p:nvPr>
+        </p:nvSpPr>
+        <p:spPr/>
+        <p:txBody>
+          <a:bodyPr/>
+          <a:lstStyle/>
+          <a:p>
+            <a:r>
+              <a:rPr lang="en-US" dirty="0"/>
+              <a:t>Sources:</a:t>
+            </a:r>
+          </a:p>
+        </p:txBody>
+      </p:sp>
+      <p:sp>
+        <p:nvSpPr>
+          <p:cNvPr id="3" name="Content Placeholder 2">
+            <a:extLst>
+              <a:ext uri="{FF2B5EF4-FFF2-40B4-BE49-F238E27FC236}">
+                <a16:creationId xmlns:a16="http://schemas.microsoft.com/office/drawing/2014/main" id="{992C88C2-1B19-8F22-9D81-4B98AF1C088A}"/>
+              </a:ext>
+            </a:extLst>
+          </p:cNvPr>
+          <p:cNvSpPr>
+            <a:spLocks noGrp="1"/>
+          </p:cNvSpPr>
+          <p:nvPr>
+            <p:ph idx="1"/>
+          </p:nvPr>
+        </p:nvSpPr>
+        <p:spPr/>
+        <p:txBody>
+          <a:bodyPr/>
+          <a:lstStyle/>
+          <a:p>
+            <a:r>
+              <a:rPr lang="en-US" dirty="0">
+                <a:hlinkClick r:id="rId2"/>
+              </a:rPr>
+              <a:t>https://www.youtube.com/watch?v=boPEO2auJj4</a:t>
+            </a:r>
+            <a:endParaRPr lang="en-US" dirty="0"/>
+          </a:p>
+          <a:p>
+            <a:r>
+              <a:rPr lang="en-US" dirty="0">
+                <a:hlinkClick r:id="rId3"/>
+              </a:rPr>
+              <a:t>https://www.youtube.com/watch?v=SJXGSJ6Zoro</a:t>
+            </a:r>
+            <a:endParaRPr lang="en-US" dirty="0"/>
+          </a:p>
+          <a:p>
+            <a:r>
+              <a:rPr lang="en-US" dirty="0">
+                <a:hlinkClick r:id="rId4"/>
+              </a:rPr>
+              <a:t>https://newt.phys.unsw.edu.au/jw/notes.html</a:t>
+            </a:r>
+            <a:endParaRPr lang="en-US" dirty="0"/>
+          </a:p>
+          <a:p>
+            <a:endParaRPr lang="en-US" dirty="0"/>
+          </a:p>
+          <a:p>
+            <a:endParaRPr lang="en-US" dirty="0"/>
+          </a:p>
+        </p:txBody>
+      </p:sp>
+    </p:spTree>
+    <p:extLst>
+      <p:ext uri="{BB962C8B-B14F-4D97-AF65-F5344CB8AC3E}">
+        <p14:creationId xmlns:p14="http://schemas.microsoft.com/office/powerpoint/2010/main" val="1164061320"/>
       </p:ext>
     </p:extLst>
   </p:cSld>
@@ -3431,6 +4602,7 @@
           <a:bodyPr/>
           <a:lstStyle/>
           <a:p>
+            <a:pPr algn="ctr"/>
             <a:r>
               <a:rPr lang="en-US" dirty="0"/>
               <a:t>Overview</a:t>
@@ -3475,13 +4647,6 @@
                 <a:sym typeface="Wingdings" panose="05000000000000000000" pitchFamily="2" charset="2"/>
               </a:rPr>
               <a:t> Processing</a:t>
-            </a:r>
-          </a:p>
-          <a:p>
-            <a:pPr lvl="1"/>
-            <a:r>
-              <a:rPr lang="en-US" dirty="0"/>
-              <a:t>Flow of Information</a:t>
             </a:r>
           </a:p>
           <a:p>
@@ -3561,7 +4726,7 @@
           <p:cNvPr id="2" name="Title 1">
             <a:extLst>
               <a:ext uri="{FF2B5EF4-FFF2-40B4-BE49-F238E27FC236}">
-                <a16:creationId xmlns:a16="http://schemas.microsoft.com/office/drawing/2014/main" id="{C398DFF3-6F3E-0E82-08B7-9352AEFE1605}"/>
+                <a16:creationId xmlns:a16="http://schemas.microsoft.com/office/drawing/2014/main" id="{129CFE0E-668E-FC2F-ECCB-5314EF448BBD}"/>
               </a:ext>
             </a:extLst>
           </p:cNvPr>
@@ -3577,9 +4742,10 @@
           <a:bodyPr/>
           <a:lstStyle/>
           <a:p>
+            <a:pPr algn="ctr"/>
             <a:r>
               <a:rPr lang="en-US" dirty="0"/>
-              <a:t>How did we get here?</a:t>
+              <a:t>Part 1 – Theory</a:t>
             </a:r>
           </a:p>
         </p:txBody>
@@ -3589,7 +4755,7 @@
           <p:cNvPr id="3" name="Content Placeholder 2">
             <a:extLst>
               <a:ext uri="{FF2B5EF4-FFF2-40B4-BE49-F238E27FC236}">
-                <a16:creationId xmlns:a16="http://schemas.microsoft.com/office/drawing/2014/main" id="{F19AA77F-4BFE-15F9-6D86-0FEF992CA2E3}"/>
+                <a16:creationId xmlns:a16="http://schemas.microsoft.com/office/drawing/2014/main" id="{8334FC0C-7907-5881-6F82-6B5D5A83BCF3}"/>
               </a:ext>
             </a:extLst>
           </p:cNvPr>
@@ -3605,14 +4771,29 @@
           <a:bodyPr/>
           <a:lstStyle/>
           <a:p>
-            <a:endParaRPr lang="en-US"/>
+            <a:r>
+              <a:rPr lang="en-US" dirty="0"/>
+              <a:t>How do we create a digital representation of sound?</a:t>
+            </a:r>
+          </a:p>
+          <a:p>
+            <a:r>
+              <a:rPr lang="en-US" dirty="0"/>
+              <a:t>What problems do we have to overcome?</a:t>
+            </a:r>
+          </a:p>
+          <a:p>
+            <a:r>
+              <a:rPr lang="en-US" dirty="0"/>
+              <a:t>What tools are available to solve these problems?</a:t>
+            </a:r>
           </a:p>
         </p:txBody>
       </p:sp>
     </p:spTree>
     <p:extLst>
       <p:ext uri="{BB962C8B-B14F-4D97-AF65-F5344CB8AC3E}">
-        <p14:creationId xmlns:p14="http://schemas.microsoft.com/office/powerpoint/2010/main" val="4254579370"/>
+        <p14:creationId xmlns:p14="http://schemas.microsoft.com/office/powerpoint/2010/main" val="1326753845"/>
       </p:ext>
     </p:extLst>
   </p:cSld>
@@ -3644,7 +4825,7 @@
           <p:cNvPr id="2" name="Title 1">
             <a:extLst>
               <a:ext uri="{FF2B5EF4-FFF2-40B4-BE49-F238E27FC236}">
-                <a16:creationId xmlns:a16="http://schemas.microsoft.com/office/drawing/2014/main" id="{76E7E526-8BFB-81FA-F14A-E36FC6269F22}"/>
+                <a16:creationId xmlns:a16="http://schemas.microsoft.com/office/drawing/2014/main" id="{441614B5-E4DF-A615-483B-D5B51EEC481D}"/>
               </a:ext>
             </a:extLst>
           </p:cNvPr>
@@ -3662,7 +4843,7 @@
           <a:p>
             <a:r>
               <a:rPr lang="en-US" dirty="0"/>
-              <a:t>Sources:</a:t>
+              <a:t>Discrete Signals</a:t>
             </a:r>
           </a:p>
         </p:txBody>
@@ -3672,7 +4853,7 @@
           <p:cNvPr id="3" name="Content Placeholder 2">
             <a:extLst>
               <a:ext uri="{FF2B5EF4-FFF2-40B4-BE49-F238E27FC236}">
-                <a16:creationId xmlns:a16="http://schemas.microsoft.com/office/drawing/2014/main" id="{992C88C2-1B19-8F22-9D81-4B98AF1C088A}"/>
+                <a16:creationId xmlns:a16="http://schemas.microsoft.com/office/drawing/2014/main" id="{515B12AC-516C-EFB2-D686-EFAAEFDE87A9}"/>
               </a:ext>
             </a:extLst>
           </p:cNvPr>
@@ -3688,14 +4869,1190 @@
           <a:bodyPr/>
           <a:lstStyle/>
           <a:p>
-            <a:endParaRPr lang="en-US"/>
+            <a:r>
+              <a:rPr lang="en-US" dirty="0"/>
+              <a:t>A sample is taken by measuring the amplitude of a wave at a point in time.</a:t>
+            </a:r>
+          </a:p>
+          <a:p>
+            <a:pPr lvl="1"/>
+            <a:r>
+              <a:rPr lang="en-US" dirty="0"/>
+              <a:t>Floating point number [-1, 1]</a:t>
+            </a:r>
+          </a:p>
+          <a:p>
+            <a:r>
+              <a:rPr lang="en-US" dirty="0"/>
+              <a:t>Audio is represented digitally by taking samples at regular intervals.</a:t>
+            </a:r>
+          </a:p>
+          <a:p>
+            <a:r>
+              <a:rPr lang="en-US" dirty="0"/>
+              <a:t>Sample rate is the measurement of samples/second.</a:t>
+            </a:r>
+          </a:p>
+          <a:p>
+            <a:pPr lvl="1"/>
+            <a:r>
+              <a:rPr lang="en-US" dirty="0"/>
+              <a:t>44.1 kHz, 48 kHz</a:t>
+            </a:r>
+          </a:p>
+          <a:p>
+            <a:endParaRPr lang="en-US" dirty="0"/>
           </a:p>
         </p:txBody>
       </p:sp>
     </p:spTree>
     <p:extLst>
       <p:ext uri="{BB962C8B-B14F-4D97-AF65-F5344CB8AC3E}">
-        <p14:creationId xmlns:p14="http://schemas.microsoft.com/office/powerpoint/2010/main" val="1164061320"/>
+        <p14:creationId xmlns:p14="http://schemas.microsoft.com/office/powerpoint/2010/main" val="4074009698"/>
+      </p:ext>
+    </p:extLst>
+  </p:cSld>
+  <p:clrMapOvr>
+    <a:masterClrMapping/>
+  </p:clrMapOvr>
+</p:sld>
+</file>
+
+<file path=ppt/slides/slide5.xml><?xml version="1.0" encoding="utf-8"?>
+<p:sld xmlns:a="http://schemas.openxmlformats.org/drawingml/2006/main" xmlns:r="http://schemas.openxmlformats.org/officeDocument/2006/relationships" xmlns:p="http://schemas.openxmlformats.org/presentationml/2006/main">
+  <p:cSld>
+    <p:spTree>
+      <p:nvGrpSpPr>
+        <p:cNvPr id="1" name=""/>
+        <p:cNvGrpSpPr/>
+        <p:nvPr/>
+      </p:nvGrpSpPr>
+      <p:grpSpPr>
+        <a:xfrm>
+          <a:off x="0" y="0"/>
+          <a:ext cx="0" cy="0"/>
+          <a:chOff x="0" y="0"/>
+          <a:chExt cx="0" cy="0"/>
+        </a:xfrm>
+      </p:grpSpPr>
+      <p:sp>
+        <p:nvSpPr>
+          <p:cNvPr id="2" name="Title 1">
+            <a:extLst>
+              <a:ext uri="{FF2B5EF4-FFF2-40B4-BE49-F238E27FC236}">
+                <a16:creationId xmlns:a16="http://schemas.microsoft.com/office/drawing/2014/main" id="{F330AE59-474D-D6DB-80CE-A093DFF51F9A}"/>
+              </a:ext>
+            </a:extLst>
+          </p:cNvPr>
+          <p:cNvSpPr>
+            <a:spLocks noGrp="1"/>
+          </p:cNvSpPr>
+          <p:nvPr>
+            <p:ph type="title"/>
+          </p:nvPr>
+        </p:nvSpPr>
+        <p:spPr/>
+        <p:txBody>
+          <a:bodyPr/>
+          <a:lstStyle/>
+          <a:p>
+            <a:r>
+              <a:rPr lang="en-US" dirty="0"/>
+              <a:t>Discrete Signals - Example</a:t>
+            </a:r>
+          </a:p>
+        </p:txBody>
+      </p:sp>
+      <mc:AlternateContent xmlns:mc="http://schemas.openxmlformats.org/markup-compatibility/2006">
+        <mc:Choice xmlns:we="http://schemas.microsoft.com/office/webextensions/webextension/2010/11" xmlns:pca="http://schemas.microsoft.com/office/powerpoint/2013/contentapp" Requires="we pca">
+          <p:graphicFrame>
+            <p:nvGraphicFramePr>
+              <p:cNvPr id="4" name="Content Placeholder 3">
+                <a:extLst>
+                  <a:ext uri="{FF2B5EF4-FFF2-40B4-BE49-F238E27FC236}">
+                    <a16:creationId xmlns:a16="http://schemas.microsoft.com/office/drawing/2014/main" id="{86AE7F10-D976-0705-1C68-8D200B49604B}"/>
+                  </a:ext>
+                </a:extLst>
+              </p:cNvPr>
+              <p:cNvGraphicFramePr>
+                <a:graphicFrameLocks noGrp="1"/>
+              </p:cNvGraphicFramePr>
+              <p:nvPr>
+                <p:ph idx="1"/>
+              </p:nvPr>
+            </p:nvGraphicFramePr>
+            <p:xfrm>
+              <a:off x="838200" y="1825625"/>
+              <a:ext cx="10515600" cy="4351338"/>
+            </p:xfrm>
+            <a:graphic>
+              <a:graphicData uri="http://schemas.microsoft.com/office/webextensions/webextension/2010/11">
+                <we:webextensionref xmlns:we="http://schemas.microsoft.com/office/webextensions/webextension/2010/11" xmlns:r="http://schemas.openxmlformats.org/officeDocument/2006/relationships" r:id="rId2"/>
+              </a:graphicData>
+            </a:graphic>
+          </p:graphicFrame>
+        </mc:Choice>
+        <mc:Fallback>
+          <p:pic>
+            <p:nvPicPr>
+              <p:cNvPr id="4" name="Content Placeholder 3">
+                <a:extLst>
+                  <a:ext uri="{FF2B5EF4-FFF2-40B4-BE49-F238E27FC236}">
+                    <a16:creationId xmlns:a16="http://schemas.microsoft.com/office/drawing/2014/main" id="{86AE7F10-D976-0705-1C68-8D200B49604B}"/>
+                  </a:ext>
+                </a:extLst>
+              </p:cNvPr>
+              <p:cNvPicPr>
+                <a:picLocks noGrp="1" noRot="1" noChangeAspect="1" noMove="1" noResize="1" noEditPoints="1" noAdjustHandles="1" noChangeArrowheads="1" noChangeShapeType="1"/>
+              </p:cNvPicPr>
+              <p:nvPr/>
+            </p:nvPicPr>
+            <p:blipFill>
+              <a:blip r:embed="rId3"/>
+              <a:stretch>
+                <a:fillRect/>
+              </a:stretch>
+            </p:blipFill>
+            <p:spPr>
+              <a:xfrm>
+                <a:off x="838200" y="1825625"/>
+                <a:ext cx="10515600" cy="4351338"/>
+              </a:xfrm>
+              <a:prstGeom prst="rect">
+                <a:avLst/>
+              </a:prstGeom>
+            </p:spPr>
+          </p:pic>
+        </mc:Fallback>
+      </mc:AlternateContent>
+    </p:spTree>
+    <p:extLst>
+      <p:ext uri="{BB962C8B-B14F-4D97-AF65-F5344CB8AC3E}">
+        <p14:creationId xmlns:p14="http://schemas.microsoft.com/office/powerpoint/2010/main" val="2527418220"/>
+      </p:ext>
+    </p:extLst>
+  </p:cSld>
+  <p:clrMapOvr>
+    <a:masterClrMapping/>
+  </p:clrMapOvr>
+</p:sld>
+</file>
+
+<file path=ppt/slides/slide6.xml><?xml version="1.0" encoding="utf-8"?>
+<p:sld xmlns:a="http://schemas.openxmlformats.org/drawingml/2006/main" xmlns:r="http://schemas.openxmlformats.org/officeDocument/2006/relationships" xmlns:p="http://schemas.openxmlformats.org/presentationml/2006/main">
+  <p:cSld>
+    <p:spTree>
+      <p:nvGrpSpPr>
+        <p:cNvPr id="1" name=""/>
+        <p:cNvGrpSpPr/>
+        <p:nvPr/>
+      </p:nvGrpSpPr>
+      <p:grpSpPr>
+        <a:xfrm>
+          <a:off x="0" y="0"/>
+          <a:ext cx="0" cy="0"/>
+          <a:chOff x="0" y="0"/>
+          <a:chExt cx="0" cy="0"/>
+        </a:xfrm>
+      </p:grpSpPr>
+      <p:sp>
+        <p:nvSpPr>
+          <p:cNvPr id="2" name="Title 1">
+            <a:extLst>
+              <a:ext uri="{FF2B5EF4-FFF2-40B4-BE49-F238E27FC236}">
+                <a16:creationId xmlns:a16="http://schemas.microsoft.com/office/drawing/2014/main" id="{245B7BE3-9ACB-63BD-683D-E51905524E8F}"/>
+              </a:ext>
+            </a:extLst>
+          </p:cNvPr>
+          <p:cNvSpPr>
+            <a:spLocks noGrp="1"/>
+          </p:cNvSpPr>
+          <p:nvPr>
+            <p:ph type="title"/>
+          </p:nvPr>
+        </p:nvSpPr>
+        <p:spPr/>
+        <p:txBody>
+          <a:bodyPr/>
+          <a:lstStyle/>
+          <a:p>
+            <a:r>
+              <a:rPr lang="en-US" dirty="0"/>
+              <a:t>Processing Digital Audio</a:t>
+            </a:r>
+          </a:p>
+        </p:txBody>
+      </p:sp>
+      <p:sp>
+        <p:nvSpPr>
+          <p:cNvPr id="4" name="Rectangle 3">
+            <a:extLst>
+              <a:ext uri="{FF2B5EF4-FFF2-40B4-BE49-F238E27FC236}">
+                <a16:creationId xmlns:a16="http://schemas.microsoft.com/office/drawing/2014/main" id="{C857179E-BD29-D34D-2083-E46250A28B32}"/>
+              </a:ext>
+            </a:extLst>
+          </p:cNvPr>
+          <p:cNvSpPr/>
+          <p:nvPr/>
+        </p:nvSpPr>
+        <p:spPr>
+          <a:xfrm>
+            <a:off x="1493520" y="4805680"/>
+            <a:ext cx="2519680" cy="833120"/>
+          </a:xfrm>
+          <a:prstGeom prst="rect">
+            <a:avLst/>
+          </a:prstGeom>
+        </p:spPr>
+        <p:style>
+          <a:lnRef idx="2">
+            <a:schemeClr val="accent6"/>
+          </a:lnRef>
+          <a:fillRef idx="1">
+            <a:schemeClr val="lt1"/>
+          </a:fillRef>
+          <a:effectRef idx="0">
+            <a:schemeClr val="accent6"/>
+          </a:effectRef>
+          <a:fontRef idx="minor">
+            <a:schemeClr val="dk1"/>
+          </a:fontRef>
+        </p:style>
+        <p:txBody>
+          <a:bodyPr rtlCol="0" anchor="ctr"/>
+          <a:lstStyle/>
+          <a:p>
+            <a:pPr algn="ctr"/>
+            <a:r>
+              <a:rPr lang="en-US" dirty="0"/>
+              <a:t>Audio plug-in</a:t>
+            </a:r>
+          </a:p>
+          <a:p>
+            <a:pPr algn="ctr"/>
+            <a:r>
+              <a:rPr lang="en-US" dirty="0"/>
+              <a:t>(VST, AAX, CLAP, etc.)</a:t>
+            </a:r>
+          </a:p>
+        </p:txBody>
+      </p:sp>
+      <p:sp>
+        <p:nvSpPr>
+          <p:cNvPr id="5" name="Rectangle 4">
+            <a:extLst>
+              <a:ext uri="{FF2B5EF4-FFF2-40B4-BE49-F238E27FC236}">
+                <a16:creationId xmlns:a16="http://schemas.microsoft.com/office/drawing/2014/main" id="{BD551942-68E2-8268-383C-7C2527E80ED4}"/>
+              </a:ext>
+            </a:extLst>
+          </p:cNvPr>
+          <p:cNvSpPr/>
+          <p:nvPr/>
+        </p:nvSpPr>
+        <p:spPr>
+          <a:xfrm>
+            <a:off x="574040" y="4175760"/>
+            <a:ext cx="4424804" cy="1584960"/>
+          </a:xfrm>
+          <a:prstGeom prst="rect">
+            <a:avLst/>
+          </a:prstGeom>
+          <a:noFill/>
+        </p:spPr>
+        <p:style>
+          <a:lnRef idx="2">
+            <a:schemeClr val="accent6"/>
+          </a:lnRef>
+          <a:fillRef idx="1">
+            <a:schemeClr val="lt1"/>
+          </a:fillRef>
+          <a:effectRef idx="0">
+            <a:schemeClr val="accent6"/>
+          </a:effectRef>
+          <a:fontRef idx="minor">
+            <a:schemeClr val="dk1"/>
+          </a:fontRef>
+        </p:style>
+        <p:txBody>
+          <a:bodyPr rtlCol="0" anchor="t"/>
+          <a:lstStyle/>
+          <a:p>
+            <a:pPr algn="ctr"/>
+            <a:r>
+              <a:rPr lang="en-US" dirty="0"/>
+              <a:t>Host Application (FL Studio, Cubase, Ableton, Logic, etc.)</a:t>
+            </a:r>
+          </a:p>
+        </p:txBody>
+      </p:sp>
+      <p:cxnSp>
+        <p:nvCxnSpPr>
+          <p:cNvPr id="11" name="Straight Arrow Connector 10">
+            <a:extLst>
+              <a:ext uri="{FF2B5EF4-FFF2-40B4-BE49-F238E27FC236}">
+                <a16:creationId xmlns:a16="http://schemas.microsoft.com/office/drawing/2014/main" id="{5639E9AB-0C4B-6C44-5203-1EFAF3FE0CBD}"/>
+              </a:ext>
+            </a:extLst>
+          </p:cNvPr>
+          <p:cNvCxnSpPr>
+            <a:cxnSpLocks/>
+          </p:cNvCxnSpPr>
+          <p:nvPr/>
+        </p:nvCxnSpPr>
+        <p:spPr>
+          <a:xfrm>
+            <a:off x="5212080" y="4958080"/>
+            <a:ext cx="457200" cy="0"/>
+          </a:xfrm>
+          <a:prstGeom prst="straightConnector1">
+            <a:avLst/>
+          </a:prstGeom>
+          <a:ln>
+            <a:headEnd type="triangle"/>
+            <a:tailEnd type="triangle"/>
+          </a:ln>
+        </p:spPr>
+        <p:style>
+          <a:lnRef idx="2">
+            <a:schemeClr val="accent1"/>
+          </a:lnRef>
+          <a:fillRef idx="0">
+            <a:schemeClr val="accent1"/>
+          </a:fillRef>
+          <a:effectRef idx="1">
+            <a:schemeClr val="accent1"/>
+          </a:effectRef>
+          <a:fontRef idx="minor">
+            <a:schemeClr val="tx1"/>
+          </a:fontRef>
+        </p:style>
+      </p:cxnSp>
+      <p:sp>
+        <p:nvSpPr>
+          <p:cNvPr id="12" name="Rectangle 11">
+            <a:extLst>
+              <a:ext uri="{FF2B5EF4-FFF2-40B4-BE49-F238E27FC236}">
+                <a16:creationId xmlns:a16="http://schemas.microsoft.com/office/drawing/2014/main" id="{496D35DD-F723-AA86-BA59-3EA6778A74A4}"/>
+              </a:ext>
+            </a:extLst>
+          </p:cNvPr>
+          <p:cNvSpPr/>
+          <p:nvPr/>
+        </p:nvSpPr>
+        <p:spPr>
+          <a:xfrm>
+            <a:off x="5882516" y="4551680"/>
+            <a:ext cx="2519680" cy="833120"/>
+          </a:xfrm>
+          <a:prstGeom prst="rect">
+            <a:avLst/>
+          </a:prstGeom>
+        </p:spPr>
+        <p:style>
+          <a:lnRef idx="2">
+            <a:schemeClr val="accent6"/>
+          </a:lnRef>
+          <a:fillRef idx="1">
+            <a:schemeClr val="lt1"/>
+          </a:fillRef>
+          <a:effectRef idx="0">
+            <a:schemeClr val="accent6"/>
+          </a:effectRef>
+          <a:fontRef idx="minor">
+            <a:schemeClr val="dk1"/>
+          </a:fontRef>
+        </p:style>
+        <p:txBody>
+          <a:bodyPr rtlCol="0" anchor="ctr"/>
+          <a:lstStyle/>
+          <a:p>
+            <a:pPr algn="ctr"/>
+            <a:r>
+              <a:rPr lang="en-US" dirty="0"/>
+              <a:t>Audio driver</a:t>
+            </a:r>
+          </a:p>
+          <a:p>
+            <a:pPr algn="ctr"/>
+            <a:r>
+              <a:rPr lang="en-US" dirty="0"/>
+              <a:t>(ASIO, Core Audio, etc.)</a:t>
+            </a:r>
+          </a:p>
+        </p:txBody>
+      </p:sp>
+      <p:sp>
+        <p:nvSpPr>
+          <p:cNvPr id="13" name="Rectangle 12">
+            <a:extLst>
+              <a:ext uri="{FF2B5EF4-FFF2-40B4-BE49-F238E27FC236}">
+                <a16:creationId xmlns:a16="http://schemas.microsoft.com/office/drawing/2014/main" id="{D7302093-1DEB-9102-D5AE-67E2DA075352}"/>
+              </a:ext>
+            </a:extLst>
+          </p:cNvPr>
+          <p:cNvSpPr/>
+          <p:nvPr/>
+        </p:nvSpPr>
+        <p:spPr>
+          <a:xfrm>
+            <a:off x="9225404" y="4551680"/>
+            <a:ext cx="2519680" cy="833120"/>
+          </a:xfrm>
+          <a:prstGeom prst="rect">
+            <a:avLst/>
+          </a:prstGeom>
+        </p:spPr>
+        <p:style>
+          <a:lnRef idx="2">
+            <a:schemeClr val="accent6"/>
+          </a:lnRef>
+          <a:fillRef idx="1">
+            <a:schemeClr val="lt1"/>
+          </a:fillRef>
+          <a:effectRef idx="0">
+            <a:schemeClr val="accent6"/>
+          </a:effectRef>
+          <a:fontRef idx="minor">
+            <a:schemeClr val="dk1"/>
+          </a:fontRef>
+        </p:style>
+        <p:txBody>
+          <a:bodyPr rtlCol="0" anchor="ctr"/>
+          <a:lstStyle/>
+          <a:p>
+            <a:pPr algn="ctr"/>
+            <a:r>
+              <a:rPr lang="en-US" dirty="0"/>
+              <a:t>OS</a:t>
+            </a:r>
+          </a:p>
+          <a:p>
+            <a:pPr algn="ctr"/>
+            <a:r>
+              <a:rPr lang="en-US" dirty="0"/>
+              <a:t>(Windows, Mac, etc.)</a:t>
+            </a:r>
+          </a:p>
+        </p:txBody>
+      </p:sp>
+      <p:cxnSp>
+        <p:nvCxnSpPr>
+          <p:cNvPr id="15" name="Straight Arrow Connector 14">
+            <a:extLst>
+              <a:ext uri="{FF2B5EF4-FFF2-40B4-BE49-F238E27FC236}">
+                <a16:creationId xmlns:a16="http://schemas.microsoft.com/office/drawing/2014/main" id="{28A40EBB-1BC8-1C81-EC3D-70FF9B94D06C}"/>
+              </a:ext>
+            </a:extLst>
+          </p:cNvPr>
+          <p:cNvCxnSpPr>
+            <a:cxnSpLocks/>
+          </p:cNvCxnSpPr>
+          <p:nvPr/>
+        </p:nvCxnSpPr>
+        <p:spPr>
+          <a:xfrm>
+            <a:off x="8585200" y="4958080"/>
+            <a:ext cx="457200" cy="0"/>
+          </a:xfrm>
+          <a:prstGeom prst="straightConnector1">
+            <a:avLst/>
+          </a:prstGeom>
+          <a:ln>
+            <a:headEnd type="triangle"/>
+            <a:tailEnd type="triangle"/>
+          </a:ln>
+        </p:spPr>
+        <p:style>
+          <a:lnRef idx="2">
+            <a:schemeClr val="accent1"/>
+          </a:lnRef>
+          <a:fillRef idx="0">
+            <a:schemeClr val="accent1"/>
+          </a:fillRef>
+          <a:effectRef idx="1">
+            <a:schemeClr val="accent1"/>
+          </a:effectRef>
+          <a:fontRef idx="minor">
+            <a:schemeClr val="tx1"/>
+          </a:fontRef>
+        </p:style>
+      </p:cxnSp>
+      <p:cxnSp>
+        <p:nvCxnSpPr>
+          <p:cNvPr id="18" name="Straight Arrow Connector 17">
+            <a:extLst>
+              <a:ext uri="{FF2B5EF4-FFF2-40B4-BE49-F238E27FC236}">
+                <a16:creationId xmlns:a16="http://schemas.microsoft.com/office/drawing/2014/main" id="{872072A3-0976-81C4-D960-F6A710C8E5FD}"/>
+              </a:ext>
+            </a:extLst>
+          </p:cNvPr>
+          <p:cNvCxnSpPr>
+            <a:cxnSpLocks/>
+          </p:cNvCxnSpPr>
+          <p:nvPr/>
+        </p:nvCxnSpPr>
+        <p:spPr>
+          <a:xfrm flipH="1">
+            <a:off x="10485120" y="3505200"/>
+            <a:ext cx="124" cy="861060"/>
+          </a:xfrm>
+          <a:prstGeom prst="straightConnector1">
+            <a:avLst/>
+          </a:prstGeom>
+          <a:ln>
+            <a:headEnd type="triangle"/>
+            <a:tailEnd type="triangle"/>
+          </a:ln>
+        </p:spPr>
+        <p:style>
+          <a:lnRef idx="2">
+            <a:schemeClr val="accent1"/>
+          </a:lnRef>
+          <a:fillRef idx="0">
+            <a:schemeClr val="accent1"/>
+          </a:fillRef>
+          <a:effectRef idx="1">
+            <a:schemeClr val="accent1"/>
+          </a:effectRef>
+          <a:fontRef idx="minor">
+            <a:schemeClr val="tx1"/>
+          </a:fontRef>
+        </p:style>
+      </p:cxnSp>
+      <p:sp>
+        <p:nvSpPr>
+          <p:cNvPr id="20" name="Rectangle 19">
+            <a:extLst>
+              <a:ext uri="{FF2B5EF4-FFF2-40B4-BE49-F238E27FC236}">
+                <a16:creationId xmlns:a16="http://schemas.microsoft.com/office/drawing/2014/main" id="{7E25F563-0F1E-53AC-4FF0-B20335594D8E}"/>
+              </a:ext>
+            </a:extLst>
+          </p:cNvPr>
+          <p:cNvSpPr/>
+          <p:nvPr/>
+        </p:nvSpPr>
+        <p:spPr>
+          <a:xfrm>
+            <a:off x="10007724" y="2845912"/>
+            <a:ext cx="954792" cy="412432"/>
+          </a:xfrm>
+          <a:prstGeom prst="rect">
+            <a:avLst/>
+          </a:prstGeom>
+        </p:spPr>
+        <p:style>
+          <a:lnRef idx="2">
+            <a:schemeClr val="accent6"/>
+          </a:lnRef>
+          <a:fillRef idx="1">
+            <a:schemeClr val="lt1"/>
+          </a:fillRef>
+          <a:effectRef idx="0">
+            <a:schemeClr val="accent6"/>
+          </a:effectRef>
+          <a:fontRef idx="minor">
+            <a:schemeClr val="dk1"/>
+          </a:fontRef>
+        </p:style>
+        <p:txBody>
+          <a:bodyPr rtlCol="0" anchor="ctr"/>
+          <a:lstStyle/>
+          <a:p>
+            <a:pPr algn="ctr"/>
+            <a:r>
+              <a:rPr lang="en-US" dirty="0"/>
+              <a:t>Driver</a:t>
+            </a:r>
+          </a:p>
+        </p:txBody>
+      </p:sp>
+      <p:sp>
+        <p:nvSpPr>
+          <p:cNvPr id="21" name="Rectangle 20">
+            <a:extLst>
+              <a:ext uri="{FF2B5EF4-FFF2-40B4-BE49-F238E27FC236}">
+                <a16:creationId xmlns:a16="http://schemas.microsoft.com/office/drawing/2014/main" id="{461ED199-F763-071E-EBB4-3D8FCCA6D531}"/>
+              </a:ext>
+            </a:extLst>
+          </p:cNvPr>
+          <p:cNvSpPr/>
+          <p:nvPr/>
+        </p:nvSpPr>
+        <p:spPr>
+          <a:xfrm>
+            <a:off x="5882516" y="2672080"/>
+            <a:ext cx="2519680" cy="833120"/>
+          </a:xfrm>
+          <a:prstGeom prst="rect">
+            <a:avLst/>
+          </a:prstGeom>
+        </p:spPr>
+        <p:style>
+          <a:lnRef idx="2">
+            <a:schemeClr val="accent6"/>
+          </a:lnRef>
+          <a:fillRef idx="1">
+            <a:schemeClr val="lt1"/>
+          </a:fillRef>
+          <a:effectRef idx="0">
+            <a:schemeClr val="accent6"/>
+          </a:effectRef>
+          <a:fontRef idx="minor">
+            <a:schemeClr val="dk1"/>
+          </a:fontRef>
+        </p:style>
+        <p:txBody>
+          <a:bodyPr rtlCol="0" anchor="ctr"/>
+          <a:lstStyle/>
+          <a:p>
+            <a:pPr algn="ctr"/>
+            <a:r>
+              <a:rPr lang="en-US" dirty="0"/>
+              <a:t>Sound card</a:t>
+            </a:r>
+          </a:p>
+          <a:p>
+            <a:pPr algn="ctr"/>
+            <a:r>
+              <a:rPr lang="en-US" dirty="0"/>
+              <a:t>(Generally Integrated)</a:t>
+            </a:r>
+          </a:p>
+        </p:txBody>
+      </p:sp>
+      <p:cxnSp>
+        <p:nvCxnSpPr>
+          <p:cNvPr id="23" name="Straight Arrow Connector 22">
+            <a:extLst>
+              <a:ext uri="{FF2B5EF4-FFF2-40B4-BE49-F238E27FC236}">
+                <a16:creationId xmlns:a16="http://schemas.microsoft.com/office/drawing/2014/main" id="{2EFE7562-267D-90C0-3947-6DFD6C2F0D0D}"/>
+              </a:ext>
+            </a:extLst>
+          </p:cNvPr>
+          <p:cNvCxnSpPr>
+            <a:cxnSpLocks/>
+          </p:cNvCxnSpPr>
+          <p:nvPr/>
+        </p:nvCxnSpPr>
+        <p:spPr>
+          <a:xfrm>
+            <a:off x="8592789" y="3078480"/>
+            <a:ext cx="1203898" cy="10160"/>
+          </a:xfrm>
+          <a:prstGeom prst="straightConnector1">
+            <a:avLst/>
+          </a:prstGeom>
+          <a:ln>
+            <a:headEnd type="triangle"/>
+            <a:tailEnd type="triangle"/>
+          </a:ln>
+        </p:spPr>
+        <p:style>
+          <a:lnRef idx="2">
+            <a:schemeClr val="accent1"/>
+          </a:lnRef>
+          <a:fillRef idx="0">
+            <a:schemeClr val="accent1"/>
+          </a:fillRef>
+          <a:effectRef idx="1">
+            <a:schemeClr val="accent1"/>
+          </a:effectRef>
+          <a:fontRef idx="minor">
+            <a:schemeClr val="tx1"/>
+          </a:fontRef>
+        </p:style>
+      </p:cxnSp>
+      <p:sp>
+        <p:nvSpPr>
+          <p:cNvPr id="27" name="Rectangle 26">
+            <a:extLst>
+              <a:ext uri="{FF2B5EF4-FFF2-40B4-BE49-F238E27FC236}">
+                <a16:creationId xmlns:a16="http://schemas.microsoft.com/office/drawing/2014/main" id="{13E0CD33-88EE-8C96-B1A9-54417CA9A465}"/>
+              </a:ext>
+            </a:extLst>
+          </p:cNvPr>
+          <p:cNvSpPr/>
+          <p:nvPr/>
+        </p:nvSpPr>
+        <p:spPr>
+          <a:xfrm>
+            <a:off x="576456" y="2296160"/>
+            <a:ext cx="4424804" cy="1584960"/>
+          </a:xfrm>
+          <a:prstGeom prst="rect">
+            <a:avLst/>
+          </a:prstGeom>
+          <a:noFill/>
+        </p:spPr>
+        <p:style>
+          <a:lnRef idx="2">
+            <a:schemeClr val="accent6"/>
+          </a:lnRef>
+          <a:fillRef idx="1">
+            <a:schemeClr val="lt1"/>
+          </a:fillRef>
+          <a:effectRef idx="0">
+            <a:schemeClr val="accent6"/>
+          </a:effectRef>
+          <a:fontRef idx="minor">
+            <a:schemeClr val="dk1"/>
+          </a:fontRef>
+        </p:style>
+        <p:txBody>
+          <a:bodyPr rtlCol="0" anchor="t"/>
+          <a:lstStyle/>
+          <a:p>
+            <a:pPr algn="ctr"/>
+            <a:r>
+              <a:rPr lang="en-US" dirty="0"/>
+              <a:t>Speakers, Microphones, etc.</a:t>
+            </a:r>
+          </a:p>
+        </p:txBody>
+      </p:sp>
+      <p:cxnSp>
+        <p:nvCxnSpPr>
+          <p:cNvPr id="30" name="Straight Arrow Connector 29">
+            <a:extLst>
+              <a:ext uri="{FF2B5EF4-FFF2-40B4-BE49-F238E27FC236}">
+                <a16:creationId xmlns:a16="http://schemas.microsoft.com/office/drawing/2014/main" id="{AAA825F7-E1C4-982B-4578-FA1C5C8CE0E3}"/>
+              </a:ext>
+            </a:extLst>
+          </p:cNvPr>
+          <p:cNvCxnSpPr>
+            <a:cxnSpLocks/>
+          </p:cNvCxnSpPr>
+          <p:nvPr/>
+        </p:nvCxnSpPr>
+        <p:spPr>
+          <a:xfrm>
+            <a:off x="5212080" y="3098800"/>
+            <a:ext cx="457200" cy="0"/>
+          </a:xfrm>
+          <a:prstGeom prst="straightConnector1">
+            <a:avLst/>
+          </a:prstGeom>
+          <a:ln>
+            <a:headEnd type="triangle"/>
+            <a:tailEnd type="triangle"/>
+          </a:ln>
+        </p:spPr>
+        <p:style>
+          <a:lnRef idx="2">
+            <a:schemeClr val="accent1"/>
+          </a:lnRef>
+          <a:fillRef idx="0">
+            <a:schemeClr val="accent1"/>
+          </a:fillRef>
+          <a:effectRef idx="1">
+            <a:schemeClr val="accent1"/>
+          </a:effectRef>
+          <a:fontRef idx="minor">
+            <a:schemeClr val="tx1"/>
+          </a:fontRef>
+        </p:style>
+      </p:cxnSp>
+      <p:sp>
+        <p:nvSpPr>
+          <p:cNvPr id="32" name="Rectangle 31">
+            <a:extLst>
+              <a:ext uri="{FF2B5EF4-FFF2-40B4-BE49-F238E27FC236}">
+                <a16:creationId xmlns:a16="http://schemas.microsoft.com/office/drawing/2014/main" id="{A3A2B77E-FA9D-EA8B-D1E7-1879DBE79EFC}"/>
+              </a:ext>
+            </a:extLst>
+          </p:cNvPr>
+          <p:cNvSpPr/>
+          <p:nvPr/>
+        </p:nvSpPr>
+        <p:spPr>
+          <a:xfrm>
+            <a:off x="988029" y="2845912"/>
+            <a:ext cx="1480913" cy="833120"/>
+          </a:xfrm>
+          <a:prstGeom prst="rect">
+            <a:avLst/>
+          </a:prstGeom>
+        </p:spPr>
+        <p:style>
+          <a:lnRef idx="2">
+            <a:schemeClr val="accent6"/>
+          </a:lnRef>
+          <a:fillRef idx="1">
+            <a:schemeClr val="lt1"/>
+          </a:fillRef>
+          <a:effectRef idx="0">
+            <a:schemeClr val="accent6"/>
+          </a:effectRef>
+          <a:fontRef idx="minor">
+            <a:schemeClr val="dk1"/>
+          </a:fontRef>
+        </p:style>
+        <p:txBody>
+          <a:bodyPr rtlCol="0" anchor="ctr"/>
+          <a:lstStyle/>
+          <a:p>
+            <a:pPr algn="ctr"/>
+            <a:r>
+              <a:rPr lang="en-US" dirty="0"/>
+              <a:t>DAC (output to speaker)</a:t>
+            </a:r>
+          </a:p>
+        </p:txBody>
+      </p:sp>
+      <p:sp>
+        <p:nvSpPr>
+          <p:cNvPr id="34" name="Rectangle 33">
+            <a:extLst>
+              <a:ext uri="{FF2B5EF4-FFF2-40B4-BE49-F238E27FC236}">
+                <a16:creationId xmlns:a16="http://schemas.microsoft.com/office/drawing/2014/main" id="{A5C2B719-17AC-3131-588D-A5D98A95F465}"/>
+              </a:ext>
+            </a:extLst>
+          </p:cNvPr>
+          <p:cNvSpPr/>
+          <p:nvPr/>
+        </p:nvSpPr>
+        <p:spPr>
+          <a:xfrm>
+            <a:off x="2851692" y="2848928"/>
+            <a:ext cx="1761614" cy="833120"/>
+          </a:xfrm>
+          <a:prstGeom prst="rect">
+            <a:avLst/>
+          </a:prstGeom>
+        </p:spPr>
+        <p:style>
+          <a:lnRef idx="2">
+            <a:schemeClr val="accent6"/>
+          </a:lnRef>
+          <a:fillRef idx="1">
+            <a:schemeClr val="lt1"/>
+          </a:fillRef>
+          <a:effectRef idx="0">
+            <a:schemeClr val="accent6"/>
+          </a:effectRef>
+          <a:fontRef idx="minor">
+            <a:schemeClr val="dk1"/>
+          </a:fontRef>
+        </p:style>
+        <p:txBody>
+          <a:bodyPr rtlCol="0" anchor="ctr"/>
+          <a:lstStyle/>
+          <a:p>
+            <a:pPr algn="ctr"/>
+            <a:r>
+              <a:rPr lang="en-US" dirty="0"/>
+              <a:t>ADC (input to audio interface)</a:t>
+            </a:r>
+          </a:p>
+        </p:txBody>
+      </p:sp>
+    </p:spTree>
+    <p:extLst>
+      <p:ext uri="{BB962C8B-B14F-4D97-AF65-F5344CB8AC3E}">
+        <p14:creationId xmlns:p14="http://schemas.microsoft.com/office/powerpoint/2010/main" val="2113772412"/>
+      </p:ext>
+    </p:extLst>
+  </p:cSld>
+  <p:clrMapOvr>
+    <a:masterClrMapping/>
+  </p:clrMapOvr>
+</p:sld>
+</file>
+
+<file path=ppt/slides/slide7.xml><?xml version="1.0" encoding="utf-8"?>
+<p:sld xmlns:a="http://schemas.openxmlformats.org/drawingml/2006/main" xmlns:r="http://schemas.openxmlformats.org/officeDocument/2006/relationships" xmlns:p="http://schemas.openxmlformats.org/presentationml/2006/main">
+  <p:cSld>
+    <p:spTree>
+      <p:nvGrpSpPr>
+        <p:cNvPr id="1" name=""/>
+        <p:cNvGrpSpPr/>
+        <p:nvPr/>
+      </p:nvGrpSpPr>
+      <p:grpSpPr>
+        <a:xfrm>
+          <a:off x="0" y="0"/>
+          <a:ext cx="0" cy="0"/>
+          <a:chOff x="0" y="0"/>
+          <a:chExt cx="0" cy="0"/>
+        </a:xfrm>
+      </p:grpSpPr>
+      <p:sp>
+        <p:nvSpPr>
+          <p:cNvPr id="2" name="Title 1">
+            <a:extLst>
+              <a:ext uri="{FF2B5EF4-FFF2-40B4-BE49-F238E27FC236}">
+                <a16:creationId xmlns:a16="http://schemas.microsoft.com/office/drawing/2014/main" id="{BD54045D-70E7-A2CF-CE64-3B4AFA0E9595}"/>
+              </a:ext>
+            </a:extLst>
+          </p:cNvPr>
+          <p:cNvSpPr>
+            <a:spLocks noGrp="1"/>
+          </p:cNvSpPr>
+          <p:nvPr>
+            <p:ph type="title"/>
+          </p:nvPr>
+        </p:nvSpPr>
+        <p:spPr/>
+        <p:txBody>
+          <a:bodyPr/>
+          <a:lstStyle/>
+          <a:p>
+            <a:r>
+              <a:rPr lang="en-US" dirty="0"/>
+              <a:t>Problems with real time audio</a:t>
+            </a:r>
+          </a:p>
+        </p:txBody>
+      </p:sp>
+      <p:sp>
+        <p:nvSpPr>
+          <p:cNvPr id="3" name="Content Placeholder 2">
+            <a:extLst>
+              <a:ext uri="{FF2B5EF4-FFF2-40B4-BE49-F238E27FC236}">
+                <a16:creationId xmlns:a16="http://schemas.microsoft.com/office/drawing/2014/main" id="{8CE8EABB-AA0A-0054-1A4C-66B4077F0FD9}"/>
+              </a:ext>
+            </a:extLst>
+          </p:cNvPr>
+          <p:cNvSpPr>
+            <a:spLocks noGrp="1"/>
+          </p:cNvSpPr>
+          <p:nvPr>
+            <p:ph idx="1"/>
+          </p:nvPr>
+        </p:nvSpPr>
+        <p:spPr/>
+        <p:txBody>
+          <a:bodyPr/>
+          <a:lstStyle/>
+          <a:p>
+            <a:r>
+              <a:rPr lang="en-US" dirty="0"/>
+              <a:t>Processing has hard time requirements </a:t>
+            </a:r>
+            <a:r>
+              <a:rPr lang="en-US" dirty="0">
+                <a:sym typeface="Wingdings" panose="05000000000000000000" pitchFamily="2" charset="2"/>
+              </a:rPr>
+              <a:t> audio stack waits for nothing.</a:t>
+            </a:r>
+          </a:p>
+          <a:p>
+            <a:r>
+              <a:rPr lang="en-US" dirty="0">
+                <a:sym typeface="Wingdings" panose="05000000000000000000" pitchFamily="2" charset="2"/>
+              </a:rPr>
+              <a:t> </a:t>
+            </a:r>
+            <a:endParaRPr lang="en-US" dirty="0"/>
+          </a:p>
+        </p:txBody>
+      </p:sp>
+    </p:spTree>
+    <p:extLst>
+      <p:ext uri="{BB962C8B-B14F-4D97-AF65-F5344CB8AC3E}">
+        <p14:creationId xmlns:p14="http://schemas.microsoft.com/office/powerpoint/2010/main" val="2944512229"/>
+      </p:ext>
+    </p:extLst>
+  </p:cSld>
+  <p:clrMapOvr>
+    <a:masterClrMapping/>
+  </p:clrMapOvr>
+</p:sld>
+</file>
+
+<file path=ppt/slides/slide8.xml><?xml version="1.0" encoding="utf-8"?>
+<p:sld xmlns:a="http://schemas.openxmlformats.org/drawingml/2006/main" xmlns:r="http://schemas.openxmlformats.org/officeDocument/2006/relationships" xmlns:p="http://schemas.openxmlformats.org/presentationml/2006/main">
+  <p:cSld>
+    <p:spTree>
+      <p:nvGrpSpPr>
+        <p:cNvPr id="1" name=""/>
+        <p:cNvGrpSpPr/>
+        <p:nvPr/>
+      </p:nvGrpSpPr>
+      <p:grpSpPr>
+        <a:xfrm>
+          <a:off x="0" y="0"/>
+          <a:ext cx="0" cy="0"/>
+          <a:chOff x="0" y="0"/>
+          <a:chExt cx="0" cy="0"/>
+        </a:xfrm>
+      </p:grpSpPr>
+      <p:sp>
+        <p:nvSpPr>
+          <p:cNvPr id="2" name="Title 1">
+            <a:extLst>
+              <a:ext uri="{FF2B5EF4-FFF2-40B4-BE49-F238E27FC236}">
+                <a16:creationId xmlns:a16="http://schemas.microsoft.com/office/drawing/2014/main" id="{A3C902C3-BEBE-4C99-8707-10C053388ADE}"/>
+              </a:ext>
+            </a:extLst>
+          </p:cNvPr>
+          <p:cNvSpPr>
+            <a:spLocks noGrp="1"/>
+          </p:cNvSpPr>
+          <p:nvPr>
+            <p:ph type="title"/>
+          </p:nvPr>
+        </p:nvSpPr>
+        <p:spPr>
+          <a:xfrm>
+            <a:off x="0" y="1709739"/>
+            <a:ext cx="12192000" cy="2156584"/>
+          </a:xfrm>
+        </p:spPr>
+        <p:txBody>
+          <a:bodyPr>
+            <a:normAutofit/>
+          </a:bodyPr>
+          <a:lstStyle/>
+          <a:p>
+            <a:pPr algn="ctr"/>
+            <a:r>
+              <a:rPr lang="en-US" sz="5400" dirty="0"/>
+              <a:t>All these things </a:t>
+            </a:r>
+            <a:r>
+              <a:rPr lang="en-US" sz="4800" dirty="0"/>
+              <a:t>aren’t</a:t>
+            </a:r>
+            <a:r>
+              <a:rPr lang="en-US" sz="5400" dirty="0"/>
+              <a:t> really an issue.</a:t>
+            </a:r>
+          </a:p>
+        </p:txBody>
+      </p:sp>
+    </p:spTree>
+    <p:extLst>
+      <p:ext uri="{BB962C8B-B14F-4D97-AF65-F5344CB8AC3E}">
+        <p14:creationId xmlns:p14="http://schemas.microsoft.com/office/powerpoint/2010/main" val="3262769772"/>
+      </p:ext>
+    </p:extLst>
+  </p:cSld>
+  <p:clrMapOvr>
+    <a:masterClrMapping/>
+  </p:clrMapOvr>
+</p:sld>
+</file>
+
+<file path=ppt/slides/slide9.xml><?xml version="1.0" encoding="utf-8"?>
+<p:sld xmlns:a="http://schemas.openxmlformats.org/drawingml/2006/main" xmlns:r="http://schemas.openxmlformats.org/officeDocument/2006/relationships" xmlns:p="http://schemas.openxmlformats.org/presentationml/2006/main">
+  <p:cSld>
+    <p:spTree>
+      <p:nvGrpSpPr>
+        <p:cNvPr id="1" name=""/>
+        <p:cNvGrpSpPr/>
+        <p:nvPr/>
+      </p:nvGrpSpPr>
+      <p:grpSpPr>
+        <a:xfrm>
+          <a:off x="0" y="0"/>
+          <a:ext cx="0" cy="0"/>
+          <a:chOff x="0" y="0"/>
+          <a:chExt cx="0" cy="0"/>
+        </a:xfrm>
+      </p:grpSpPr>
+      <p:sp>
+        <p:nvSpPr>
+          <p:cNvPr id="2" name="Title 1">
+            <a:extLst>
+              <a:ext uri="{FF2B5EF4-FFF2-40B4-BE49-F238E27FC236}">
+                <a16:creationId xmlns:a16="http://schemas.microsoft.com/office/drawing/2014/main" id="{5FA32A5E-A63F-37B5-D5FD-6931D2BE76D6}"/>
+              </a:ext>
+            </a:extLst>
+          </p:cNvPr>
+          <p:cNvSpPr>
+            <a:spLocks noGrp="1"/>
+          </p:cNvSpPr>
+          <p:nvPr>
+            <p:ph type="title"/>
+          </p:nvPr>
+        </p:nvSpPr>
+        <p:spPr/>
+        <p:txBody>
+          <a:bodyPr/>
+          <a:lstStyle/>
+          <a:p>
+            <a:r>
+              <a:rPr lang="en-US" dirty="0"/>
+              <a:t>Reason 1 – Software Available</a:t>
+            </a:r>
+          </a:p>
+        </p:txBody>
+      </p:sp>
+      <p:sp>
+        <p:nvSpPr>
+          <p:cNvPr id="3" name="Content Placeholder 2">
+            <a:extLst>
+              <a:ext uri="{FF2B5EF4-FFF2-40B4-BE49-F238E27FC236}">
+                <a16:creationId xmlns:a16="http://schemas.microsoft.com/office/drawing/2014/main" id="{07AEFFE8-C5E7-290A-C00A-5E5298F8D95B}"/>
+              </a:ext>
+            </a:extLst>
+          </p:cNvPr>
+          <p:cNvSpPr>
+            <a:spLocks noGrp="1"/>
+          </p:cNvSpPr>
+          <p:nvPr>
+            <p:ph idx="1"/>
+          </p:nvPr>
+        </p:nvSpPr>
+        <p:spPr/>
+        <p:txBody>
+          <a:bodyPr/>
+          <a:lstStyle/>
+          <a:p>
+            <a:r>
+              <a:rPr lang="en-US" dirty="0"/>
+              <a:t>Various plugin frameworks:</a:t>
+            </a:r>
+          </a:p>
+          <a:p>
+            <a:pPr lvl="1"/>
+            <a:r>
+              <a:rPr lang="en-US" dirty="0" err="1"/>
+              <a:t>Juce</a:t>
+            </a:r>
+            <a:r>
+              <a:rPr lang="en-US" dirty="0"/>
+              <a:t>, iPlug2, </a:t>
+            </a:r>
+            <a:r>
+              <a:rPr lang="en-US" dirty="0" err="1"/>
+              <a:t>dplug</a:t>
+            </a:r>
+            <a:r>
+              <a:rPr lang="en-US" dirty="0"/>
+              <a:t>, DISTHRO, etc.</a:t>
+            </a:r>
+          </a:p>
+          <a:p>
+            <a:r>
+              <a:rPr lang="en-US" dirty="0"/>
+              <a:t>Various SDKs:</a:t>
+            </a:r>
+          </a:p>
+          <a:p>
+            <a:pPr lvl="1"/>
+            <a:r>
+              <a:rPr lang="en-US" dirty="0"/>
+              <a:t>VST SDK, AAX SDK, etc.</a:t>
+            </a:r>
+          </a:p>
+          <a:p>
+            <a:pPr lvl="1"/>
+            <a:endParaRPr lang="en-US" dirty="0"/>
+          </a:p>
+          <a:p>
+            <a:r>
+              <a:rPr lang="en-US" dirty="0"/>
+              <a:t>Each make handling the digital audio stack easier.</a:t>
+            </a:r>
+          </a:p>
+        </p:txBody>
+      </p:sp>
+    </p:spTree>
+    <p:extLst>
+      <p:ext uri="{BB962C8B-B14F-4D97-AF65-F5344CB8AC3E}">
+        <p14:creationId xmlns:p14="http://schemas.microsoft.com/office/powerpoint/2010/main" val="4187135031"/>
       </p:ext>
     </p:extLst>
   </p:cSld>
@@ -4018,4 +6375,18 @@
     </a:ext>
   </a:extLst>
 </a:theme>
+</file>
+
+<file path=ppt/webextensions/webextension1.xml><?xml version="1.0" encoding="utf-8"?>
+<we:webextension xmlns:we="http://schemas.microsoft.com/office/webextensions/webextension/2010/11" id="{C10AD2B8-D1B3-4981-BD02-61CB54D2F0A0}">
+  <we:reference id="wa104295828" version="1.9.0.0" store="en-US" storeType="OMEX"/>
+  <we:alternateReferences>
+    <we:reference id="WA104295828" version="1.9.0.0" store="WA104295828" storeType="OMEX"/>
+  </we:alternateReferences>
+  <we:properties>
+    <we:property name="__labs__" value="{&quot;configuration&quot;:{&quot;appVersion&quot;:{&quot;major&quot;:1,&quot;minor&quot;:0},&quot;components&quot;:[{&quot;type&quot;:&quot;Labs.Components.ActivityComponent&quot;,&quot;name&quot;:&quot;www.desmos.com/calculator/8kjdkxokhc&quot;,&quot;values&quot;:{},&quot;data&quot;:{&quot;uri&quot;:&quot;www.desmos.com/calculator/8kjdkxokhc&quot;},&quot;secure&quot;:false}],&quot;name&quot;:&quot;www.desmos.com/calculator/8kjdkxokhc&quot;,&quot;timeline&quot;:null,&quot;analytics&quot;:null},&quot;hostVersion&quot;:{&quot;major&quot;:0,&quot;minor&quot;:1}}"/>
+  </we:properties>
+  <we:bindings/>
+  <we:snapshot xmlns:r="http://schemas.openxmlformats.org/officeDocument/2006/relationships" r:embed="rId1"/>
+</we:webextension>
 </file>
</xml_diff>

<commit_message>
CMakeLists.txt default directory changed. Presentation Completed.
</commit_message>
<xml_diff>
--- a/docs/juniorIS-new.pptx
+++ b/docs/juniorIS-new.pptx
@@ -12,18 +12,15 @@
     <p:sldId id="263" r:id="rId6"/>
     <p:sldId id="275" r:id="rId7"/>
     <p:sldId id="265" r:id="rId8"/>
-    <p:sldId id="262" r:id="rId9"/>
-    <p:sldId id="274" r:id="rId10"/>
-    <p:sldId id="272" r:id="rId11"/>
-    <p:sldId id="266" r:id="rId12"/>
-    <p:sldId id="267" r:id="rId13"/>
-    <p:sldId id="268" r:id="rId14"/>
-    <p:sldId id="276" r:id="rId15"/>
-    <p:sldId id="269" r:id="rId16"/>
-    <p:sldId id="277" r:id="rId17"/>
-    <p:sldId id="270" r:id="rId18"/>
-    <p:sldId id="273" r:id="rId19"/>
-    <p:sldId id="259" r:id="rId20"/>
+    <p:sldId id="274" r:id="rId9"/>
+    <p:sldId id="266" r:id="rId10"/>
+    <p:sldId id="267" r:id="rId11"/>
+    <p:sldId id="268" r:id="rId12"/>
+    <p:sldId id="276" r:id="rId13"/>
+    <p:sldId id="269" r:id="rId14"/>
+    <p:sldId id="270" r:id="rId15"/>
+    <p:sldId id="273" r:id="rId16"/>
+    <p:sldId id="259" r:id="rId17"/>
   </p:sldIdLst>
   <p:sldSz cx="12192000" cy="6858000"/>
   <p:notesSz cx="6858000" cy="9144000"/>
@@ -3360,6 +3357,41 @@
             <p:ph type="ctrTitle"/>
           </p:nvPr>
         </p:nvSpPr>
+        <p:spPr>
+          <a:xfrm>
+            <a:off x="0" y="1122363"/>
+            <a:ext cx="12192000" cy="2387600"/>
+          </a:xfrm>
+        </p:spPr>
+        <p:txBody>
+          <a:bodyPr>
+            <a:normAutofit/>
+          </a:bodyPr>
+          <a:lstStyle/>
+          <a:p>
+            <a:r>
+              <a:rPr lang="en-US" sz="4800" dirty="0"/>
+              <a:t>Virtual Synthesizer Development in C++</a:t>
+            </a:r>
+          </a:p>
+        </p:txBody>
+      </p:sp>
+      <p:sp>
+        <p:nvSpPr>
+          <p:cNvPr id="3" name="Subtitle 2">
+            <a:extLst>
+              <a:ext uri="{FF2B5EF4-FFF2-40B4-BE49-F238E27FC236}">
+                <a16:creationId xmlns:a16="http://schemas.microsoft.com/office/drawing/2014/main" id="{AD5ECF96-1F3A-19B9-F24A-ACF288EFB54A}"/>
+              </a:ext>
+            </a:extLst>
+          </p:cNvPr>
+          <p:cNvSpPr>
+            <a:spLocks noGrp="1"/>
+          </p:cNvSpPr>
+          <p:nvPr>
+            <p:ph type="subTitle" idx="1"/>
+          </p:nvPr>
+        </p:nvSpPr>
         <p:spPr/>
         <p:txBody>
           <a:bodyPr/>
@@ -3367,35 +3399,13 @@
           <a:p>
             <a:r>
               <a:rPr lang="en-US" dirty="0"/>
-              <a:t>Virtual Synthesizer Development in C++</a:t>
-            </a:r>
-          </a:p>
-        </p:txBody>
-      </p:sp>
-      <p:sp>
-        <p:nvSpPr>
-          <p:cNvPr id="3" name="Subtitle 2">
-            <a:extLst>
-              <a:ext uri="{FF2B5EF4-FFF2-40B4-BE49-F238E27FC236}">
-                <a16:creationId xmlns:a16="http://schemas.microsoft.com/office/drawing/2014/main" id="{AD5ECF96-1F3A-19B9-F24A-ACF288EFB54A}"/>
-              </a:ext>
-            </a:extLst>
-          </p:cNvPr>
-          <p:cNvSpPr>
-            <a:spLocks noGrp="1"/>
-          </p:cNvSpPr>
-          <p:nvPr>
-            <p:ph type="subTitle" idx="1"/>
-          </p:nvPr>
-        </p:nvSpPr>
-        <p:spPr/>
-        <p:txBody>
-          <a:bodyPr/>
-          <a:lstStyle/>
-          <a:p>
-            <a:r>
-              <a:rPr lang="en-US" dirty="0"/>
               <a:t>William Sieber</a:t>
+            </a:r>
+          </a:p>
+          <a:p>
+            <a:r>
+              <a:rPr lang="en-US" dirty="0"/>
+              <a:t>May 2024</a:t>
             </a:r>
           </a:p>
         </p:txBody>
@@ -3435,7 +3445,7 @@
           <p:cNvPr id="2" name="Title 1">
             <a:extLst>
               <a:ext uri="{FF2B5EF4-FFF2-40B4-BE49-F238E27FC236}">
-                <a16:creationId xmlns:a16="http://schemas.microsoft.com/office/drawing/2014/main" id="{F68996C3-5724-6079-55B7-CDF2D808441A}"/>
+                <a16:creationId xmlns:a16="http://schemas.microsoft.com/office/drawing/2014/main" id="{728DC00F-2FBB-549C-2793-3E4E9BB87AB6}"/>
               </a:ext>
             </a:extLst>
           </p:cNvPr>
@@ -3453,7 +3463,7 @@
           <a:p>
             <a:r>
               <a:rPr lang="en-US" dirty="0"/>
-              <a:t>Reason 2 – Computers are good</a:t>
+              <a:t>Structure</a:t>
             </a:r>
           </a:p>
         </p:txBody>
@@ -3463,7 +3473,7 @@
           <p:cNvPr id="3" name="Content Placeholder 2">
             <a:extLst>
               <a:ext uri="{FF2B5EF4-FFF2-40B4-BE49-F238E27FC236}">
-                <a16:creationId xmlns:a16="http://schemas.microsoft.com/office/drawing/2014/main" id="{B0B10FF8-98D8-2002-C37F-DC7721DB6145}"/>
+                <a16:creationId xmlns:a16="http://schemas.microsoft.com/office/drawing/2014/main" id="{71433AF9-59D5-B1B0-B5D7-28F3B0F95FE5}"/>
               </a:ext>
             </a:extLst>
           </p:cNvPr>
@@ -3481,30 +3491,75 @@
           <a:p>
             <a:r>
               <a:rPr lang="en-US" dirty="0"/>
-              <a:t>Realistically, it is </a:t>
-            </a:r>
-            <a:r>
-              <a:rPr lang="en-US" i="1" dirty="0"/>
-              <a:t>difficult</a:t>
-            </a:r>
-            <a:r>
-              <a:rPr lang="en-US" dirty="0"/>
-              <a:t> to reach the threshold at which unwanted audio artifacts occur.</a:t>
+              <a:t>Plugins are typically composed of three components:</a:t>
             </a:r>
           </a:p>
           <a:p>
             <a:pPr lvl="1"/>
             <a:r>
               <a:rPr lang="en-US" dirty="0"/>
-              <a:t>(Maintaining good conventions, that is).</a:t>
-            </a:r>
+              <a:t>A plugin controller file (myplugincontroller.cpp)</a:t>
+            </a:r>
+          </a:p>
+          <a:p>
+            <a:pPr lvl="1"/>
+            <a:r>
+              <a:rPr lang="en-US" dirty="0"/>
+              <a:t>A plugin processor file (mypluginprocessor.cpp)</a:t>
+            </a:r>
+          </a:p>
+          <a:p>
+            <a:pPr lvl="1"/>
+            <a:r>
+              <a:rPr lang="en-US" dirty="0"/>
+              <a:t>A plugin entry file (mypluginentry.cpp)</a:t>
+            </a:r>
+          </a:p>
+          <a:p>
+            <a:r>
+              <a:rPr lang="en-US" dirty="0"/>
+              <a:t>A controller file handles GUI </a:t>
+            </a:r>
+            <a:r>
+              <a:rPr lang="en-US" dirty="0">
+                <a:sym typeface="Wingdings" panose="05000000000000000000" pitchFamily="2" charset="2"/>
+              </a:rPr>
+              <a:t> </a:t>
+            </a:r>
+            <a:r>
+              <a:rPr lang="en-US" dirty="0" err="1">
+                <a:sym typeface="Wingdings" panose="05000000000000000000" pitchFamily="2" charset="2"/>
+              </a:rPr>
+              <a:t>myplugineditor.uidesc</a:t>
+            </a:r>
+            <a:endParaRPr lang="en-US" dirty="0">
+              <a:sym typeface="Wingdings" panose="05000000000000000000" pitchFamily="2" charset="2"/>
+            </a:endParaRPr>
+          </a:p>
+          <a:p>
+            <a:r>
+              <a:rPr lang="en-US" dirty="0"/>
+              <a:t>.vst3 format is a repackaged DLL file </a:t>
+            </a:r>
+            <a:r>
+              <a:rPr lang="en-US" dirty="0">
+                <a:sym typeface="Wingdings" panose="05000000000000000000" pitchFamily="2" charset="2"/>
+              </a:rPr>
+              <a:t> can be executed as a standalone application or within Digital Audio Workstations (DAWs).</a:t>
+            </a:r>
+          </a:p>
+          <a:p>
+            <a:endParaRPr lang="en-US" dirty="0"/>
+          </a:p>
+          <a:p>
+            <a:endParaRPr lang="en-US" dirty="0"/>
           </a:p>
         </p:txBody>
       </p:sp>
     </p:spTree>
     <p:extLst>
       <p:ext uri="{BB962C8B-B14F-4D97-AF65-F5344CB8AC3E}">
-        <p14:creationId xmlns:p14="http://schemas.microsoft.com/office/powerpoint/2010/main" val="1822269553"/>
+        <p14:creationId xmlns:p14="http://schemas.microsoft.com/office/powerpoint/2010/main" val="2733528102"/>
       </p:ext>
     </p:extLst>
   </p:cSld>
@@ -3517,6 +3572,14 @@
 <file path=ppt/slides/slide11.xml><?xml version="1.0" encoding="utf-8"?>
 <p:sld xmlns:a="http://schemas.openxmlformats.org/drawingml/2006/main" xmlns:r="http://schemas.openxmlformats.org/officeDocument/2006/relationships" xmlns:p="http://schemas.openxmlformats.org/presentationml/2006/main">
   <p:cSld>
+    <p:bg>
+      <p:bgPr>
+        <a:solidFill>
+          <a:schemeClr val="bg1"/>
+        </a:solidFill>
+        <a:effectLst/>
+      </p:bgPr>
+    </p:bg>
     <p:spTree>
       <p:nvGrpSpPr>
         <p:cNvPr id="1" name=""/>
@@ -3536,7 +3599,7 @@
           <p:cNvPr id="2" name="Title 1">
             <a:extLst>
               <a:ext uri="{FF2B5EF4-FFF2-40B4-BE49-F238E27FC236}">
-                <a16:creationId xmlns:a16="http://schemas.microsoft.com/office/drawing/2014/main" id="{839E7B33-D4E5-2EFE-0549-923AE2592533}"/>
+                <a16:creationId xmlns:a16="http://schemas.microsoft.com/office/drawing/2014/main" id="{1825EBF1-C504-9C69-E779-356F80DA0C8A}"/>
               </a:ext>
             </a:extLst>
           </p:cNvPr>
@@ -3547,15 +3610,21 @@
             <p:ph type="title"/>
           </p:nvPr>
         </p:nvSpPr>
-        <p:spPr/>
-        <p:txBody>
-          <a:bodyPr/>
-          <a:lstStyle/>
-          <a:p>
-            <a:pPr algn="ctr"/>
-            <a:r>
-              <a:rPr lang="en-US" dirty="0"/>
-              <a:t>Part 2 – Practical Application</a:t>
+        <p:spPr>
+          <a:xfrm>
+            <a:off x="876693" y="741391"/>
+            <a:ext cx="3953724" cy="1616203"/>
+          </a:xfrm>
+        </p:spPr>
+        <p:txBody>
+          <a:bodyPr anchor="b">
+            <a:normAutofit/>
+          </a:bodyPr>
+          <a:lstStyle/>
+          <a:p>
+            <a:r>
+              <a:rPr lang="en-US" sz="3200" dirty="0"/>
+              <a:t>Obtaining MIDI Input</a:t>
             </a:r>
           </a:p>
         </p:txBody>
@@ -3565,7 +3634,7 @@
           <p:cNvPr id="3" name="Content Placeholder 2">
             <a:extLst>
               <a:ext uri="{FF2B5EF4-FFF2-40B4-BE49-F238E27FC236}">
-                <a16:creationId xmlns:a16="http://schemas.microsoft.com/office/drawing/2014/main" id="{52FE4D25-564A-0135-F376-2ABCBAC74974}"/>
+                <a16:creationId xmlns:a16="http://schemas.microsoft.com/office/drawing/2014/main" id="{2F633204-4E0C-8973-5DA7-A5AE873E06CD}"/>
               </a:ext>
             </a:extLst>
           </p:cNvPr>
@@ -3576,37 +3645,118 @@
             <p:ph idx="1"/>
           </p:nvPr>
         </p:nvSpPr>
-        <p:spPr/>
-        <p:txBody>
-          <a:bodyPr/>
-          <a:lstStyle/>
-          <a:p>
-            <a:r>
-              <a:rPr lang="en-US" dirty="0"/>
-              <a:t>How are VST programs generally structured?</a:t>
-            </a:r>
-          </a:p>
-          <a:p>
-            <a:r>
-              <a:rPr lang="en-US" dirty="0"/>
-              <a:t>How do we obtain MIDI input?</a:t>
-            </a:r>
-          </a:p>
-          <a:p>
-            <a:r>
-              <a:rPr lang="en-US" dirty="0"/>
-              <a:t>How do we create basic waveforms?</a:t>
-            </a:r>
-          </a:p>
-          <a:p>
-            <a:endParaRPr lang="en-US" dirty="0"/>
-          </a:p>
-        </p:txBody>
-      </p:sp>
+        <p:spPr>
+          <a:xfrm>
+            <a:off x="876693" y="2533476"/>
+            <a:ext cx="5305446" cy="3447832"/>
+          </a:xfrm>
+        </p:spPr>
+        <p:txBody>
+          <a:bodyPr anchor="t">
+            <a:normAutofit/>
+          </a:bodyPr>
+          <a:lstStyle/>
+          <a:p>
+            <a:r>
+              <a:rPr lang="en-US" sz="2000" dirty="0"/>
+              <a:t>The </a:t>
+            </a:r>
+            <a:r>
+              <a:rPr lang="en-US" sz="2000" i="1" dirty="0"/>
+              <a:t>Steinberg::</a:t>
+            </a:r>
+            <a:r>
+              <a:rPr lang="en-US" sz="2000" i="1" dirty="0" err="1"/>
+              <a:t>Vst</a:t>
+            </a:r>
+            <a:r>
+              <a:rPr lang="en-US" sz="2000" i="1" dirty="0"/>
+              <a:t> </a:t>
+            </a:r>
+            <a:r>
+              <a:rPr lang="en-US" sz="2000" dirty="0"/>
+              <a:t>namespace contains a </a:t>
+            </a:r>
+            <a:r>
+              <a:rPr lang="en-US" sz="2000" i="1" dirty="0" err="1"/>
+              <a:t>IEventList</a:t>
+            </a:r>
+            <a:r>
+              <a:rPr lang="en-US" sz="2000" dirty="0"/>
+              <a:t> class which processes “events” (i.e. signals).</a:t>
+            </a:r>
+          </a:p>
+          <a:p>
+            <a:r>
+              <a:rPr lang="en-US" sz="2000" dirty="0"/>
+              <a:t>The provided MIDI note found in </a:t>
+            </a:r>
+            <a:r>
+              <a:rPr lang="en-US" sz="2000" i="1" dirty="0" err="1"/>
+              <a:t>event.noteOn.pitch</a:t>
+            </a:r>
+            <a:r>
+              <a:rPr lang="en-US" sz="2000" dirty="0"/>
+              <a:t> is used to calculate </a:t>
+            </a:r>
+            <a:r>
+              <a:rPr lang="en-US" sz="2000" dirty="0" err="1"/>
+              <a:t>fFrequency</a:t>
+            </a:r>
+            <a:r>
+              <a:rPr lang="en-US" sz="2000" dirty="0"/>
+              <a:t> in relation to a particular reference note (A4 </a:t>
+            </a:r>
+            <a:r>
+              <a:rPr lang="en-US" sz="2000" dirty="0">
+                <a:sym typeface="Wingdings" panose="05000000000000000000" pitchFamily="2" charset="2"/>
+              </a:rPr>
+              <a:t></a:t>
+            </a:r>
+            <a:r>
+              <a:rPr lang="en-US" sz="2000" dirty="0"/>
+              <a:t> 440 Hz, MIDI # 69).  </a:t>
+            </a:r>
+          </a:p>
+          <a:p>
+            <a:endParaRPr lang="en-US" sz="2000" dirty="0"/>
+          </a:p>
+        </p:txBody>
+      </p:sp>
+      <p:pic>
+        <p:nvPicPr>
+          <p:cNvPr id="5" name="Picture 4">
+            <a:extLst>
+              <a:ext uri="{FF2B5EF4-FFF2-40B4-BE49-F238E27FC236}">
+                <a16:creationId xmlns:a16="http://schemas.microsoft.com/office/drawing/2014/main" id="{A8392CE2-8505-83CF-25B1-ED431B57279E}"/>
+              </a:ext>
+            </a:extLst>
+          </p:cNvPr>
+          <p:cNvPicPr>
+            <a:picLocks noChangeAspect="1"/>
+          </p:cNvPicPr>
+          <p:nvPr/>
+        </p:nvPicPr>
+        <p:blipFill>
+          <a:blip r:embed="rId2"/>
+          <a:stretch>
+            <a:fillRect/>
+          </a:stretch>
+        </p:blipFill>
+        <p:spPr>
+          <a:xfrm>
+            <a:off x="6475260" y="1991016"/>
+            <a:ext cx="5100539" cy="3073074"/>
+          </a:xfrm>
+          <a:prstGeom prst="rect">
+            <a:avLst/>
+          </a:prstGeom>
+        </p:spPr>
+      </p:pic>
     </p:spTree>
     <p:extLst>
       <p:ext uri="{BB962C8B-B14F-4D97-AF65-F5344CB8AC3E}">
-        <p14:creationId xmlns:p14="http://schemas.microsoft.com/office/powerpoint/2010/main" val="2732180309"/>
+        <p14:creationId xmlns:p14="http://schemas.microsoft.com/office/powerpoint/2010/main" val="885847856"/>
       </p:ext>
     </p:extLst>
   </p:cSld>
@@ -3619,6 +3769,14 @@
 <file path=ppt/slides/slide12.xml><?xml version="1.0" encoding="utf-8"?>
 <p:sld xmlns:a="http://schemas.openxmlformats.org/drawingml/2006/main" xmlns:r="http://schemas.openxmlformats.org/officeDocument/2006/relationships" xmlns:p="http://schemas.openxmlformats.org/presentationml/2006/main">
   <p:cSld>
+    <p:bg>
+      <p:bgPr>
+        <a:solidFill>
+          <a:schemeClr val="bg1"/>
+        </a:solidFill>
+        <a:effectLst/>
+      </p:bgPr>
+    </p:bg>
     <p:spTree>
       <p:nvGrpSpPr>
         <p:cNvPr id="1" name=""/>
@@ -3638,7 +3796,7 @@
           <p:cNvPr id="2" name="Title 1">
             <a:extLst>
               <a:ext uri="{FF2B5EF4-FFF2-40B4-BE49-F238E27FC236}">
-                <a16:creationId xmlns:a16="http://schemas.microsoft.com/office/drawing/2014/main" id="{728DC00F-2FBB-549C-2793-3E4E9BB87AB6}"/>
+                <a16:creationId xmlns:a16="http://schemas.microsoft.com/office/drawing/2014/main" id="{0549F25A-E0A9-245C-15C8-B14447F53BBA}"/>
               </a:ext>
             </a:extLst>
           </p:cNvPr>
@@ -3649,14 +3807,21 @@
             <p:ph type="title"/>
           </p:nvPr>
         </p:nvSpPr>
-        <p:spPr/>
-        <p:txBody>
-          <a:bodyPr/>
-          <a:lstStyle/>
-          <a:p>
-            <a:r>
-              <a:rPr lang="en-US" dirty="0"/>
-              <a:t>Structure</a:t>
+        <p:spPr>
+          <a:xfrm>
+            <a:off x="876693" y="741391"/>
+            <a:ext cx="5007272" cy="1616203"/>
+          </a:xfrm>
+        </p:spPr>
+        <p:txBody>
+          <a:bodyPr anchor="b">
+            <a:normAutofit/>
+          </a:bodyPr>
+          <a:lstStyle/>
+          <a:p>
+            <a:r>
+              <a:rPr lang="en-US" sz="3200" dirty="0"/>
+              <a:t>Obtaining MIDI Input (cont.)</a:t>
             </a:r>
           </a:p>
         </p:txBody>
@@ -3666,7 +3831,7 @@
           <p:cNvPr id="3" name="Content Placeholder 2">
             <a:extLst>
               <a:ext uri="{FF2B5EF4-FFF2-40B4-BE49-F238E27FC236}">
-                <a16:creationId xmlns:a16="http://schemas.microsoft.com/office/drawing/2014/main" id="{71433AF9-59D5-B1B0-B5D7-28F3B0F95FE5}"/>
+                <a16:creationId xmlns:a16="http://schemas.microsoft.com/office/drawing/2014/main" id="{FAD477CA-633A-1D84-27CD-8B9038E05295}"/>
               </a:ext>
             </a:extLst>
           </p:cNvPr>
@@ -3677,52 +3842,73 @@
             <p:ph idx="1"/>
           </p:nvPr>
         </p:nvSpPr>
-        <p:spPr/>
-        <p:txBody>
-          <a:bodyPr/>
-          <a:lstStyle/>
-          <a:p>
-            <a:r>
-              <a:rPr lang="en-US" dirty="0"/>
-              <a:t>Plugins are typically composed of three components:</a:t>
-            </a:r>
-          </a:p>
-          <a:p>
-            <a:pPr lvl="1"/>
-            <a:r>
-              <a:rPr lang="en-US" dirty="0"/>
-              <a:t>A plugin controller file (myplugincontroller.cpp)</a:t>
-            </a:r>
-          </a:p>
-          <a:p>
-            <a:pPr lvl="1"/>
-            <a:r>
-              <a:rPr lang="en-US" dirty="0"/>
-              <a:t>A plugin processor file (mypluginprocessor.cpp)</a:t>
-            </a:r>
-          </a:p>
-          <a:p>
-            <a:pPr lvl="1"/>
-            <a:r>
-              <a:rPr lang="en-US" dirty="0"/>
-              <a:t>A plugin entry file (mypluginentry.cpp)</a:t>
-            </a:r>
-          </a:p>
-          <a:p>
-            <a:r>
-              <a:rPr lang="en-US" dirty="0"/>
-              <a:t>[].</a:t>
-            </a:r>
-          </a:p>
-          <a:p>
-            <a:endParaRPr lang="en-US" dirty="0"/>
-          </a:p>
-        </p:txBody>
-      </p:sp>
+        <p:spPr>
+          <a:xfrm>
+            <a:off x="876693" y="2533476"/>
+            <a:ext cx="5091585" cy="3447832"/>
+          </a:xfrm>
+        </p:spPr>
+        <p:txBody>
+          <a:bodyPr anchor="t">
+            <a:normAutofit/>
+          </a:bodyPr>
+          <a:lstStyle/>
+          <a:p>
+            <a:r>
+              <a:rPr lang="en-US" sz="2000" dirty="0"/>
+              <a:t>Notes lower than our reference pitch will generate a power of 2 to a negative exponent (!)</a:t>
+            </a:r>
+          </a:p>
+          <a:p>
+            <a:r>
+              <a:rPr lang="en-US" sz="2000" dirty="0"/>
+              <a:t>This is expected as the resulting frequency will be </a:t>
+            </a:r>
+            <a:r>
+              <a:rPr lang="en-US" sz="2000" i="1" dirty="0"/>
+              <a:t>lower</a:t>
+            </a:r>
+            <a:r>
+              <a:rPr lang="en-US" sz="2000" dirty="0"/>
+              <a:t> than our reference pitch when multiplied.</a:t>
+            </a:r>
+          </a:p>
+        </p:txBody>
+      </p:sp>
+      <p:pic>
+        <p:nvPicPr>
+          <p:cNvPr id="5" name="Picture 4">
+            <a:extLst>
+              <a:ext uri="{FF2B5EF4-FFF2-40B4-BE49-F238E27FC236}">
+                <a16:creationId xmlns:a16="http://schemas.microsoft.com/office/drawing/2014/main" id="{6786EC1A-0FE5-42C0-3BC5-9F37E6308CD6}"/>
+              </a:ext>
+            </a:extLst>
+          </p:cNvPr>
+          <p:cNvPicPr>
+            <a:picLocks noChangeAspect="1"/>
+          </p:cNvPicPr>
+          <p:nvPr/>
+        </p:nvPicPr>
+        <p:blipFill>
+          <a:blip r:embed="rId2"/>
+          <a:stretch>
+            <a:fillRect/>
+          </a:stretch>
+        </p:blipFill>
+        <p:spPr>
+          <a:xfrm>
+            <a:off x="6223723" y="741391"/>
+            <a:ext cx="3917244" cy="5384528"/>
+          </a:xfrm>
+          <a:prstGeom prst="rect">
+            <a:avLst/>
+          </a:prstGeom>
+        </p:spPr>
+      </p:pic>
     </p:spTree>
     <p:extLst>
       <p:ext uri="{BB962C8B-B14F-4D97-AF65-F5344CB8AC3E}">
-        <p14:creationId xmlns:p14="http://schemas.microsoft.com/office/powerpoint/2010/main" val="2733528102"/>
+        <p14:creationId xmlns:p14="http://schemas.microsoft.com/office/powerpoint/2010/main" val="1148323293"/>
       </p:ext>
     </p:extLst>
   </p:cSld>
@@ -3762,204 +3948,7 @@
           <p:cNvPr id="2" name="Title 1">
             <a:extLst>
               <a:ext uri="{FF2B5EF4-FFF2-40B4-BE49-F238E27FC236}">
-                <a16:creationId xmlns:a16="http://schemas.microsoft.com/office/drawing/2014/main" id="{1825EBF1-C504-9C69-E779-356F80DA0C8A}"/>
-              </a:ext>
-            </a:extLst>
-          </p:cNvPr>
-          <p:cNvSpPr>
-            <a:spLocks noGrp="1"/>
-          </p:cNvSpPr>
-          <p:nvPr>
-            <p:ph type="title"/>
-          </p:nvPr>
-        </p:nvSpPr>
-        <p:spPr>
-          <a:xfrm>
-            <a:off x="876693" y="741391"/>
-            <a:ext cx="3953724" cy="1616203"/>
-          </a:xfrm>
-        </p:spPr>
-        <p:txBody>
-          <a:bodyPr anchor="b">
-            <a:normAutofit/>
-          </a:bodyPr>
-          <a:lstStyle/>
-          <a:p>
-            <a:r>
-              <a:rPr lang="en-US" sz="3200" dirty="0"/>
-              <a:t>Obtaining MIDI Input</a:t>
-            </a:r>
-          </a:p>
-        </p:txBody>
-      </p:sp>
-      <p:sp>
-        <p:nvSpPr>
-          <p:cNvPr id="3" name="Content Placeholder 2">
-            <a:extLst>
-              <a:ext uri="{FF2B5EF4-FFF2-40B4-BE49-F238E27FC236}">
-                <a16:creationId xmlns:a16="http://schemas.microsoft.com/office/drawing/2014/main" id="{2F633204-4E0C-8973-5DA7-A5AE873E06CD}"/>
-              </a:ext>
-            </a:extLst>
-          </p:cNvPr>
-          <p:cNvSpPr>
-            <a:spLocks noGrp="1"/>
-          </p:cNvSpPr>
-          <p:nvPr>
-            <p:ph idx="1"/>
-          </p:nvPr>
-        </p:nvSpPr>
-        <p:spPr>
-          <a:xfrm>
-            <a:off x="876693" y="2533476"/>
-            <a:ext cx="5305446" cy="3447832"/>
-          </a:xfrm>
-        </p:spPr>
-        <p:txBody>
-          <a:bodyPr anchor="t">
-            <a:normAutofit/>
-          </a:bodyPr>
-          <a:lstStyle/>
-          <a:p>
-            <a:r>
-              <a:rPr lang="en-US" sz="2000" dirty="0"/>
-              <a:t>The </a:t>
-            </a:r>
-            <a:r>
-              <a:rPr lang="en-US" sz="2000" i="1" dirty="0"/>
-              <a:t>Steinberg::</a:t>
-            </a:r>
-            <a:r>
-              <a:rPr lang="en-US" sz="2000" i="1" dirty="0" err="1"/>
-              <a:t>Vst</a:t>
-            </a:r>
-            <a:r>
-              <a:rPr lang="en-US" sz="2000" i="1" dirty="0"/>
-              <a:t> </a:t>
-            </a:r>
-            <a:r>
-              <a:rPr lang="en-US" sz="2000" dirty="0"/>
-              <a:t>namespace contains a </a:t>
-            </a:r>
-            <a:r>
-              <a:rPr lang="en-US" sz="2000" i="1" dirty="0" err="1"/>
-              <a:t>IEventList</a:t>
-            </a:r>
-            <a:r>
-              <a:rPr lang="en-US" sz="2000" dirty="0"/>
-              <a:t> class which processes “events” (i.e. signals).</a:t>
-            </a:r>
-          </a:p>
-          <a:p>
-            <a:r>
-              <a:rPr lang="en-US" sz="2000" dirty="0"/>
-              <a:t>The provided MIDI note found in </a:t>
-            </a:r>
-            <a:r>
-              <a:rPr lang="en-US" sz="2000" i="1" dirty="0" err="1"/>
-              <a:t>event.noteOn.pitch</a:t>
-            </a:r>
-            <a:r>
-              <a:rPr lang="en-US" sz="2000" dirty="0"/>
-              <a:t> is used to calculate </a:t>
-            </a:r>
-            <a:r>
-              <a:rPr lang="en-US" sz="2000" dirty="0" err="1"/>
-              <a:t>fFrequency</a:t>
-            </a:r>
-            <a:r>
-              <a:rPr lang="en-US" sz="2000" dirty="0"/>
-              <a:t> in relation to a particular reference note (A4 </a:t>
-            </a:r>
-            <a:r>
-              <a:rPr lang="en-US" sz="2000" dirty="0">
-                <a:sym typeface="Wingdings" panose="05000000000000000000" pitchFamily="2" charset="2"/>
-              </a:rPr>
-              <a:t></a:t>
-            </a:r>
-            <a:r>
-              <a:rPr lang="en-US" sz="2000" dirty="0"/>
-              <a:t> 440 Hz, MIDI # 69).  </a:t>
-            </a:r>
-          </a:p>
-          <a:p>
-            <a:endParaRPr lang="en-US" sz="2000" dirty="0"/>
-          </a:p>
-        </p:txBody>
-      </p:sp>
-      <p:pic>
-        <p:nvPicPr>
-          <p:cNvPr id="5" name="Picture 4">
-            <a:extLst>
-              <a:ext uri="{FF2B5EF4-FFF2-40B4-BE49-F238E27FC236}">
-                <a16:creationId xmlns:a16="http://schemas.microsoft.com/office/drawing/2014/main" id="{A8392CE2-8505-83CF-25B1-ED431B57279E}"/>
-              </a:ext>
-            </a:extLst>
-          </p:cNvPr>
-          <p:cNvPicPr>
-            <a:picLocks noChangeAspect="1"/>
-          </p:cNvPicPr>
-          <p:nvPr/>
-        </p:nvPicPr>
-        <p:blipFill>
-          <a:blip r:embed="rId2"/>
-          <a:stretch>
-            <a:fillRect/>
-          </a:stretch>
-        </p:blipFill>
-        <p:spPr>
-          <a:xfrm>
-            <a:off x="6475260" y="1991016"/>
-            <a:ext cx="5100539" cy="3073074"/>
-          </a:xfrm>
-          <a:prstGeom prst="rect">
-            <a:avLst/>
-          </a:prstGeom>
-        </p:spPr>
-      </p:pic>
-    </p:spTree>
-    <p:extLst>
-      <p:ext uri="{BB962C8B-B14F-4D97-AF65-F5344CB8AC3E}">
-        <p14:creationId xmlns:p14="http://schemas.microsoft.com/office/powerpoint/2010/main" val="885847856"/>
-      </p:ext>
-    </p:extLst>
-  </p:cSld>
-  <p:clrMapOvr>
-    <a:masterClrMapping/>
-  </p:clrMapOvr>
-</p:sld>
-</file>
-
-<file path=ppt/slides/slide14.xml><?xml version="1.0" encoding="utf-8"?>
-<p:sld xmlns:a="http://schemas.openxmlformats.org/drawingml/2006/main" xmlns:r="http://schemas.openxmlformats.org/officeDocument/2006/relationships" xmlns:p="http://schemas.openxmlformats.org/presentationml/2006/main">
-  <p:cSld>
-    <p:bg>
-      <p:bgPr>
-        <a:solidFill>
-          <a:schemeClr val="bg1"/>
-        </a:solidFill>
-        <a:effectLst/>
-      </p:bgPr>
-    </p:bg>
-    <p:spTree>
-      <p:nvGrpSpPr>
-        <p:cNvPr id="1" name=""/>
-        <p:cNvGrpSpPr/>
-        <p:nvPr/>
-      </p:nvGrpSpPr>
-      <p:grpSpPr>
-        <a:xfrm>
-          <a:off x="0" y="0"/>
-          <a:ext cx="0" cy="0"/>
-          <a:chOff x="0" y="0"/>
-          <a:chExt cx="0" cy="0"/>
-        </a:xfrm>
-      </p:grpSpPr>
-      <p:sp>
-        <p:nvSpPr>
-          <p:cNvPr id="2" name="Title 1">
-            <a:extLst>
-              <a:ext uri="{FF2B5EF4-FFF2-40B4-BE49-F238E27FC236}">
-                <a16:creationId xmlns:a16="http://schemas.microsoft.com/office/drawing/2014/main" id="{0549F25A-E0A9-245C-15C8-B14447F53BBA}"/>
+                <a16:creationId xmlns:a16="http://schemas.microsoft.com/office/drawing/2014/main" id="{2431C675-1136-12AB-81FB-2994DE909889}"/>
               </a:ext>
             </a:extLst>
           </p:cNvPr>
@@ -3984,158 +3973,6 @@
           <a:p>
             <a:r>
               <a:rPr lang="en-US" sz="3200" dirty="0"/>
-              <a:t>Obtaining MIDI Input (cont.)</a:t>
-            </a:r>
-          </a:p>
-        </p:txBody>
-      </p:sp>
-      <p:sp>
-        <p:nvSpPr>
-          <p:cNvPr id="3" name="Content Placeholder 2">
-            <a:extLst>
-              <a:ext uri="{FF2B5EF4-FFF2-40B4-BE49-F238E27FC236}">
-                <a16:creationId xmlns:a16="http://schemas.microsoft.com/office/drawing/2014/main" id="{FAD477CA-633A-1D84-27CD-8B9038E05295}"/>
-              </a:ext>
-            </a:extLst>
-          </p:cNvPr>
-          <p:cNvSpPr>
-            <a:spLocks noGrp="1"/>
-          </p:cNvSpPr>
-          <p:nvPr>
-            <p:ph idx="1"/>
-          </p:nvPr>
-        </p:nvSpPr>
-        <p:spPr>
-          <a:xfrm>
-            <a:off x="876693" y="2533476"/>
-            <a:ext cx="5091585" cy="3447832"/>
-          </a:xfrm>
-        </p:spPr>
-        <p:txBody>
-          <a:bodyPr anchor="t">
-            <a:normAutofit/>
-          </a:bodyPr>
-          <a:lstStyle/>
-          <a:p>
-            <a:r>
-              <a:rPr lang="en-US" sz="2000" dirty="0"/>
-              <a:t>Notes lower than our reference pitch will generate a power of 2 to a negative exponent (!)</a:t>
-            </a:r>
-          </a:p>
-          <a:p>
-            <a:r>
-              <a:rPr lang="en-US" sz="2000" dirty="0"/>
-              <a:t>This is expected as the resulting frequency will be </a:t>
-            </a:r>
-            <a:r>
-              <a:rPr lang="en-US" sz="2000" i="1" dirty="0"/>
-              <a:t>lower</a:t>
-            </a:r>
-            <a:r>
-              <a:rPr lang="en-US" sz="2000" dirty="0"/>
-              <a:t> than our reference pitch when multiplied.</a:t>
-            </a:r>
-          </a:p>
-        </p:txBody>
-      </p:sp>
-      <p:pic>
-        <p:nvPicPr>
-          <p:cNvPr id="5" name="Picture 4">
-            <a:extLst>
-              <a:ext uri="{FF2B5EF4-FFF2-40B4-BE49-F238E27FC236}">
-                <a16:creationId xmlns:a16="http://schemas.microsoft.com/office/drawing/2014/main" id="{6786EC1A-0FE5-42C0-3BC5-9F37E6308CD6}"/>
-              </a:ext>
-            </a:extLst>
-          </p:cNvPr>
-          <p:cNvPicPr>
-            <a:picLocks noChangeAspect="1"/>
-          </p:cNvPicPr>
-          <p:nvPr/>
-        </p:nvPicPr>
-        <p:blipFill>
-          <a:blip r:embed="rId2"/>
-          <a:stretch>
-            <a:fillRect/>
-          </a:stretch>
-        </p:blipFill>
-        <p:spPr>
-          <a:xfrm>
-            <a:off x="6223723" y="741391"/>
-            <a:ext cx="3917244" cy="5384528"/>
-          </a:xfrm>
-          <a:prstGeom prst="rect">
-            <a:avLst/>
-          </a:prstGeom>
-        </p:spPr>
-      </p:pic>
-    </p:spTree>
-    <p:extLst>
-      <p:ext uri="{BB962C8B-B14F-4D97-AF65-F5344CB8AC3E}">
-        <p14:creationId xmlns:p14="http://schemas.microsoft.com/office/powerpoint/2010/main" val="1148323293"/>
-      </p:ext>
-    </p:extLst>
-  </p:cSld>
-  <p:clrMapOvr>
-    <a:masterClrMapping/>
-  </p:clrMapOvr>
-</p:sld>
-</file>
-
-<file path=ppt/slides/slide15.xml><?xml version="1.0" encoding="utf-8"?>
-<p:sld xmlns:a="http://schemas.openxmlformats.org/drawingml/2006/main" xmlns:r="http://schemas.openxmlformats.org/officeDocument/2006/relationships" xmlns:p="http://schemas.openxmlformats.org/presentationml/2006/main">
-  <p:cSld>
-    <p:bg>
-      <p:bgPr>
-        <a:solidFill>
-          <a:schemeClr val="bg1"/>
-        </a:solidFill>
-        <a:effectLst/>
-      </p:bgPr>
-    </p:bg>
-    <p:spTree>
-      <p:nvGrpSpPr>
-        <p:cNvPr id="1" name=""/>
-        <p:cNvGrpSpPr/>
-        <p:nvPr/>
-      </p:nvGrpSpPr>
-      <p:grpSpPr>
-        <a:xfrm>
-          <a:off x="0" y="0"/>
-          <a:ext cx="0" cy="0"/>
-          <a:chOff x="0" y="0"/>
-          <a:chExt cx="0" cy="0"/>
-        </a:xfrm>
-      </p:grpSpPr>
-      <p:sp>
-        <p:nvSpPr>
-          <p:cNvPr id="2" name="Title 1">
-            <a:extLst>
-              <a:ext uri="{FF2B5EF4-FFF2-40B4-BE49-F238E27FC236}">
-                <a16:creationId xmlns:a16="http://schemas.microsoft.com/office/drawing/2014/main" id="{2431C675-1136-12AB-81FB-2994DE909889}"/>
-              </a:ext>
-            </a:extLst>
-          </p:cNvPr>
-          <p:cNvSpPr>
-            <a:spLocks noGrp="1"/>
-          </p:cNvSpPr>
-          <p:nvPr>
-            <p:ph type="title"/>
-          </p:nvPr>
-        </p:nvSpPr>
-        <p:spPr>
-          <a:xfrm>
-            <a:off x="876693" y="741391"/>
-            <a:ext cx="5007272" cy="1616203"/>
-          </a:xfrm>
-        </p:spPr>
-        <p:txBody>
-          <a:bodyPr anchor="b">
-            <a:normAutofit/>
-          </a:bodyPr>
-          <a:lstStyle/>
-          <a:p>
-            <a:r>
-              <a:rPr lang="en-US" sz="3200" dirty="0"/>
               <a:t>Creating Waveforms in Code</a:t>
             </a:r>
           </a:p>
@@ -4176,8 +4013,22 @@
           </a:p>
           <a:p>
             <a:r>
+              <a:rPr lang="en-US" sz="2000" i="1" dirty="0"/>
+              <a:t>fOsc1Mode</a:t>
+            </a:r>
+            <a:r>
               <a:rPr lang="en-US" sz="2000" dirty="0"/>
-              <a:t>[].</a:t>
+              <a:t> determines which state the knob is in from the GUI </a:t>
+            </a:r>
+            <a:r>
+              <a:rPr lang="en-US" sz="2000" dirty="0">
+                <a:sym typeface="Wingdings" panose="05000000000000000000" pitchFamily="2" charset="2"/>
+              </a:rPr>
+              <a:t> determines which waveform to generate in the buffer</a:t>
+            </a:r>
+            <a:r>
+              <a:rPr lang="en-US" sz="2000" dirty="0"/>
+              <a:t>.</a:t>
             </a:r>
           </a:p>
         </p:txBody>
@@ -4225,7 +4076,7 @@
 </p:sld>
 </file>
 
-<file path=ppt/slides/slide16.xml><?xml version="1.0" encoding="utf-8"?>
+<file path=ppt/slides/slide14.xml><?xml version="1.0" encoding="utf-8"?>
 <p:sld xmlns:a="http://schemas.openxmlformats.org/drawingml/2006/main" xmlns:r="http://schemas.openxmlformats.org/officeDocument/2006/relationships" xmlns:p="http://schemas.openxmlformats.org/presentationml/2006/main">
   <p:cSld>
     <p:spTree>
@@ -4247,7 +4098,7 @@
           <p:cNvPr id="2" name="Title 1">
             <a:extLst>
               <a:ext uri="{FF2B5EF4-FFF2-40B4-BE49-F238E27FC236}">
-                <a16:creationId xmlns:a16="http://schemas.microsoft.com/office/drawing/2014/main" id="{B69F5441-6DF2-9EFF-E7B2-DE006D63911B}"/>
+                <a16:creationId xmlns:a16="http://schemas.microsoft.com/office/drawing/2014/main" id="{54A2530F-D836-A774-F725-90248FC04C87}"/>
               </a:ext>
             </a:extLst>
           </p:cNvPr>
@@ -4263,43 +4114,48 @@
           <a:bodyPr/>
           <a:lstStyle/>
           <a:p>
-            <a:r>
-              <a:rPr lang="en-US" sz="4400" dirty="0"/>
-              <a:t>Creating Waveforms in Code (cont.)</a:t>
-            </a:r>
-            <a:endParaRPr lang="en-US" dirty="0"/>
-          </a:p>
-        </p:txBody>
-      </p:sp>
-      <p:sp>
-        <p:nvSpPr>
-          <p:cNvPr id="3" name="Content Placeholder 2">
-            <a:extLst>
-              <a:ext uri="{FF2B5EF4-FFF2-40B4-BE49-F238E27FC236}">
-                <a16:creationId xmlns:a16="http://schemas.microsoft.com/office/drawing/2014/main" id="{ECD1317F-E7FD-70E6-501B-7B413BDC9F0D}"/>
-              </a:ext>
-            </a:extLst>
-          </p:cNvPr>
-          <p:cNvSpPr>
-            <a:spLocks noGrp="1"/>
-          </p:cNvSpPr>
-          <p:nvPr>
-            <p:ph idx="1"/>
-          </p:nvPr>
-        </p:nvSpPr>
-        <p:spPr/>
-        <p:txBody>
-          <a:bodyPr/>
-          <a:lstStyle/>
-          <a:p>
-            <a:endParaRPr lang="en-US"/>
-          </a:p>
-        </p:txBody>
-      </p:sp>
+            <a:pPr algn="ctr"/>
+            <a:r>
+              <a:rPr lang="en-US" dirty="0"/>
+              <a:t>Part 3 – Program Demo</a:t>
+            </a:r>
+          </a:p>
+        </p:txBody>
+      </p:sp>
+      <p:pic>
+        <p:nvPicPr>
+          <p:cNvPr id="4" name="Picture 3">
+            <a:extLst>
+              <a:ext uri="{FF2B5EF4-FFF2-40B4-BE49-F238E27FC236}">
+                <a16:creationId xmlns:a16="http://schemas.microsoft.com/office/drawing/2014/main" id="{DC34D60C-5673-81BB-202E-0BB0E8D727B9}"/>
+              </a:ext>
+            </a:extLst>
+          </p:cNvPr>
+          <p:cNvPicPr>
+            <a:picLocks noChangeAspect="1"/>
+          </p:cNvPicPr>
+          <p:nvPr/>
+        </p:nvPicPr>
+        <p:blipFill>
+          <a:blip r:embed="rId2"/>
+          <a:stretch>
+            <a:fillRect/>
+          </a:stretch>
+        </p:blipFill>
+        <p:spPr>
+          <a:xfrm>
+            <a:off x="3705225" y="1690688"/>
+            <a:ext cx="4781550" cy="4333875"/>
+          </a:xfrm>
+          <a:prstGeom prst="rect">
+            <a:avLst/>
+          </a:prstGeom>
+        </p:spPr>
+      </p:pic>
     </p:spTree>
     <p:extLst>
       <p:ext uri="{BB962C8B-B14F-4D97-AF65-F5344CB8AC3E}">
-        <p14:creationId xmlns:p14="http://schemas.microsoft.com/office/powerpoint/2010/main" val="3201257500"/>
+        <p14:creationId xmlns:p14="http://schemas.microsoft.com/office/powerpoint/2010/main" val="3849701593"/>
       </p:ext>
     </p:extLst>
   </p:cSld>
@@ -4309,7 +4165,7 @@
 </p:sld>
 </file>
 
-<file path=ppt/slides/slide17.xml><?xml version="1.0" encoding="utf-8"?>
+<file path=ppt/slides/slide15.xml><?xml version="1.0" encoding="utf-8"?>
 <p:sld xmlns:a="http://schemas.openxmlformats.org/drawingml/2006/main" xmlns:r="http://schemas.openxmlformats.org/officeDocument/2006/relationships" xmlns:p="http://schemas.openxmlformats.org/presentationml/2006/main">
   <p:cSld>
     <p:spTree>
@@ -4331,7 +4187,7 @@
           <p:cNvPr id="2" name="Title 1">
             <a:extLst>
               <a:ext uri="{FF2B5EF4-FFF2-40B4-BE49-F238E27FC236}">
-                <a16:creationId xmlns:a16="http://schemas.microsoft.com/office/drawing/2014/main" id="{54A2530F-D836-A774-F725-90248FC04C87}"/>
+                <a16:creationId xmlns:a16="http://schemas.microsoft.com/office/drawing/2014/main" id="{DCEA24C1-28A2-6C11-0ED0-A131C138496E}"/>
               </a:ext>
             </a:extLst>
           </p:cNvPr>
@@ -4347,58 +4203,27 @@
           <a:bodyPr/>
           <a:lstStyle/>
           <a:p>
-            <a:pPr algn="ctr"/>
-            <a:r>
-              <a:rPr lang="en-US" dirty="0"/>
-              <a:t>Part 3 – Program Demo</a:t>
-            </a:r>
-          </a:p>
-        </p:txBody>
-      </p:sp>
-    </p:spTree>
-    <p:extLst>
-      <p:ext uri="{BB962C8B-B14F-4D97-AF65-F5344CB8AC3E}">
-        <p14:creationId xmlns:p14="http://schemas.microsoft.com/office/powerpoint/2010/main" val="3849701593"/>
-      </p:ext>
-    </p:extLst>
-  </p:cSld>
-  <p:clrMapOvr>
-    <a:masterClrMapping/>
-  </p:clrMapOvr>
-</p:sld>
-</file>
-
-<file path=ppt/slides/slide18.xml><?xml version="1.0" encoding="utf-8"?>
-<p:sld xmlns:a="http://schemas.openxmlformats.org/drawingml/2006/main" xmlns:r="http://schemas.openxmlformats.org/officeDocument/2006/relationships" xmlns:p="http://schemas.openxmlformats.org/presentationml/2006/main">
-  <p:cSld>
-    <p:spTree>
-      <p:nvGrpSpPr>
-        <p:cNvPr id="1" name=""/>
-        <p:cNvGrpSpPr/>
-        <p:nvPr/>
-      </p:nvGrpSpPr>
-      <p:grpSpPr>
-        <a:xfrm>
-          <a:off x="0" y="0"/>
-          <a:ext cx="0" cy="0"/>
-          <a:chOff x="0" y="0"/>
-          <a:chExt cx="0" cy="0"/>
-        </a:xfrm>
-      </p:grpSpPr>
-      <p:sp>
-        <p:nvSpPr>
-          <p:cNvPr id="2" name="Title 1">
-            <a:extLst>
-              <a:ext uri="{FF2B5EF4-FFF2-40B4-BE49-F238E27FC236}">
-                <a16:creationId xmlns:a16="http://schemas.microsoft.com/office/drawing/2014/main" id="{DCEA24C1-28A2-6C11-0ED0-A131C138496E}"/>
-              </a:ext>
-            </a:extLst>
-          </p:cNvPr>
-          <p:cNvSpPr>
-            <a:spLocks noGrp="1"/>
-          </p:cNvSpPr>
-          <p:nvPr>
-            <p:ph type="title"/>
+            <a:r>
+              <a:rPr lang="en-US" dirty="0"/>
+              <a:t>Future Work</a:t>
+            </a:r>
+          </a:p>
+        </p:txBody>
+      </p:sp>
+      <p:sp>
+        <p:nvSpPr>
+          <p:cNvPr id="3" name="Content Placeholder 2">
+            <a:extLst>
+              <a:ext uri="{FF2B5EF4-FFF2-40B4-BE49-F238E27FC236}">
+                <a16:creationId xmlns:a16="http://schemas.microsoft.com/office/drawing/2014/main" id="{585979A7-FD56-F613-2ABB-45879F53D26B}"/>
+              </a:ext>
+            </a:extLst>
+          </p:cNvPr>
+          <p:cNvSpPr>
+            <a:spLocks noGrp="1"/>
+          </p:cNvSpPr>
+          <p:nvPr>
+            <p:ph idx="1"/>
           </p:nvPr>
         </p:nvSpPr>
         <p:spPr/>
@@ -4408,33 +4233,31 @@
           <a:p>
             <a:r>
               <a:rPr lang="en-US" dirty="0"/>
-              <a:t>Future Work</a:t>
-            </a:r>
-          </a:p>
-        </p:txBody>
-      </p:sp>
-      <p:sp>
-        <p:nvSpPr>
-          <p:cNvPr id="3" name="Content Placeholder 2">
-            <a:extLst>
-              <a:ext uri="{FF2B5EF4-FFF2-40B4-BE49-F238E27FC236}">
-                <a16:creationId xmlns:a16="http://schemas.microsoft.com/office/drawing/2014/main" id="{585979A7-FD56-F613-2ABB-45879F53D26B}"/>
-              </a:ext>
-            </a:extLst>
-          </p:cNvPr>
-          <p:cNvSpPr>
-            <a:spLocks noGrp="1"/>
-          </p:cNvSpPr>
-          <p:nvPr>
-            <p:ph idx="1"/>
-          </p:nvPr>
-        </p:nvSpPr>
-        <p:spPr/>
-        <p:txBody>
-          <a:bodyPr/>
-          <a:lstStyle/>
-          <a:p>
-            <a:endParaRPr lang="en-US"/>
+              <a:t>In general: various bugs + optimizations in code</a:t>
+            </a:r>
+          </a:p>
+          <a:p>
+            <a:endParaRPr lang="en-US" dirty="0"/>
+          </a:p>
+          <a:p>
+            <a:r>
+              <a:rPr lang="en-US" dirty="0"/>
+              <a:t>Further Development:</a:t>
+            </a:r>
+          </a:p>
+          <a:p>
+            <a:pPr lvl="1"/>
+            <a:r>
+              <a:rPr lang="en-US" dirty="0"/>
+              <a:t>Wavetable Synthesis</a:t>
+            </a:r>
+          </a:p>
+          <a:p>
+            <a:pPr lvl="1"/>
+            <a:r>
+              <a:rPr lang="en-US" dirty="0"/>
+              <a:t>Effect Plug-ins</a:t>
+            </a:r>
           </a:p>
         </p:txBody>
       </p:sp>
@@ -4451,7 +4274,7 @@
 </p:sld>
 </file>
 
-<file path=ppt/slides/slide19.xml><?xml version="1.0" encoding="utf-8"?>
+<file path=ppt/slides/slide16.xml><?xml version="1.0" encoding="utf-8"?>
 <p:sld xmlns:a="http://schemas.openxmlformats.org/drawingml/2006/main" xmlns:r="http://schemas.openxmlformats.org/officeDocument/2006/relationships" xmlns:p="http://schemas.openxmlformats.org/presentationml/2006/main">
   <p:cSld>
     <p:spTree>
@@ -4640,13 +4463,16 @@
             <a:pPr lvl="1"/>
             <a:r>
               <a:rPr lang="en-US" dirty="0"/>
-              <a:t>Sound </a:t>
-            </a:r>
+              <a:t>Processing Sound</a:t>
+            </a:r>
+          </a:p>
+          <a:p>
+            <a:pPr lvl="1"/>
             <a:r>
               <a:rPr lang="en-US" dirty="0">
                 <a:sym typeface="Wingdings" panose="05000000000000000000" pitchFamily="2" charset="2"/>
               </a:rPr>
-              <a:t> Processing</a:t>
+              <a:t>Roadblocks + Issues</a:t>
             </a:r>
           </a:p>
           <a:p>
@@ -4659,14 +4485,21 @@
             <a:pPr lvl="1"/>
             <a:r>
               <a:rPr lang="en-US" dirty="0"/>
-              <a:t>UML Diagram</a:t>
+              <a:t>Structure + Specifics for VST3</a:t>
             </a:r>
           </a:p>
           <a:p>
             <a:pPr lvl="1"/>
             <a:r>
               <a:rPr lang="en-US" dirty="0"/>
-              <a:t>Specifics for VST3</a:t>
+              <a:t>MIDI Input</a:t>
+            </a:r>
+          </a:p>
+          <a:p>
+            <a:pPr lvl="1"/>
+            <a:r>
+              <a:rPr lang="en-US" dirty="0"/>
+              <a:t>Waveform Creation</a:t>
             </a:r>
           </a:p>
           <a:p>
@@ -5799,7 +5632,7 @@
           <a:p>
             <a:r>
               <a:rPr lang="en-US" dirty="0"/>
-              <a:t>Problems with real time audio</a:t>
+              <a:t>Problems With Real Time Audio</a:t>
             </a:r>
           </a:p>
         </p:txBody>
@@ -5824,6 +5657,20 @@
         <p:txBody>
           <a:bodyPr/>
           <a:lstStyle/>
+          <a:p>
+            <a:r>
+              <a:rPr lang="en-US" dirty="0"/>
+              <a:t>A </a:t>
+            </a:r>
+            <a:r>
+              <a:rPr lang="en-US" i="1" dirty="0"/>
+              <a:t>buffer </a:t>
+            </a:r>
+            <a:r>
+              <a:rPr lang="en-US" dirty="0"/>
+              <a:t>is an array of samples sent to the audio driver.</a:t>
+            </a:r>
+          </a:p>
           <a:p>
             <a:r>
               <a:rPr lang="en-US" dirty="0"/>
@@ -5833,17 +5680,1057 @@
               <a:rPr lang="en-US" dirty="0">
                 <a:sym typeface="Wingdings" panose="05000000000000000000" pitchFamily="2" charset="2"/>
               </a:rPr>
-              <a:t> audio stack waits for nothing.</a:t>
-            </a:r>
-          </a:p>
-          <a:p>
+              <a:t> audio stack waits for </a:t>
+            </a:r>
+            <a:r>
+              <a:rPr lang="en-US" i="1" dirty="0">
+                <a:sym typeface="Wingdings" panose="05000000000000000000" pitchFamily="2" charset="2"/>
+              </a:rPr>
+              <a:t>nothing</a:t>
+            </a:r>
             <a:r>
               <a:rPr lang="en-US" dirty="0">
                 <a:sym typeface="Wingdings" panose="05000000000000000000" pitchFamily="2" charset="2"/>
               </a:rPr>
-              <a:t> </a:t>
+              <a:t>.</a:t>
+            </a:r>
+          </a:p>
+          <a:p>
+            <a:r>
+              <a:rPr lang="en-US" dirty="0">
+                <a:sym typeface="Wingdings" panose="05000000000000000000" pitchFamily="2" charset="2"/>
+              </a:rPr>
+              <a:t> If buffers take too long to process, popping and clipping can occur in one’s audio output.</a:t>
+            </a:r>
+          </a:p>
+          <a:p>
+            <a:r>
+              <a:rPr lang="en-US" dirty="0">
+                <a:sym typeface="Wingdings" panose="05000000000000000000" pitchFamily="2" charset="2"/>
+              </a:rPr>
+              <a:t>Example:</a:t>
             </a:r>
             <a:endParaRPr lang="en-US" dirty="0"/>
+          </a:p>
+        </p:txBody>
+      </p:sp>
+      <p:sp>
+        <p:nvSpPr>
+          <p:cNvPr id="4" name="Rectangle 3">
+            <a:extLst>
+              <a:ext uri="{FF2B5EF4-FFF2-40B4-BE49-F238E27FC236}">
+                <a16:creationId xmlns:a16="http://schemas.microsoft.com/office/drawing/2014/main" id="{7D6370C2-36E8-2FE0-8A9C-4FF38C5C1317}"/>
+              </a:ext>
+            </a:extLst>
+          </p:cNvPr>
+          <p:cNvSpPr/>
+          <p:nvPr/>
+        </p:nvSpPr>
+        <p:spPr>
+          <a:xfrm>
+            <a:off x="999385" y="5311532"/>
+            <a:ext cx="1546698" cy="408562"/>
+          </a:xfrm>
+          <a:prstGeom prst="rect">
+            <a:avLst/>
+          </a:prstGeom>
+        </p:spPr>
+        <p:style>
+          <a:lnRef idx="2">
+            <a:schemeClr val="accent6"/>
+          </a:lnRef>
+          <a:fillRef idx="1">
+            <a:schemeClr val="lt1"/>
+          </a:fillRef>
+          <a:effectRef idx="0">
+            <a:schemeClr val="accent6"/>
+          </a:effectRef>
+          <a:fontRef idx="minor">
+            <a:schemeClr val="dk1"/>
+          </a:fontRef>
+        </p:style>
+        <p:txBody>
+          <a:bodyPr rtlCol="0" anchor="ctr"/>
+          <a:lstStyle/>
+          <a:p>
+            <a:pPr algn="ctr"/>
+            <a:r>
+              <a:rPr lang="en-US" dirty="0"/>
+              <a:t>buffer</a:t>
+            </a:r>
+          </a:p>
+        </p:txBody>
+      </p:sp>
+      <p:sp>
+        <p:nvSpPr>
+          <p:cNvPr id="6" name="Rectangle 5">
+            <a:extLst>
+              <a:ext uri="{FF2B5EF4-FFF2-40B4-BE49-F238E27FC236}">
+                <a16:creationId xmlns:a16="http://schemas.microsoft.com/office/drawing/2014/main" id="{802860A9-EAD9-01C7-839F-3FA981C586BF}"/>
+              </a:ext>
+            </a:extLst>
+          </p:cNvPr>
+          <p:cNvSpPr/>
+          <p:nvPr/>
+        </p:nvSpPr>
+        <p:spPr>
+          <a:xfrm>
+            <a:off x="2679028" y="5311532"/>
+            <a:ext cx="1546698" cy="408562"/>
+          </a:xfrm>
+          <a:prstGeom prst="rect">
+            <a:avLst/>
+          </a:prstGeom>
+        </p:spPr>
+        <p:style>
+          <a:lnRef idx="2">
+            <a:schemeClr val="accent6"/>
+          </a:lnRef>
+          <a:fillRef idx="1">
+            <a:schemeClr val="lt1"/>
+          </a:fillRef>
+          <a:effectRef idx="0">
+            <a:schemeClr val="accent6"/>
+          </a:effectRef>
+          <a:fontRef idx="minor">
+            <a:schemeClr val="dk1"/>
+          </a:fontRef>
+        </p:style>
+        <p:txBody>
+          <a:bodyPr rtlCol="0" anchor="ctr"/>
+          <a:lstStyle/>
+          <a:p>
+            <a:pPr algn="ctr"/>
+            <a:r>
+              <a:rPr lang="en-US" dirty="0"/>
+              <a:t>buffer</a:t>
+            </a:r>
+          </a:p>
+        </p:txBody>
+      </p:sp>
+      <p:sp>
+        <p:nvSpPr>
+          <p:cNvPr id="7" name="Rectangle 6">
+            <a:extLst>
+              <a:ext uri="{FF2B5EF4-FFF2-40B4-BE49-F238E27FC236}">
+                <a16:creationId xmlns:a16="http://schemas.microsoft.com/office/drawing/2014/main" id="{E77A8B77-D860-0652-9749-51B663E85887}"/>
+              </a:ext>
+            </a:extLst>
+          </p:cNvPr>
+          <p:cNvSpPr/>
+          <p:nvPr/>
+        </p:nvSpPr>
+        <p:spPr>
+          <a:xfrm>
+            <a:off x="4358670" y="5311532"/>
+            <a:ext cx="2212947" cy="408562"/>
+          </a:xfrm>
+          <a:prstGeom prst="rect">
+            <a:avLst/>
+          </a:prstGeom>
+          <a:ln>
+            <a:solidFill>
+              <a:srgbClr val="FF0000"/>
+            </a:solidFill>
+          </a:ln>
+        </p:spPr>
+        <p:style>
+          <a:lnRef idx="2">
+            <a:schemeClr val="accent6"/>
+          </a:lnRef>
+          <a:fillRef idx="1">
+            <a:schemeClr val="lt1"/>
+          </a:fillRef>
+          <a:effectRef idx="0">
+            <a:schemeClr val="accent6"/>
+          </a:effectRef>
+          <a:fontRef idx="minor">
+            <a:schemeClr val="dk1"/>
+          </a:fontRef>
+        </p:style>
+        <p:txBody>
+          <a:bodyPr rtlCol="0" anchor="ctr"/>
+          <a:lstStyle/>
+          <a:p>
+            <a:pPr algn="ctr"/>
+            <a:r>
+              <a:rPr lang="en-US" dirty="0"/>
+              <a:t>buffer</a:t>
+            </a:r>
+          </a:p>
+        </p:txBody>
+      </p:sp>
+      <p:cxnSp>
+        <p:nvCxnSpPr>
+          <p:cNvPr id="9" name="Straight Connector 8">
+            <a:extLst>
+              <a:ext uri="{FF2B5EF4-FFF2-40B4-BE49-F238E27FC236}">
+                <a16:creationId xmlns:a16="http://schemas.microsoft.com/office/drawing/2014/main" id="{910F7BE6-F808-CBDE-621C-55C9534D4DFD}"/>
+              </a:ext>
+            </a:extLst>
+          </p:cNvPr>
+          <p:cNvCxnSpPr>
+            <a:cxnSpLocks/>
+          </p:cNvCxnSpPr>
+          <p:nvPr/>
+        </p:nvCxnSpPr>
+        <p:spPr>
+          <a:xfrm>
+            <a:off x="261257" y="6049215"/>
+            <a:ext cx="871073" cy="0"/>
+          </a:xfrm>
+          <a:prstGeom prst="line">
+            <a:avLst/>
+          </a:prstGeom>
+          <a:ln w="19050"/>
+        </p:spPr>
+        <p:style>
+          <a:lnRef idx="1">
+            <a:schemeClr val="accent6"/>
+          </a:lnRef>
+          <a:fillRef idx="0">
+            <a:schemeClr val="accent6"/>
+          </a:fillRef>
+          <a:effectRef idx="0">
+            <a:schemeClr val="accent6"/>
+          </a:effectRef>
+          <a:fontRef idx="minor">
+            <a:schemeClr val="tx1"/>
+          </a:fontRef>
+        </p:style>
+      </p:cxnSp>
+      <p:cxnSp>
+        <p:nvCxnSpPr>
+          <p:cNvPr id="14" name="Straight Connector 13">
+            <a:extLst>
+              <a:ext uri="{FF2B5EF4-FFF2-40B4-BE49-F238E27FC236}">
+                <a16:creationId xmlns:a16="http://schemas.microsoft.com/office/drawing/2014/main" id="{126C108C-8FD7-F5C4-1725-AC5639C65769}"/>
+              </a:ext>
+            </a:extLst>
+          </p:cNvPr>
+          <p:cNvCxnSpPr>
+            <a:cxnSpLocks/>
+          </p:cNvCxnSpPr>
+          <p:nvPr/>
+        </p:nvCxnSpPr>
+        <p:spPr>
+          <a:xfrm flipV="1">
+            <a:off x="999385" y="5929240"/>
+            <a:ext cx="0" cy="239949"/>
+          </a:xfrm>
+          <a:prstGeom prst="line">
+            <a:avLst/>
+          </a:prstGeom>
+          <a:ln w="19050"/>
+        </p:spPr>
+        <p:style>
+          <a:lnRef idx="1">
+            <a:schemeClr val="accent6"/>
+          </a:lnRef>
+          <a:fillRef idx="0">
+            <a:schemeClr val="accent6"/>
+          </a:fillRef>
+          <a:effectRef idx="0">
+            <a:schemeClr val="accent6"/>
+          </a:effectRef>
+          <a:fontRef idx="minor">
+            <a:schemeClr val="tx1"/>
+          </a:fontRef>
+        </p:style>
+      </p:cxnSp>
+      <p:cxnSp>
+        <p:nvCxnSpPr>
+          <p:cNvPr id="16" name="Straight Connector 15">
+            <a:extLst>
+              <a:ext uri="{FF2B5EF4-FFF2-40B4-BE49-F238E27FC236}">
+                <a16:creationId xmlns:a16="http://schemas.microsoft.com/office/drawing/2014/main" id="{072533B5-3456-AB2A-E624-7C4D9F0773A5}"/>
+              </a:ext>
+            </a:extLst>
+          </p:cNvPr>
+          <p:cNvCxnSpPr>
+            <a:cxnSpLocks/>
+          </p:cNvCxnSpPr>
+          <p:nvPr/>
+        </p:nvCxnSpPr>
+        <p:spPr>
+          <a:xfrm>
+            <a:off x="1132330" y="6045972"/>
+            <a:ext cx="1679643" cy="0"/>
+          </a:xfrm>
+          <a:prstGeom prst="line">
+            <a:avLst/>
+          </a:prstGeom>
+          <a:ln w="19050"/>
+        </p:spPr>
+        <p:style>
+          <a:lnRef idx="1">
+            <a:schemeClr val="accent6"/>
+          </a:lnRef>
+          <a:fillRef idx="0">
+            <a:schemeClr val="accent6"/>
+          </a:fillRef>
+          <a:effectRef idx="0">
+            <a:schemeClr val="accent6"/>
+          </a:effectRef>
+          <a:fontRef idx="minor">
+            <a:schemeClr val="tx1"/>
+          </a:fontRef>
+        </p:style>
+      </p:cxnSp>
+      <p:cxnSp>
+        <p:nvCxnSpPr>
+          <p:cNvPr id="17" name="Straight Connector 16">
+            <a:extLst>
+              <a:ext uri="{FF2B5EF4-FFF2-40B4-BE49-F238E27FC236}">
+                <a16:creationId xmlns:a16="http://schemas.microsoft.com/office/drawing/2014/main" id="{5DCBC02A-2A0E-192D-99F6-49EBCD95FE83}"/>
+              </a:ext>
+            </a:extLst>
+          </p:cNvPr>
+          <p:cNvCxnSpPr>
+            <a:cxnSpLocks/>
+          </p:cNvCxnSpPr>
+          <p:nvPr/>
+        </p:nvCxnSpPr>
+        <p:spPr>
+          <a:xfrm flipV="1">
+            <a:off x="2679028" y="5925997"/>
+            <a:ext cx="0" cy="239949"/>
+          </a:xfrm>
+          <a:prstGeom prst="line">
+            <a:avLst/>
+          </a:prstGeom>
+          <a:ln w="19050"/>
+        </p:spPr>
+        <p:style>
+          <a:lnRef idx="1">
+            <a:schemeClr val="accent6"/>
+          </a:lnRef>
+          <a:fillRef idx="0">
+            <a:schemeClr val="accent6"/>
+          </a:fillRef>
+          <a:effectRef idx="0">
+            <a:schemeClr val="accent6"/>
+          </a:effectRef>
+          <a:fontRef idx="minor">
+            <a:schemeClr val="tx1"/>
+          </a:fontRef>
+        </p:style>
+      </p:cxnSp>
+      <p:cxnSp>
+        <p:nvCxnSpPr>
+          <p:cNvPr id="22" name="Straight Connector 21">
+            <a:extLst>
+              <a:ext uri="{FF2B5EF4-FFF2-40B4-BE49-F238E27FC236}">
+                <a16:creationId xmlns:a16="http://schemas.microsoft.com/office/drawing/2014/main" id="{47D1B8F5-0E5B-379A-E24A-08596E60EAA5}"/>
+              </a:ext>
+            </a:extLst>
+          </p:cNvPr>
+          <p:cNvCxnSpPr>
+            <a:cxnSpLocks/>
+          </p:cNvCxnSpPr>
+          <p:nvPr/>
+        </p:nvCxnSpPr>
+        <p:spPr>
+          <a:xfrm>
+            <a:off x="2811973" y="6045971"/>
+            <a:ext cx="1679643" cy="0"/>
+          </a:xfrm>
+          <a:prstGeom prst="line">
+            <a:avLst/>
+          </a:prstGeom>
+          <a:ln w="19050"/>
+        </p:spPr>
+        <p:style>
+          <a:lnRef idx="1">
+            <a:schemeClr val="accent6"/>
+          </a:lnRef>
+          <a:fillRef idx="0">
+            <a:schemeClr val="accent6"/>
+          </a:fillRef>
+          <a:effectRef idx="0">
+            <a:schemeClr val="accent6"/>
+          </a:effectRef>
+          <a:fontRef idx="minor">
+            <a:schemeClr val="tx1"/>
+          </a:fontRef>
+        </p:style>
+      </p:cxnSp>
+      <p:cxnSp>
+        <p:nvCxnSpPr>
+          <p:cNvPr id="23" name="Straight Connector 22">
+            <a:extLst>
+              <a:ext uri="{FF2B5EF4-FFF2-40B4-BE49-F238E27FC236}">
+                <a16:creationId xmlns:a16="http://schemas.microsoft.com/office/drawing/2014/main" id="{46C4F45B-3BA3-F2D9-1E31-D4DE6CE6A27B}"/>
+              </a:ext>
+            </a:extLst>
+          </p:cNvPr>
+          <p:cNvCxnSpPr>
+            <a:cxnSpLocks/>
+          </p:cNvCxnSpPr>
+          <p:nvPr/>
+        </p:nvCxnSpPr>
+        <p:spPr>
+          <a:xfrm flipV="1">
+            <a:off x="4358671" y="5925996"/>
+            <a:ext cx="0" cy="239949"/>
+          </a:xfrm>
+          <a:prstGeom prst="line">
+            <a:avLst/>
+          </a:prstGeom>
+          <a:ln w="19050"/>
+        </p:spPr>
+        <p:style>
+          <a:lnRef idx="1">
+            <a:schemeClr val="accent6"/>
+          </a:lnRef>
+          <a:fillRef idx="0">
+            <a:schemeClr val="accent6"/>
+          </a:fillRef>
+          <a:effectRef idx="0">
+            <a:schemeClr val="accent6"/>
+          </a:effectRef>
+          <a:fontRef idx="minor">
+            <a:schemeClr val="tx1"/>
+          </a:fontRef>
+        </p:style>
+      </p:cxnSp>
+      <p:cxnSp>
+        <p:nvCxnSpPr>
+          <p:cNvPr id="24" name="Straight Connector 23">
+            <a:extLst>
+              <a:ext uri="{FF2B5EF4-FFF2-40B4-BE49-F238E27FC236}">
+                <a16:creationId xmlns:a16="http://schemas.microsoft.com/office/drawing/2014/main" id="{B6E1B1A9-54A9-4A05-5289-B394DB94973E}"/>
+              </a:ext>
+            </a:extLst>
+          </p:cNvPr>
+          <p:cNvCxnSpPr>
+            <a:cxnSpLocks/>
+          </p:cNvCxnSpPr>
+          <p:nvPr/>
+        </p:nvCxnSpPr>
+        <p:spPr>
+          <a:xfrm>
+            <a:off x="4491616" y="6049214"/>
+            <a:ext cx="1679643" cy="0"/>
+          </a:xfrm>
+          <a:prstGeom prst="line">
+            <a:avLst/>
+          </a:prstGeom>
+          <a:ln w="19050"/>
+        </p:spPr>
+        <p:style>
+          <a:lnRef idx="1">
+            <a:schemeClr val="accent6"/>
+          </a:lnRef>
+          <a:fillRef idx="0">
+            <a:schemeClr val="accent6"/>
+          </a:fillRef>
+          <a:effectRef idx="0">
+            <a:schemeClr val="accent6"/>
+          </a:effectRef>
+          <a:fontRef idx="minor">
+            <a:schemeClr val="tx1"/>
+          </a:fontRef>
+        </p:style>
+      </p:cxnSp>
+      <p:cxnSp>
+        <p:nvCxnSpPr>
+          <p:cNvPr id="25" name="Straight Connector 24">
+            <a:extLst>
+              <a:ext uri="{FF2B5EF4-FFF2-40B4-BE49-F238E27FC236}">
+                <a16:creationId xmlns:a16="http://schemas.microsoft.com/office/drawing/2014/main" id="{1978B40D-1827-B1A4-1400-993210AE91C2}"/>
+              </a:ext>
+            </a:extLst>
+          </p:cNvPr>
+          <p:cNvCxnSpPr>
+            <a:cxnSpLocks/>
+          </p:cNvCxnSpPr>
+          <p:nvPr/>
+        </p:nvCxnSpPr>
+        <p:spPr>
+          <a:xfrm flipV="1">
+            <a:off x="6038314" y="5922753"/>
+            <a:ext cx="0" cy="239949"/>
+          </a:xfrm>
+          <a:prstGeom prst="line">
+            <a:avLst/>
+          </a:prstGeom>
+          <a:ln w="19050"/>
+        </p:spPr>
+        <p:style>
+          <a:lnRef idx="1">
+            <a:schemeClr val="accent6"/>
+          </a:lnRef>
+          <a:fillRef idx="0">
+            <a:schemeClr val="accent6"/>
+          </a:fillRef>
+          <a:effectRef idx="0">
+            <a:schemeClr val="accent6"/>
+          </a:effectRef>
+          <a:fontRef idx="minor">
+            <a:schemeClr val="tx1"/>
+          </a:fontRef>
+        </p:style>
+      </p:cxnSp>
+      <p:cxnSp>
+        <p:nvCxnSpPr>
+          <p:cNvPr id="26" name="Straight Connector 25">
+            <a:extLst>
+              <a:ext uri="{FF2B5EF4-FFF2-40B4-BE49-F238E27FC236}">
+                <a16:creationId xmlns:a16="http://schemas.microsoft.com/office/drawing/2014/main" id="{33B93E43-ADAD-BB47-D9E3-39C09F43E7B2}"/>
+              </a:ext>
+            </a:extLst>
+          </p:cNvPr>
+          <p:cNvCxnSpPr>
+            <a:cxnSpLocks/>
+          </p:cNvCxnSpPr>
+          <p:nvPr/>
+        </p:nvCxnSpPr>
+        <p:spPr>
+          <a:xfrm>
+            <a:off x="6171259" y="6049214"/>
+            <a:ext cx="1679643" cy="0"/>
+          </a:xfrm>
+          <a:prstGeom prst="line">
+            <a:avLst/>
+          </a:prstGeom>
+          <a:ln w="19050"/>
+        </p:spPr>
+        <p:style>
+          <a:lnRef idx="1">
+            <a:schemeClr val="accent6"/>
+          </a:lnRef>
+          <a:fillRef idx="0">
+            <a:schemeClr val="accent6"/>
+          </a:fillRef>
+          <a:effectRef idx="0">
+            <a:schemeClr val="accent6"/>
+          </a:effectRef>
+          <a:fontRef idx="minor">
+            <a:schemeClr val="tx1"/>
+          </a:fontRef>
+        </p:style>
+      </p:cxnSp>
+      <p:cxnSp>
+        <p:nvCxnSpPr>
+          <p:cNvPr id="27" name="Straight Connector 26">
+            <a:extLst>
+              <a:ext uri="{FF2B5EF4-FFF2-40B4-BE49-F238E27FC236}">
+                <a16:creationId xmlns:a16="http://schemas.microsoft.com/office/drawing/2014/main" id="{0216EB91-399A-5D07-D199-753CF1C490BD}"/>
+              </a:ext>
+            </a:extLst>
+          </p:cNvPr>
+          <p:cNvCxnSpPr>
+            <a:cxnSpLocks/>
+          </p:cNvCxnSpPr>
+          <p:nvPr/>
+        </p:nvCxnSpPr>
+        <p:spPr>
+          <a:xfrm flipV="1">
+            <a:off x="7717957" y="5929239"/>
+            <a:ext cx="0" cy="239949"/>
+          </a:xfrm>
+          <a:prstGeom prst="line">
+            <a:avLst/>
+          </a:prstGeom>
+          <a:ln w="19050"/>
+        </p:spPr>
+        <p:style>
+          <a:lnRef idx="1">
+            <a:schemeClr val="accent6"/>
+          </a:lnRef>
+          <a:fillRef idx="0">
+            <a:schemeClr val="accent6"/>
+          </a:fillRef>
+          <a:effectRef idx="0">
+            <a:schemeClr val="accent6"/>
+          </a:effectRef>
+          <a:fontRef idx="minor">
+            <a:schemeClr val="tx1"/>
+          </a:fontRef>
+        </p:style>
+      </p:cxnSp>
+      <p:cxnSp>
+        <p:nvCxnSpPr>
+          <p:cNvPr id="28" name="Straight Connector 27">
+            <a:extLst>
+              <a:ext uri="{FF2B5EF4-FFF2-40B4-BE49-F238E27FC236}">
+                <a16:creationId xmlns:a16="http://schemas.microsoft.com/office/drawing/2014/main" id="{54FAB6D7-C70A-2D28-9C41-101BE672536A}"/>
+              </a:ext>
+            </a:extLst>
+          </p:cNvPr>
+          <p:cNvCxnSpPr>
+            <a:cxnSpLocks/>
+          </p:cNvCxnSpPr>
+          <p:nvPr/>
+        </p:nvCxnSpPr>
+        <p:spPr>
+          <a:xfrm>
+            <a:off x="7850902" y="6045971"/>
+            <a:ext cx="1679643" cy="0"/>
+          </a:xfrm>
+          <a:prstGeom prst="line">
+            <a:avLst/>
+          </a:prstGeom>
+          <a:ln w="19050"/>
+        </p:spPr>
+        <p:style>
+          <a:lnRef idx="1">
+            <a:schemeClr val="accent6"/>
+          </a:lnRef>
+          <a:fillRef idx="0">
+            <a:schemeClr val="accent6"/>
+          </a:fillRef>
+          <a:effectRef idx="0">
+            <a:schemeClr val="accent6"/>
+          </a:effectRef>
+          <a:fontRef idx="minor">
+            <a:schemeClr val="tx1"/>
+          </a:fontRef>
+        </p:style>
+      </p:cxnSp>
+      <p:cxnSp>
+        <p:nvCxnSpPr>
+          <p:cNvPr id="29" name="Straight Connector 28">
+            <a:extLst>
+              <a:ext uri="{FF2B5EF4-FFF2-40B4-BE49-F238E27FC236}">
+                <a16:creationId xmlns:a16="http://schemas.microsoft.com/office/drawing/2014/main" id="{BB9D6298-A01B-4EDB-4D79-3E4AF954F0E2}"/>
+              </a:ext>
+            </a:extLst>
+          </p:cNvPr>
+          <p:cNvCxnSpPr>
+            <a:cxnSpLocks/>
+          </p:cNvCxnSpPr>
+          <p:nvPr/>
+        </p:nvCxnSpPr>
+        <p:spPr>
+          <a:xfrm flipV="1">
+            <a:off x="9397600" y="5925996"/>
+            <a:ext cx="0" cy="239949"/>
+          </a:xfrm>
+          <a:prstGeom prst="line">
+            <a:avLst/>
+          </a:prstGeom>
+          <a:ln w="19050"/>
+        </p:spPr>
+        <p:style>
+          <a:lnRef idx="1">
+            <a:schemeClr val="accent6"/>
+          </a:lnRef>
+          <a:fillRef idx="0">
+            <a:schemeClr val="accent6"/>
+          </a:fillRef>
+          <a:effectRef idx="0">
+            <a:schemeClr val="accent6"/>
+          </a:effectRef>
+          <a:fontRef idx="minor">
+            <a:schemeClr val="tx1"/>
+          </a:fontRef>
+        </p:style>
+      </p:cxnSp>
+      <p:cxnSp>
+        <p:nvCxnSpPr>
+          <p:cNvPr id="30" name="Straight Connector 29">
+            <a:extLst>
+              <a:ext uri="{FF2B5EF4-FFF2-40B4-BE49-F238E27FC236}">
+                <a16:creationId xmlns:a16="http://schemas.microsoft.com/office/drawing/2014/main" id="{BF99B52B-4E60-B689-2283-F5FDD43A4DFE}"/>
+              </a:ext>
+            </a:extLst>
+          </p:cNvPr>
+          <p:cNvCxnSpPr>
+            <a:cxnSpLocks/>
+          </p:cNvCxnSpPr>
+          <p:nvPr/>
+        </p:nvCxnSpPr>
+        <p:spPr>
+          <a:xfrm>
+            <a:off x="9530545" y="6045970"/>
+            <a:ext cx="1679643" cy="0"/>
+          </a:xfrm>
+          <a:prstGeom prst="line">
+            <a:avLst/>
+          </a:prstGeom>
+          <a:ln w="19050"/>
+        </p:spPr>
+        <p:style>
+          <a:lnRef idx="1">
+            <a:schemeClr val="accent6"/>
+          </a:lnRef>
+          <a:fillRef idx="0">
+            <a:schemeClr val="accent6"/>
+          </a:fillRef>
+          <a:effectRef idx="0">
+            <a:schemeClr val="accent6"/>
+          </a:effectRef>
+          <a:fontRef idx="minor">
+            <a:schemeClr val="tx1"/>
+          </a:fontRef>
+        </p:style>
+      </p:cxnSp>
+      <p:cxnSp>
+        <p:nvCxnSpPr>
+          <p:cNvPr id="31" name="Straight Connector 30">
+            <a:extLst>
+              <a:ext uri="{FF2B5EF4-FFF2-40B4-BE49-F238E27FC236}">
+                <a16:creationId xmlns:a16="http://schemas.microsoft.com/office/drawing/2014/main" id="{B4059E29-C4C8-E001-DA9E-65B77BD11393}"/>
+              </a:ext>
+            </a:extLst>
+          </p:cNvPr>
+          <p:cNvCxnSpPr>
+            <a:cxnSpLocks/>
+          </p:cNvCxnSpPr>
+          <p:nvPr/>
+        </p:nvCxnSpPr>
+        <p:spPr>
+          <a:xfrm flipV="1">
+            <a:off x="11077243" y="5925995"/>
+            <a:ext cx="0" cy="239949"/>
+          </a:xfrm>
+          <a:prstGeom prst="line">
+            <a:avLst/>
+          </a:prstGeom>
+          <a:ln w="19050"/>
+        </p:spPr>
+        <p:style>
+          <a:lnRef idx="1">
+            <a:schemeClr val="accent6"/>
+          </a:lnRef>
+          <a:fillRef idx="0">
+            <a:schemeClr val="accent6"/>
+          </a:fillRef>
+          <a:effectRef idx="0">
+            <a:schemeClr val="accent6"/>
+          </a:effectRef>
+          <a:fontRef idx="minor">
+            <a:schemeClr val="tx1"/>
+          </a:fontRef>
+        </p:style>
+      </p:cxnSp>
+      <p:cxnSp>
+        <p:nvCxnSpPr>
+          <p:cNvPr id="32" name="Straight Connector 31">
+            <a:extLst>
+              <a:ext uri="{FF2B5EF4-FFF2-40B4-BE49-F238E27FC236}">
+                <a16:creationId xmlns:a16="http://schemas.microsoft.com/office/drawing/2014/main" id="{04BA2C04-9574-8EF2-C396-218AFB71EE9D}"/>
+              </a:ext>
+            </a:extLst>
+          </p:cNvPr>
+          <p:cNvCxnSpPr>
+            <a:cxnSpLocks/>
+          </p:cNvCxnSpPr>
+          <p:nvPr/>
+        </p:nvCxnSpPr>
+        <p:spPr>
+          <a:xfrm>
+            <a:off x="11077243" y="6049213"/>
+            <a:ext cx="890344" cy="0"/>
+          </a:xfrm>
+          <a:prstGeom prst="line">
+            <a:avLst/>
+          </a:prstGeom>
+          <a:ln w="19050"/>
+        </p:spPr>
+        <p:style>
+          <a:lnRef idx="1">
+            <a:schemeClr val="accent6"/>
+          </a:lnRef>
+          <a:fillRef idx="0">
+            <a:schemeClr val="accent6"/>
+          </a:fillRef>
+          <a:effectRef idx="0">
+            <a:schemeClr val="accent6"/>
+          </a:effectRef>
+          <a:fontRef idx="minor">
+            <a:schemeClr val="tx1"/>
+          </a:fontRef>
+        </p:style>
+      </p:cxnSp>
+      <p:sp>
+        <p:nvSpPr>
+          <p:cNvPr id="35" name="Rectangle 34">
+            <a:extLst>
+              <a:ext uri="{FF2B5EF4-FFF2-40B4-BE49-F238E27FC236}">
+                <a16:creationId xmlns:a16="http://schemas.microsoft.com/office/drawing/2014/main" id="{C72979BF-8DDC-82CE-FF1A-E95400BAF5B9}"/>
+              </a:ext>
+            </a:extLst>
+          </p:cNvPr>
+          <p:cNvSpPr/>
+          <p:nvPr/>
+        </p:nvSpPr>
+        <p:spPr>
+          <a:xfrm>
+            <a:off x="4358670" y="4738410"/>
+            <a:ext cx="1546698" cy="408562"/>
+          </a:xfrm>
+          <a:prstGeom prst="rect">
+            <a:avLst/>
+          </a:prstGeom>
+          <a:ln>
+            <a:prstDash val="sysDash"/>
+          </a:ln>
+        </p:spPr>
+        <p:style>
+          <a:lnRef idx="2">
+            <a:schemeClr val="accent6"/>
+          </a:lnRef>
+          <a:fillRef idx="1">
+            <a:schemeClr val="lt1"/>
+          </a:fillRef>
+          <a:effectRef idx="0">
+            <a:schemeClr val="accent6"/>
+          </a:effectRef>
+          <a:fontRef idx="minor">
+            <a:schemeClr val="dk1"/>
+          </a:fontRef>
+        </p:style>
+        <p:txBody>
+          <a:bodyPr rtlCol="0" anchor="ctr"/>
+          <a:lstStyle/>
+          <a:p>
+            <a:pPr algn="ctr"/>
+            <a:r>
+              <a:rPr lang="en-US" dirty="0"/>
+              <a:t>buffer</a:t>
+            </a:r>
+          </a:p>
+        </p:txBody>
+      </p:sp>
+      <p:sp>
+        <p:nvSpPr>
+          <p:cNvPr id="36" name="Rectangle 35">
+            <a:extLst>
+              <a:ext uri="{FF2B5EF4-FFF2-40B4-BE49-F238E27FC236}">
+                <a16:creationId xmlns:a16="http://schemas.microsoft.com/office/drawing/2014/main" id="{C86014FF-5C11-337F-798A-B67EFC602D54}"/>
+              </a:ext>
+            </a:extLst>
+          </p:cNvPr>
+          <p:cNvSpPr/>
+          <p:nvPr/>
+        </p:nvSpPr>
+        <p:spPr>
+          <a:xfrm>
+            <a:off x="6038314" y="4738410"/>
+            <a:ext cx="1546698" cy="408562"/>
+          </a:xfrm>
+          <a:prstGeom prst="rect">
+            <a:avLst/>
+          </a:prstGeom>
+          <a:ln>
+            <a:prstDash val="sysDash"/>
+          </a:ln>
+        </p:spPr>
+        <p:style>
+          <a:lnRef idx="2">
+            <a:schemeClr val="accent6"/>
+          </a:lnRef>
+          <a:fillRef idx="1">
+            <a:schemeClr val="lt1"/>
+          </a:fillRef>
+          <a:effectRef idx="0">
+            <a:schemeClr val="accent6"/>
+          </a:effectRef>
+          <a:fontRef idx="minor">
+            <a:schemeClr val="dk1"/>
+          </a:fontRef>
+        </p:style>
+        <p:txBody>
+          <a:bodyPr rtlCol="0" anchor="ctr"/>
+          <a:lstStyle/>
+          <a:p>
+            <a:pPr algn="ctr"/>
+            <a:r>
+              <a:rPr lang="en-US" dirty="0"/>
+              <a:t>buffer</a:t>
+            </a:r>
+          </a:p>
+        </p:txBody>
+      </p:sp>
+      <p:sp>
+        <p:nvSpPr>
+          <p:cNvPr id="37" name="Rectangle 36">
+            <a:extLst>
+              <a:ext uri="{FF2B5EF4-FFF2-40B4-BE49-F238E27FC236}">
+                <a16:creationId xmlns:a16="http://schemas.microsoft.com/office/drawing/2014/main" id="{1A6905BF-50DE-5777-0CE7-CF411D23208B}"/>
+              </a:ext>
+            </a:extLst>
+          </p:cNvPr>
+          <p:cNvSpPr/>
+          <p:nvPr/>
+        </p:nvSpPr>
+        <p:spPr>
+          <a:xfrm>
+            <a:off x="7717957" y="4738410"/>
+            <a:ext cx="1546698" cy="408562"/>
+          </a:xfrm>
+          <a:prstGeom prst="rect">
+            <a:avLst/>
+          </a:prstGeom>
+          <a:ln>
+            <a:prstDash val="sysDash"/>
+          </a:ln>
+        </p:spPr>
+        <p:style>
+          <a:lnRef idx="2">
+            <a:schemeClr val="accent6"/>
+          </a:lnRef>
+          <a:fillRef idx="1">
+            <a:schemeClr val="lt1"/>
+          </a:fillRef>
+          <a:effectRef idx="0">
+            <a:schemeClr val="accent6"/>
+          </a:effectRef>
+          <a:fontRef idx="minor">
+            <a:schemeClr val="dk1"/>
+          </a:fontRef>
+        </p:style>
+        <p:txBody>
+          <a:bodyPr rtlCol="0" anchor="ctr"/>
+          <a:lstStyle/>
+          <a:p>
+            <a:pPr algn="ctr"/>
+            <a:r>
+              <a:rPr lang="en-US" dirty="0"/>
+              <a:t>buffer</a:t>
+            </a:r>
+          </a:p>
+        </p:txBody>
+      </p:sp>
+      <p:sp>
+        <p:nvSpPr>
+          <p:cNvPr id="38" name="Rectangle 37">
+            <a:extLst>
+              <a:ext uri="{FF2B5EF4-FFF2-40B4-BE49-F238E27FC236}">
+                <a16:creationId xmlns:a16="http://schemas.microsoft.com/office/drawing/2014/main" id="{D6DEF9B4-9B5D-3AFB-D976-3766BEEEB1A9}"/>
+              </a:ext>
+            </a:extLst>
+          </p:cNvPr>
+          <p:cNvSpPr/>
+          <p:nvPr/>
+        </p:nvSpPr>
+        <p:spPr>
+          <a:xfrm>
+            <a:off x="6704561" y="5311532"/>
+            <a:ext cx="1546698" cy="408562"/>
+          </a:xfrm>
+          <a:prstGeom prst="rect">
+            <a:avLst/>
+          </a:prstGeom>
+          <a:ln>
+            <a:solidFill>
+              <a:srgbClr val="FF0000"/>
+            </a:solidFill>
+          </a:ln>
+        </p:spPr>
+        <p:style>
+          <a:lnRef idx="2">
+            <a:schemeClr val="accent6"/>
+          </a:lnRef>
+          <a:fillRef idx="1">
+            <a:schemeClr val="lt1"/>
+          </a:fillRef>
+          <a:effectRef idx="0">
+            <a:schemeClr val="accent6"/>
+          </a:effectRef>
+          <a:fontRef idx="minor">
+            <a:schemeClr val="dk1"/>
+          </a:fontRef>
+        </p:style>
+        <p:txBody>
+          <a:bodyPr rtlCol="0" anchor="ctr"/>
+          <a:lstStyle/>
+          <a:p>
+            <a:pPr algn="ctr"/>
+            <a:r>
+              <a:rPr lang="en-US" dirty="0"/>
+              <a:t>buffer</a:t>
+            </a:r>
+          </a:p>
+        </p:txBody>
+      </p:sp>
+      <p:sp>
+        <p:nvSpPr>
+          <p:cNvPr id="39" name="Rectangle 38">
+            <a:extLst>
+              <a:ext uri="{FF2B5EF4-FFF2-40B4-BE49-F238E27FC236}">
+                <a16:creationId xmlns:a16="http://schemas.microsoft.com/office/drawing/2014/main" id="{683196B3-8921-D4F9-E5E9-CB599E7D4B00}"/>
+              </a:ext>
+            </a:extLst>
+          </p:cNvPr>
+          <p:cNvSpPr/>
+          <p:nvPr/>
+        </p:nvSpPr>
+        <p:spPr>
+          <a:xfrm>
+            <a:off x="8384203" y="5311532"/>
+            <a:ext cx="1546698" cy="408562"/>
+          </a:xfrm>
+          <a:prstGeom prst="rect">
+            <a:avLst/>
+          </a:prstGeom>
+          <a:ln>
+            <a:solidFill>
+              <a:srgbClr val="FF0000"/>
+            </a:solidFill>
+          </a:ln>
+        </p:spPr>
+        <p:style>
+          <a:lnRef idx="2">
+            <a:schemeClr val="accent6"/>
+          </a:lnRef>
+          <a:fillRef idx="1">
+            <a:schemeClr val="lt1"/>
+          </a:fillRef>
+          <a:effectRef idx="0">
+            <a:schemeClr val="accent6"/>
+          </a:effectRef>
+          <a:fontRef idx="minor">
+            <a:schemeClr val="dk1"/>
+          </a:fontRef>
+        </p:style>
+        <p:txBody>
+          <a:bodyPr rtlCol="0" anchor="ctr"/>
+          <a:lstStyle/>
+          <a:p>
+            <a:pPr algn="ctr"/>
+            <a:r>
+              <a:rPr lang="en-US" dirty="0"/>
+              <a:t>buffer</a:t>
+            </a:r>
+          </a:p>
+        </p:txBody>
+      </p:sp>
+      <p:sp>
+        <p:nvSpPr>
+          <p:cNvPr id="44" name="TextBox 43">
+            <a:extLst>
+              <a:ext uri="{FF2B5EF4-FFF2-40B4-BE49-F238E27FC236}">
+                <a16:creationId xmlns:a16="http://schemas.microsoft.com/office/drawing/2014/main" id="{E641A8A8-FBFB-C40B-AD39-15262AE84A0A}"/>
+              </a:ext>
+            </a:extLst>
+          </p:cNvPr>
+          <p:cNvSpPr txBox="1"/>
+          <p:nvPr/>
+        </p:nvSpPr>
+        <p:spPr>
+          <a:xfrm>
+            <a:off x="191990" y="5679881"/>
+            <a:ext cx="1186775" cy="369332"/>
+          </a:xfrm>
+          <a:prstGeom prst="rect">
+            <a:avLst/>
+          </a:prstGeom>
+          <a:noFill/>
+        </p:spPr>
+        <p:txBody>
+          <a:bodyPr wrap="square" rtlCol="0">
+            <a:spAutoFit/>
+          </a:bodyPr>
+          <a:lstStyle/>
+          <a:p>
+            <a:r>
+              <a:rPr lang="en-US" dirty="0"/>
+              <a:t>time:</a:t>
+            </a:r>
           </a:p>
         </p:txBody>
       </p:sp>
@@ -5882,7 +6769,7 @@
           <p:cNvPr id="2" name="Title 1">
             <a:extLst>
               <a:ext uri="{FF2B5EF4-FFF2-40B4-BE49-F238E27FC236}">
-                <a16:creationId xmlns:a16="http://schemas.microsoft.com/office/drawing/2014/main" id="{A3C902C3-BEBE-4C99-8707-10C053388ADE}"/>
+                <a16:creationId xmlns:a16="http://schemas.microsoft.com/office/drawing/2014/main" id="{5FA32A5E-A63F-37B5-D5FD-6931D2BE76D6}"/>
               </a:ext>
             </a:extLst>
           </p:cNvPr>
@@ -5893,38 +6780,129 @@
             <p:ph type="title"/>
           </p:nvPr>
         </p:nvSpPr>
-        <p:spPr>
-          <a:xfrm>
-            <a:off x="0" y="1709739"/>
-            <a:ext cx="12192000" cy="2156584"/>
-          </a:xfrm>
-        </p:spPr>
-        <p:txBody>
-          <a:bodyPr>
-            <a:normAutofit/>
-          </a:bodyPr>
-          <a:lstStyle/>
-          <a:p>
-            <a:pPr algn="ctr"/>
-            <a:r>
-              <a:rPr lang="en-US" sz="5400" dirty="0"/>
-              <a:t>All these things </a:t>
-            </a:r>
-            <a:r>
-              <a:rPr lang="en-US" sz="4800" dirty="0"/>
-              <a:t>aren’t</a:t>
-            </a:r>
-            <a:r>
-              <a:rPr lang="en-US" sz="5400" dirty="0"/>
-              <a:t> really an issue.</a:t>
-            </a:r>
+        <p:spPr/>
+        <p:txBody>
+          <a:bodyPr/>
+          <a:lstStyle/>
+          <a:p>
+            <a:r>
+              <a:rPr lang="en-US" dirty="0"/>
+              <a:t>Easier Than Expected</a:t>
+            </a:r>
+          </a:p>
+        </p:txBody>
+      </p:sp>
+      <p:sp>
+        <p:nvSpPr>
+          <p:cNvPr id="3" name="Content Placeholder 2">
+            <a:extLst>
+              <a:ext uri="{FF2B5EF4-FFF2-40B4-BE49-F238E27FC236}">
+                <a16:creationId xmlns:a16="http://schemas.microsoft.com/office/drawing/2014/main" id="{07AEFFE8-C5E7-290A-C00A-5E5298F8D95B}"/>
+              </a:ext>
+            </a:extLst>
+          </p:cNvPr>
+          <p:cNvSpPr>
+            <a:spLocks noGrp="1"/>
+          </p:cNvSpPr>
+          <p:nvPr>
+            <p:ph idx="1"/>
+          </p:nvPr>
+        </p:nvSpPr>
+        <p:spPr/>
+        <p:txBody>
+          <a:bodyPr/>
+          <a:lstStyle/>
+          <a:p>
+            <a:r>
+              <a:rPr lang="en-US" dirty="0"/>
+              <a:t>Software Available:</a:t>
+            </a:r>
+          </a:p>
+          <a:p>
+            <a:pPr lvl="1"/>
+            <a:r>
+              <a:rPr lang="en-US" dirty="0"/>
+              <a:t>Various plugin frameworks:</a:t>
+            </a:r>
+          </a:p>
+          <a:p>
+            <a:pPr lvl="2"/>
+            <a:r>
+              <a:rPr lang="en-US" dirty="0" err="1"/>
+              <a:t>Juce</a:t>
+            </a:r>
+            <a:r>
+              <a:rPr lang="en-US" dirty="0"/>
+              <a:t>, iPlug2, </a:t>
+            </a:r>
+            <a:r>
+              <a:rPr lang="en-US" dirty="0" err="1"/>
+              <a:t>dplug</a:t>
+            </a:r>
+            <a:r>
+              <a:rPr lang="en-US" dirty="0"/>
+              <a:t>, DISTHRO, etc.</a:t>
+            </a:r>
+          </a:p>
+          <a:p>
+            <a:pPr lvl="1"/>
+            <a:r>
+              <a:rPr lang="en-US" dirty="0"/>
+              <a:t>Various SDKs:</a:t>
+            </a:r>
+          </a:p>
+          <a:p>
+            <a:pPr lvl="2"/>
+            <a:r>
+              <a:rPr lang="en-US" dirty="0"/>
+              <a:t>VST SDK, AAX SDK, etc.</a:t>
+            </a:r>
+          </a:p>
+          <a:p>
+            <a:pPr lvl="1"/>
+            <a:r>
+              <a:rPr lang="en-US" dirty="0"/>
+              <a:t>Each make handling the digital audio stack easier.</a:t>
+            </a:r>
+          </a:p>
+          <a:p>
+            <a:pPr lvl="1"/>
+            <a:endParaRPr lang="en-US" dirty="0"/>
+          </a:p>
+          <a:p>
+            <a:r>
+              <a:rPr lang="en-US" dirty="0"/>
+              <a:t>Realistically, it is </a:t>
+            </a:r>
+            <a:r>
+              <a:rPr lang="en-US" i="1" dirty="0"/>
+              <a:t>difficult</a:t>
+            </a:r>
+            <a:r>
+              <a:rPr lang="en-US" dirty="0"/>
+              <a:t> to reach the threshold at which unwanted audio artifacts occur.</a:t>
+            </a:r>
+          </a:p>
+          <a:p>
+            <a:pPr lvl="1"/>
+            <a:r>
+              <a:rPr lang="en-US" dirty="0"/>
+              <a:t>(Maintaining good conventions, that is – avoiding system calls).</a:t>
+            </a:r>
+          </a:p>
+          <a:p>
+            <a:pPr lvl="1"/>
+            <a:endParaRPr lang="en-US" dirty="0"/>
+          </a:p>
+          <a:p>
+            <a:endParaRPr lang="en-US" dirty="0"/>
           </a:p>
         </p:txBody>
       </p:sp>
     </p:spTree>
     <p:extLst>
       <p:ext uri="{BB962C8B-B14F-4D97-AF65-F5344CB8AC3E}">
-        <p14:creationId xmlns:p14="http://schemas.microsoft.com/office/powerpoint/2010/main" val="3262769772"/>
+        <p14:creationId xmlns:p14="http://schemas.microsoft.com/office/powerpoint/2010/main" val="4187135031"/>
       </p:ext>
     </p:extLst>
   </p:cSld>
@@ -5956,7 +6934,7 @@
           <p:cNvPr id="2" name="Title 1">
             <a:extLst>
               <a:ext uri="{FF2B5EF4-FFF2-40B4-BE49-F238E27FC236}">
-                <a16:creationId xmlns:a16="http://schemas.microsoft.com/office/drawing/2014/main" id="{5FA32A5E-A63F-37B5-D5FD-6931D2BE76D6}"/>
+                <a16:creationId xmlns:a16="http://schemas.microsoft.com/office/drawing/2014/main" id="{839E7B33-D4E5-2EFE-0549-923AE2592533}"/>
               </a:ext>
             </a:extLst>
           </p:cNvPr>
@@ -5972,9 +6950,10 @@
           <a:bodyPr/>
           <a:lstStyle/>
           <a:p>
-            <a:r>
-              <a:rPr lang="en-US" dirty="0"/>
-              <a:t>Reason 1 – Software Available</a:t>
+            <a:pPr algn="ctr"/>
+            <a:r>
+              <a:rPr lang="en-US" dirty="0"/>
+              <a:t>Part 2 – Practical Application</a:t>
             </a:r>
           </a:p>
         </p:txBody>
@@ -5984,7 +6963,7 @@
           <p:cNvPr id="3" name="Content Placeholder 2">
             <a:extLst>
               <a:ext uri="{FF2B5EF4-FFF2-40B4-BE49-F238E27FC236}">
-                <a16:creationId xmlns:a16="http://schemas.microsoft.com/office/drawing/2014/main" id="{07AEFFE8-C5E7-290A-C00A-5E5298F8D95B}"/>
+                <a16:creationId xmlns:a16="http://schemas.microsoft.com/office/drawing/2014/main" id="{52FE4D25-564A-0135-F376-2ABCBAC74974}"/>
               </a:ext>
             </a:extLst>
           </p:cNvPr>
@@ -6002,57 +6981,30 @@
           <a:p>
             <a:r>
               <a:rPr lang="en-US" dirty="0"/>
-              <a:t>Various plugin frameworks:</a:t>
-            </a:r>
-          </a:p>
-          <a:p>
-            <a:pPr lvl="1"/>
-            <a:r>
-              <a:rPr lang="en-US" dirty="0" err="1"/>
-              <a:t>Juce</a:t>
-            </a:r>
-            <a:r>
-              <a:rPr lang="en-US" dirty="0"/>
-              <a:t>, iPlug2, </a:t>
-            </a:r>
-            <a:r>
-              <a:rPr lang="en-US" dirty="0" err="1"/>
-              <a:t>dplug</a:t>
-            </a:r>
-            <a:r>
-              <a:rPr lang="en-US" dirty="0"/>
-              <a:t>, DISTHRO, etc.</a:t>
-            </a:r>
-          </a:p>
-          <a:p>
-            <a:r>
-              <a:rPr lang="en-US" dirty="0"/>
-              <a:t>Various SDKs:</a:t>
-            </a:r>
-          </a:p>
-          <a:p>
-            <a:pPr lvl="1"/>
-            <a:r>
-              <a:rPr lang="en-US" dirty="0"/>
-              <a:t>VST SDK, AAX SDK, etc.</a:t>
-            </a:r>
-          </a:p>
-          <a:p>
-            <a:pPr lvl="1"/>
+              <a:t>How are VST programs generally structured?</a:t>
+            </a:r>
+          </a:p>
+          <a:p>
+            <a:r>
+              <a:rPr lang="en-US" dirty="0"/>
+              <a:t>How do we obtain MIDI input?</a:t>
+            </a:r>
+          </a:p>
+          <a:p>
+            <a:r>
+              <a:rPr lang="en-US" dirty="0"/>
+              <a:t>How do we create basic waveforms?</a:t>
+            </a:r>
+          </a:p>
+          <a:p>
             <a:endParaRPr lang="en-US" dirty="0"/>
-          </a:p>
-          <a:p>
-            <a:r>
-              <a:rPr lang="en-US" dirty="0"/>
-              <a:t>Each make handling the digital audio stack easier.</a:t>
-            </a:r>
           </a:p>
         </p:txBody>
       </p:sp>
     </p:spTree>
     <p:extLst>
       <p:ext uri="{BB962C8B-B14F-4D97-AF65-F5344CB8AC3E}">
-        <p14:creationId xmlns:p14="http://schemas.microsoft.com/office/powerpoint/2010/main" val="4187135031"/>
+        <p14:creationId xmlns:p14="http://schemas.microsoft.com/office/powerpoint/2010/main" val="2732180309"/>
       </p:ext>
     </p:extLst>
   </p:cSld>

</xml_diff>